<commit_message>
Do you like my animation improvements to the case scenario? :-3
</commit_message>
<xml_diff>
--- a/Intro_to_SCM_and_Git-presentation.pptx
+++ b/Intro_to_SCM_and_Git-presentation.pptx
@@ -203,7 +203,7 @@
             <a:fld id="{45CFCF10-915A-49F5-B6D7-514E231DCDF1}" type="datetimeFigureOut">
               <a:rPr lang="en-US" smtClean="0"/>
               <a:pPr/>
-              <a:t>11/12/14</a:t>
+              <a:t>11/12/2014</a:t>
             </a:fld>
             <a:endParaRPr lang="en-US"/>
           </a:p>
@@ -370,7 +370,7 @@
             <a:fld id="{6FD0678E-F882-4F2D-B288-7FD22A23E63D}" type="datetimeFigureOut">
               <a:rPr lang="en-US" smtClean="0"/>
               <a:pPr/>
-              <a:t>11/12/14</a:t>
+              <a:t>11/12/2014</a:t>
             </a:fld>
             <a:endParaRPr lang="en-US"/>
           </a:p>
@@ -1281,7 +1281,7 @@
             <a:fld id="{4612DF9C-874E-47D4-81D0-65C9DE5115B7}" type="datetime1">
               <a:rPr lang="en-US" smtClean="0"/>
               <a:pPr/>
-              <a:t>11/12/14</a:t>
+              <a:t>11/12/2014</a:t>
             </a:fld>
             <a:endParaRPr lang="en-US"/>
           </a:p>
@@ -1295,7 +1295,7 @@
   <p:timing>
     <p:tnLst>
       <p:par>
-        <p:cTn xmlns:p14="http://schemas.microsoft.com/office/powerpoint/2010/main" id="1" dur="indefinite" restart="never" nodeType="tmRoot"/>
+        <p:cTn id="1" dur="indefinite" restart="never" nodeType="tmRoot"/>
       </p:par>
     </p:tnLst>
   </p:timing>
@@ -1912,7 +1912,7 @@
             <a:fld id="{F1F58A51-BF2E-42AC-8E65-C585A8BA80BA}" type="datetime1">
               <a:rPr lang="en-US" smtClean="0"/>
               <a:pPr/>
-              <a:t>11/12/14</a:t>
+              <a:t>11/12/2014</a:t>
             </a:fld>
             <a:endParaRPr lang="en-US"/>
           </a:p>
@@ -2201,7 +2201,7 @@
             <a:fld id="{3000F0DF-1E7D-4DBD-833B-E7E7F0E29C0F}" type="datetime1">
               <a:rPr lang="en-US" smtClean="0"/>
               <a:pPr/>
-              <a:t>11/12/14</a:t>
+              <a:t>11/12/2014</a:t>
             </a:fld>
             <a:endParaRPr lang="en-US"/>
           </a:p>
@@ -2636,7 +2636,7 @@
             <a:fld id="{475D2F3D-312F-4B9D-A6D5-98FA0DBD9BEB}" type="datetime1">
               <a:rPr lang="en-US" smtClean="0"/>
               <a:pPr/>
-              <a:t>11/12/14</a:t>
+              <a:t>11/12/2014</a:t>
             </a:fld>
             <a:endParaRPr lang="en-US"/>
           </a:p>
@@ -2751,7 +2751,7 @@
             <a:fld id="{1F2B999D-B673-4BF6-AFED-DE82BB78A551}" type="datetime1">
               <a:rPr lang="en-US" smtClean="0"/>
               <a:pPr/>
-              <a:t>11/12/14</a:t>
+              <a:t>11/12/2014</a:t>
             </a:fld>
             <a:endParaRPr lang="en-US"/>
           </a:p>
@@ -2808,7 +2808,7 @@
   <p:timing>
     <p:tnLst>
       <p:par>
-        <p:cTn xmlns:p14="http://schemas.microsoft.com/office/powerpoint/2010/main" id="1" dur="indefinite" restart="never" nodeType="tmRoot"/>
+        <p:cTn id="1" dur="indefinite" restart="never" nodeType="tmRoot"/>
       </p:par>
     </p:tnLst>
   </p:timing>
@@ -2992,7 +2992,7 @@
             <a:fld id="{15EE75C9-4165-49D6-889E-AD319E617BC4}" type="datetime1">
               <a:rPr lang="en-US" smtClean="0"/>
               <a:pPr/>
-              <a:t>11/12/14</a:t>
+              <a:t>11/12/2014</a:t>
             </a:fld>
             <a:endParaRPr lang="en-US"/>
           </a:p>
@@ -3090,7 +3090,7 @@
   <p:timing>
     <p:tnLst>
       <p:par>
-        <p:cTn xmlns:p14="http://schemas.microsoft.com/office/powerpoint/2010/main" id="1" dur="indefinite" restart="never" nodeType="tmRoot"/>
+        <p:cTn id="1" dur="indefinite" restart="never" nodeType="tmRoot"/>
       </p:par>
     </p:tnLst>
   </p:timing>
@@ -3565,7 +3565,7 @@
             <a:fld id="{A0D14760-8281-4D63-AA62-EE78DA6EC742}" type="datetime1">
               <a:rPr lang="en-US" smtClean="0"/>
               <a:pPr/>
-              <a:t>11/12/14</a:t>
+              <a:t>11/12/2014</a:t>
             </a:fld>
             <a:endParaRPr lang="en-US"/>
           </a:p>
@@ -3660,7 +3660,7 @@
   <p:timing>
     <p:tnLst>
       <p:par>
-        <p:cTn xmlns:p14="http://schemas.microsoft.com/office/powerpoint/2010/main" id="1" dur="indefinite" restart="never" nodeType="tmRoot"/>
+        <p:cTn id="1" dur="indefinite" restart="never" nodeType="tmRoot"/>
       </p:par>
     </p:tnLst>
   </p:timing>
@@ -4110,7 +4110,7 @@
             <a:fld id="{4062407C-A2E4-4F88-9519-110C5AA102FA}" type="datetime1">
               <a:rPr lang="en-US" smtClean="0"/>
               <a:pPr/>
-              <a:t>11/12/14</a:t>
+              <a:t>11/12/2014</a:t>
             </a:fld>
             <a:endParaRPr lang="en-US"/>
           </a:p>
@@ -4204,7 +4204,7 @@
   <p:timing>
     <p:tnLst>
       <p:par>
-        <p:cTn xmlns:p14="http://schemas.microsoft.com/office/powerpoint/2010/main" id="1" dur="indefinite" restart="never" nodeType="tmRoot"/>
+        <p:cTn id="1" dur="indefinite" restart="never" nodeType="tmRoot"/>
       </p:par>
     </p:tnLst>
   </p:timing>
@@ -4534,7 +4534,7 @@
   <p:timing>
     <p:tnLst>
       <p:par>
-        <p:cTn xmlns:p14="http://schemas.microsoft.com/office/powerpoint/2010/main" id="1" dur="indefinite" restart="never" nodeType="tmRoot"/>
+        <p:cTn id="1" dur="indefinite" restart="never" nodeType="tmRoot"/>
       </p:par>
     </p:tnLst>
   </p:timing>
@@ -5011,7 +5011,7 @@
   <p:timing>
     <p:tnLst>
       <p:par>
-        <p:cTn xmlns:p14="http://schemas.microsoft.com/office/powerpoint/2010/main" id="1" dur="indefinite" restart="never" nodeType="tmRoot"/>
+        <p:cTn id="1" dur="indefinite" restart="never" nodeType="tmRoot"/>
       </p:par>
     </p:tnLst>
   </p:timing>
@@ -6493,7 +6493,7 @@
   <p:timing>
     <p:tnLst>
       <p:par>
-        <p:cTn xmlns:p14="http://schemas.microsoft.com/office/powerpoint/2010/main" id="1" dur="indefinite" restart="never" nodeType="tmRoot">
+        <p:cTn id="1" dur="indefinite" restart="never" nodeType="tmRoot">
           <p:childTnLst>
             <p:seq concurrent="1" nextAc="seek">
               <p:cTn id="2" dur="indefinite" nodeType="mainSeq">
@@ -7880,7 +7880,7 @@
         </p:nvSpPr>
         <p:spPr>
           <a:xfrm>
-            <a:off x="2411760" y="1052736"/>
+            <a:off x="4100551" y="1225900"/>
             <a:ext cx="274827" cy="5390299"/>
           </a:xfrm>
           <a:prstGeom prst="roundRect">
@@ -7921,7 +7921,7 @@
         </p:nvSpPr>
         <p:spPr>
           <a:xfrm>
-            <a:off x="2386628" y="6051970"/>
+            <a:off x="4075419" y="6225134"/>
             <a:ext cx="274194" cy="346328"/>
           </a:xfrm>
           <a:prstGeom prst="ellipse">
@@ -7964,7 +7964,7 @@
         </p:nvSpPr>
         <p:spPr>
           <a:xfrm>
-            <a:off x="2686587" y="5870050"/>
+            <a:off x="4375378" y="6043214"/>
             <a:ext cx="1466755" cy="577212"/>
           </a:xfrm>
           <a:prstGeom prst="roundRect">
@@ -8011,7 +8011,7 @@
         </p:nvSpPr>
         <p:spPr>
           <a:xfrm>
-            <a:off x="6732240" y="2060848"/>
+            <a:off x="1359986" y="1745166"/>
             <a:ext cx="274194" cy="346328"/>
           </a:xfrm>
           <a:prstGeom prst="ellipse">
@@ -8054,8 +8054,8 @@
         </p:nvSpPr>
         <p:spPr>
           <a:xfrm>
-            <a:off x="6732240" y="1196752"/>
-            <a:ext cx="1803906" cy="369332"/>
+            <a:off x="604101" y="1099688"/>
+            <a:ext cx="2060157" cy="369332"/>
           </a:xfrm>
           <a:prstGeom prst="rect">
             <a:avLst/>
@@ -8069,10 +8069,14 @@
           <a:lstStyle/>
           <a:p>
             <a:r>
-              <a:rPr lang="en-US" dirty="0" smtClean="0"/>
-              <a:t>Alice’s branches</a:t>
+              <a:rPr lang="en-US" i="1" dirty="0" smtClean="0"/>
+              <a:t>Alice’s </a:t>
             </a:r>
-            <a:endParaRPr lang="en-US" dirty="0"/>
+            <a:r>
+              <a:rPr lang="en-US" i="1" dirty="0" smtClean="0"/>
+              <a:t>branches:</a:t>
+            </a:r>
+            <a:endParaRPr lang="en-US" i="1" dirty="0"/>
           </a:p>
         </p:txBody>
       </p:sp>
@@ -8084,7 +8088,7 @@
         </p:nvSpPr>
         <p:spPr>
           <a:xfrm>
-            <a:off x="7164288" y="2060848"/>
+            <a:off x="1792034" y="1745166"/>
             <a:ext cx="1125638" cy="369332"/>
           </a:xfrm>
           <a:prstGeom prst="rect">
@@ -8114,7 +8118,7 @@
         </p:nvSpPr>
         <p:spPr>
           <a:xfrm>
-            <a:off x="6732240" y="2564904"/>
+            <a:off x="6076715" y="1782495"/>
             <a:ext cx="274194" cy="346328"/>
           </a:xfrm>
           <a:prstGeom prst="ellipse">
@@ -8158,7 +8162,7 @@
         </p:nvSpPr>
         <p:spPr>
           <a:xfrm>
-            <a:off x="7164288" y="2564904"/>
+            <a:off x="6474763" y="1782495"/>
             <a:ext cx="1125638" cy="369332"/>
           </a:xfrm>
           <a:prstGeom prst="rect">
@@ -8190,7 +8194,7 @@
         </p:nvCxnSpPr>
         <p:spPr>
           <a:xfrm flipV="1">
-            <a:off x="2523725" y="5489188"/>
+            <a:off x="4212516" y="5662352"/>
             <a:ext cx="425722" cy="562782"/>
           </a:xfrm>
           <a:prstGeom prst="line">
@@ -8220,7 +8224,7 @@
         </p:nvSpPr>
         <p:spPr>
           <a:xfrm>
-            <a:off x="3102719" y="5015231"/>
+            <a:off x="4791510" y="5188395"/>
             <a:ext cx="1432423" cy="577212"/>
           </a:xfrm>
           <a:prstGeom prst="roundRect">
@@ -8265,7 +8269,7 @@
         </p:nvSpPr>
         <p:spPr>
           <a:xfrm>
-            <a:off x="2826781" y="1808578"/>
+            <a:off x="4515572" y="1981742"/>
             <a:ext cx="245331" cy="3680610"/>
           </a:xfrm>
           <a:prstGeom prst="roundRect">
@@ -8306,7 +8310,7 @@
         </p:nvSpPr>
         <p:spPr>
           <a:xfrm>
-            <a:off x="2828525" y="5116243"/>
+            <a:off x="4517316" y="5289407"/>
             <a:ext cx="274194" cy="346328"/>
           </a:xfrm>
           <a:prstGeom prst="ellipse">
@@ -8350,7 +8354,7 @@
         </p:nvSpPr>
         <p:spPr>
           <a:xfrm>
-            <a:off x="2830269" y="4301813"/>
+            <a:off x="4519060" y="4474977"/>
             <a:ext cx="274194" cy="346328"/>
           </a:xfrm>
           <a:prstGeom prst="ellipse">
@@ -8394,7 +8398,7 @@
         </p:nvSpPr>
         <p:spPr>
           <a:xfrm>
-            <a:off x="3104464" y="4171941"/>
+            <a:off x="4793255" y="4345105"/>
             <a:ext cx="1430678" cy="577212"/>
           </a:xfrm>
           <a:prstGeom prst="roundRect">
@@ -8439,7 +8443,7 @@
         </p:nvSpPr>
         <p:spPr>
           <a:xfrm>
-            <a:off x="2401931" y="3825613"/>
+            <a:off x="4090722" y="3998777"/>
             <a:ext cx="274194" cy="346328"/>
           </a:xfrm>
           <a:prstGeom prst="ellipse">
@@ -8482,7 +8486,7 @@
         </p:nvSpPr>
         <p:spPr>
           <a:xfrm>
-            <a:off x="1055705" y="3724601"/>
+            <a:off x="2744496" y="3897765"/>
             <a:ext cx="1330922" cy="577212"/>
           </a:xfrm>
           <a:prstGeom prst="roundRect">
@@ -8529,7 +8533,7 @@
         </p:nvSpPr>
         <p:spPr>
           <a:xfrm>
-            <a:off x="1055706" y="3029147"/>
+            <a:off x="2744497" y="3202311"/>
             <a:ext cx="1330922" cy="577212"/>
           </a:xfrm>
           <a:prstGeom prst="roundRect">
@@ -8576,7 +8580,7 @@
         </p:nvSpPr>
         <p:spPr>
           <a:xfrm>
-            <a:off x="2386628" y="3166514"/>
+            <a:off x="4075419" y="3339678"/>
             <a:ext cx="274194" cy="346328"/>
           </a:xfrm>
           <a:prstGeom prst="ellipse">
@@ -8619,7 +8623,7 @@
         </p:nvSpPr>
         <p:spPr>
           <a:xfrm>
-            <a:off x="2797918" y="2820186"/>
+            <a:off x="4486709" y="2993350"/>
             <a:ext cx="274194" cy="346328"/>
           </a:xfrm>
           <a:prstGeom prst="ellipse">
@@ -8663,7 +8667,7 @@
         </p:nvSpPr>
         <p:spPr>
           <a:xfrm>
-            <a:off x="3104464" y="2740541"/>
+            <a:off x="4793255" y="2913705"/>
             <a:ext cx="1313802" cy="577212"/>
           </a:xfrm>
           <a:prstGeom prst="roundRect">
@@ -8708,7 +8712,7 @@
         </p:nvSpPr>
         <p:spPr>
           <a:xfrm>
-            <a:off x="2397090" y="2200843"/>
+            <a:off x="4085881" y="2374007"/>
             <a:ext cx="274194" cy="346328"/>
           </a:xfrm>
           <a:prstGeom prst="ellipse">
@@ -8751,7 +8755,7 @@
         </p:nvSpPr>
         <p:spPr>
           <a:xfrm>
-            <a:off x="1055705" y="2163329"/>
+            <a:off x="2744496" y="2336493"/>
             <a:ext cx="1330922" cy="577212"/>
           </a:xfrm>
           <a:prstGeom prst="roundRect">
@@ -8812,7 +8816,7 @@
         </p:blipFill>
         <p:spPr>
           <a:xfrm>
-            <a:off x="1304297" y="1078962"/>
+            <a:off x="2993088" y="1252126"/>
             <a:ext cx="359247" cy="469395"/>
           </a:xfrm>
           <a:prstGeom prst="rect">
@@ -8850,7 +8854,7 @@
         </p:blipFill>
         <p:spPr>
           <a:xfrm>
-            <a:off x="3163402" y="1573880"/>
+            <a:off x="4852193" y="1747044"/>
             <a:ext cx="359247" cy="469395"/>
           </a:xfrm>
           <a:prstGeom prst="rect">
@@ -8874,7 +8878,7 @@
         </p:nvSpPr>
         <p:spPr>
           <a:xfrm>
-            <a:off x="3163402" y="1978663"/>
+            <a:off x="4852193" y="2151827"/>
             <a:ext cx="633507" cy="369332"/>
           </a:xfrm>
           <a:prstGeom prst="rect">
@@ -8904,7 +8908,7 @@
         </p:nvSpPr>
         <p:spPr>
           <a:xfrm>
-            <a:off x="1210392" y="1429484"/>
+            <a:off x="2899183" y="1602648"/>
             <a:ext cx="633507" cy="369332"/>
           </a:xfrm>
           <a:prstGeom prst="rect">
@@ -8934,7 +8938,7 @@
         </p:nvSpPr>
         <p:spPr>
           <a:xfrm>
-            <a:off x="1763688" y="1124744"/>
+            <a:off x="3452479" y="1297908"/>
             <a:ext cx="1324558" cy="588263"/>
           </a:xfrm>
           <a:prstGeom prst="lightningBolt">
@@ -8969,43 +8973,13 @@
       </p:sp>
       <p:sp>
         <p:nvSpPr>
-          <p:cNvPr id="38" name="TextBox 37"/>
-          <p:cNvSpPr txBox="1"/>
-          <p:nvPr/>
-        </p:nvSpPr>
-        <p:spPr>
-          <a:xfrm>
-            <a:off x="3640642" y="1741120"/>
-            <a:ext cx="2339847" cy="369332"/>
-          </a:xfrm>
-          <a:prstGeom prst="rect">
-            <a:avLst/>
-          </a:prstGeom>
-          <a:noFill/>
-        </p:spPr>
-        <p:txBody>
-          <a:bodyPr wrap="square" rtlCol="0">
-            <a:spAutoFit/>
-          </a:bodyPr>
-          <a:lstStyle/>
-          <a:p>
-            <a:r>
-              <a:rPr lang="en-US" dirty="0" smtClean="0"/>
-              <a:t>CONFLICT </a:t>
-            </a:r>
-            <a:endParaRPr lang="en-US" dirty="0"/>
-          </a:p>
-        </p:txBody>
-      </p:sp>
-      <p:sp>
-        <p:nvSpPr>
           <p:cNvPr id="39" name="Oval 38"/>
           <p:cNvSpPr/>
           <p:nvPr/>
         </p:nvSpPr>
         <p:spPr>
           <a:xfrm>
-            <a:off x="2411760" y="980728"/>
+            <a:off x="4100551" y="1153892"/>
             <a:ext cx="216024" cy="216024"/>
           </a:xfrm>
           <a:prstGeom prst="ellipse">
@@ -9048,7 +9022,7 @@
         </p:nvSpPr>
         <p:spPr>
           <a:xfrm>
-            <a:off x="2677026" y="908720"/>
+            <a:off x="4365817" y="1081884"/>
             <a:ext cx="1208737" cy="404940"/>
           </a:xfrm>
           <a:prstGeom prst="roundRect">
@@ -9097,7 +9071,7 @@
         </p:nvCxnSpPr>
         <p:spPr>
           <a:xfrm>
-            <a:off x="2627784" y="1268760"/>
+            <a:off x="4316575" y="1441924"/>
             <a:ext cx="321663" cy="539818"/>
           </a:xfrm>
           <a:prstGeom prst="line">
@@ -9121,43 +9095,13 @@
       </p:cxnSp>
       <p:sp>
         <p:nvSpPr>
-          <p:cNvPr id="46" name="TextBox 45"/>
-          <p:cNvSpPr txBox="1"/>
-          <p:nvPr/>
-        </p:nvSpPr>
-        <p:spPr>
-          <a:xfrm>
-            <a:off x="4860032" y="908720"/>
-            <a:ext cx="521510" cy="369332"/>
-          </a:xfrm>
-          <a:prstGeom prst="rect">
-            <a:avLst/>
-          </a:prstGeom>
-          <a:noFill/>
-        </p:spPr>
-        <p:txBody>
-          <a:bodyPr wrap="square" rtlCol="0">
-            <a:spAutoFit/>
-          </a:bodyPr>
-          <a:lstStyle/>
-          <a:p>
-            <a:r>
-              <a:rPr lang="en-US" dirty="0" smtClean="0"/>
-              <a:t>M</a:t>
-            </a:r>
-            <a:endParaRPr lang="en-US" dirty="0"/>
-          </a:p>
-        </p:txBody>
-      </p:sp>
-      <p:sp>
-        <p:nvSpPr>
           <p:cNvPr id="45" name="Rounded Rectangle 44"/>
           <p:cNvSpPr/>
           <p:nvPr/>
         </p:nvSpPr>
         <p:spPr>
           <a:xfrm>
-            <a:off x="103243" y="3724601"/>
+            <a:off x="1792034" y="3897765"/>
             <a:ext cx="952462" cy="577212"/>
           </a:xfrm>
           <a:prstGeom prst="roundRect">
@@ -9204,7 +9148,7 @@
         </p:nvSpPr>
         <p:spPr>
           <a:xfrm>
-            <a:off x="4192035" y="5870050"/>
+            <a:off x="5880826" y="6043214"/>
             <a:ext cx="952462" cy="577212"/>
           </a:xfrm>
           <a:prstGeom prst="roundRect">
@@ -9251,15 +9195,16 @@
         </p:nvSpPr>
         <p:spPr>
           <a:xfrm>
-            <a:off x="4535142" y="4990885"/>
+            <a:off x="6223933" y="5164049"/>
             <a:ext cx="952462" cy="577212"/>
           </a:xfrm>
           <a:prstGeom prst="roundRect">
             <a:avLst/>
           </a:prstGeom>
           <a:solidFill>
-            <a:schemeClr val="bg1">
-              <a:lumMod val="50000"/>
+            <a:schemeClr val="tx1">
+              <a:lumMod val="90000"/>
+              <a:lumOff val="10000"/>
             </a:schemeClr>
           </a:solidFill>
         </p:spPr>
@@ -9283,7 +9228,7 @@
           <a:p>
             <a:pPr algn="ctr"/>
             <a:r>
-              <a:rPr lang="en-US" dirty="0" smtClean="0"/>
+              <a:rPr lang="en-US" dirty="0"/>
               <a:t>HEAD </a:t>
             </a:r>
             <a:endParaRPr lang="en-US" dirty="0"/>
@@ -9298,7 +9243,7 @@
         </p:nvSpPr>
         <p:spPr>
           <a:xfrm>
-            <a:off x="3885763" y="908720"/>
+            <a:off x="5574554" y="1081884"/>
             <a:ext cx="952462" cy="404940"/>
           </a:xfrm>
           <a:prstGeom prst="roundRect">
@@ -9345,7 +9290,55 @@
         </p:nvSpPr>
         <p:spPr>
           <a:xfrm>
-            <a:off x="4440076" y="2740541"/>
+            <a:off x="6128867" y="2913705"/>
+            <a:ext cx="952462" cy="577212"/>
+          </a:xfrm>
+          <a:prstGeom prst="roundRect">
+            <a:avLst/>
+          </a:prstGeom>
+          <a:solidFill>
+            <a:schemeClr val="tx1">
+              <a:lumMod val="90000"/>
+              <a:lumOff val="10000"/>
+            </a:schemeClr>
+          </a:solidFill>
+        </p:spPr>
+        <p:style>
+          <a:lnRef idx="1">
+            <a:schemeClr val="accent1"/>
+          </a:lnRef>
+          <a:fillRef idx="3">
+            <a:schemeClr val="accent1"/>
+          </a:fillRef>
+          <a:effectRef idx="2">
+            <a:schemeClr val="accent1"/>
+          </a:effectRef>
+          <a:fontRef idx="minor">
+            <a:schemeClr val="lt1"/>
+          </a:fontRef>
+        </p:style>
+        <p:txBody>
+          <a:bodyPr rtlCol="0" anchor="ctr"/>
+          <a:lstStyle/>
+          <a:p>
+            <a:pPr algn="ctr"/>
+            <a:r>
+              <a:rPr lang="en-US" dirty="0"/>
+              <a:t>HEAD </a:t>
+            </a:r>
+            <a:endParaRPr lang="en-US" dirty="0"/>
+          </a:p>
+        </p:txBody>
+      </p:sp>
+      <p:sp>
+        <p:nvSpPr>
+          <p:cNvPr id="54" name="Rounded Rectangle 53"/>
+          <p:cNvSpPr/>
+          <p:nvPr/>
+        </p:nvSpPr>
+        <p:spPr>
+          <a:xfrm>
+            <a:off x="1792034" y="2336493"/>
             <a:ext cx="952462" cy="577212"/>
           </a:xfrm>
           <a:prstGeom prst="roundRect">
@@ -9386,32 +9379,39 @@
       </p:sp>
       <p:sp>
         <p:nvSpPr>
-          <p:cNvPr id="54" name="Rounded Rectangle 53"/>
+          <p:cNvPr id="4" name="Explosion 2 3"/>
           <p:cNvSpPr/>
           <p:nvPr/>
         </p:nvSpPr>
         <p:spPr>
           <a:xfrm>
-            <a:off x="103243" y="2163329"/>
-            <a:ext cx="952462" cy="577212"/>
+            <a:off x="944479" y="1631989"/>
+            <a:ext cx="7632848" cy="5028985"/>
           </a:xfrm>
-          <a:prstGeom prst="roundRect">
+          <a:prstGeom prst="irregularSeal2">
             <a:avLst/>
           </a:prstGeom>
           <a:solidFill>
-            <a:schemeClr val="bg1">
-              <a:lumMod val="50000"/>
-            </a:schemeClr>
+            <a:srgbClr val="FF0000"/>
           </a:solidFill>
+          <a:ln w="76200">
+            <a:solidFill>
+              <a:srgbClr val="FF0096"/>
+            </a:solidFill>
+            <a:prstDash val="solid"/>
+            <a:bevel/>
+          </a:ln>
         </p:spPr>
         <p:style>
-          <a:lnRef idx="1">
-            <a:schemeClr val="accent1"/>
+          <a:lnRef idx="2">
+            <a:schemeClr val="accent1">
+              <a:shade val="50000"/>
+            </a:schemeClr>
           </a:lnRef>
-          <a:fillRef idx="3">
+          <a:fillRef idx="1">
             <a:schemeClr val="accent1"/>
           </a:fillRef>
-          <a:effectRef idx="2">
+          <a:effectRef idx="0">
             <a:schemeClr val="accent1"/>
           </a:effectRef>
           <a:fontRef idx="minor">
@@ -9423,11 +9423,48 @@
           <a:lstStyle/>
           <a:p>
             <a:pPr algn="ctr"/>
+            <a:endParaRPr lang="sv-SE"/>
+          </a:p>
+        </p:txBody>
+      </p:sp>
+      <p:sp>
+        <p:nvSpPr>
+          <p:cNvPr id="38" name="TextBox 37"/>
+          <p:cNvSpPr txBox="1"/>
+          <p:nvPr/>
+        </p:nvSpPr>
+        <p:spPr>
+          <a:xfrm>
+            <a:off x="1497083" y="3717854"/>
+            <a:ext cx="6211041" cy="1092607"/>
+          </a:xfrm>
+          <a:prstGeom prst="rect">
+            <a:avLst/>
+          </a:prstGeom>
+          <a:noFill/>
+        </p:spPr>
+        <p:txBody>
+          <a:bodyPr wrap="square" rtlCol="0">
+            <a:spAutoFit/>
+          </a:bodyPr>
+          <a:lstStyle/>
+          <a:p>
+            <a:pPr algn="ctr"/>
             <a:r>
-              <a:rPr lang="en-US" dirty="0" smtClean="0"/>
-              <a:t>HEAD </a:t>
+              <a:rPr lang="en-US" sz="6500" dirty="0" smtClean="0">
+                <a:solidFill>
+                  <a:srgbClr val="FFFF00"/>
+                </a:solidFill>
+                <a:latin typeface="Algerian" panose="04020705040A02060702" pitchFamily="82" charset="0"/>
+              </a:rPr>
+              <a:t>CONFLICT </a:t>
             </a:r>
-            <a:endParaRPr lang="en-US" dirty="0"/>
+            <a:endParaRPr lang="en-US" sz="6500" dirty="0">
+              <a:solidFill>
+                <a:srgbClr val="FFFF00"/>
+              </a:solidFill>
+              <a:latin typeface="Algerian" panose="04020705040A02060702" pitchFamily="82" charset="0"/>
+            </a:endParaRPr>
           </a:p>
         </p:txBody>
       </p:sp>
@@ -9444,7 +9481,7 @@
   <p:timing>
     <p:tnLst>
       <p:par>
-        <p:cTn xmlns:p14="http://schemas.microsoft.com/office/powerpoint/2010/main" id="1" dur="indefinite" restart="never" nodeType="tmRoot">
+        <p:cTn id="1" dur="indefinite" restart="never" nodeType="tmRoot">
           <p:childTnLst>
             <p:seq concurrent="1" nextAc="seek">
               <p:cTn id="2" dur="indefinite" nodeType="mainSeq">
@@ -12323,671 +12360,84 @@
                                   </p:childTnLst>
                                 </p:cTn>
                               </p:par>
-                            </p:childTnLst>
-                          </p:cTn>
-                        </p:par>
-                      </p:childTnLst>
-                    </p:cTn>
-                  </p:par>
-                  <p:par>
-                    <p:cTn id="139" fill="hold">
-                      <p:stCondLst>
-                        <p:cond delay="indefinite"/>
-                      </p:stCondLst>
-                      <p:childTnLst>
-                        <p:par>
-                          <p:cTn id="140" fill="hold">
-                            <p:stCondLst>
-                              <p:cond delay="0"/>
-                            </p:stCondLst>
-                            <p:childTnLst>
                               <p:par>
-                                <p:cTn id="141" presetID="43" presetClass="entr" presetSubtype="0" fill="hold" grpId="0" nodeType="clickEffect">
+                                <p:cTn id="139" presetID="47" presetClass="exit" presetSubtype="0" fill="hold" grpId="1" nodeType="withEffect">
                                   <p:stCondLst>
                                     <p:cond delay="0"/>
                                   </p:stCondLst>
                                   <p:childTnLst>
+                                    <p:animEffect transition="out" filter="fade">
+                                      <p:cBhvr>
+                                        <p:cTn id="140" dur="1000"/>
+                                        <p:tgtEl>
+                                          <p:spTgt spid="48"/>
+                                        </p:tgtEl>
+                                      </p:cBhvr>
+                                    </p:animEffect>
+                                    <p:anim calcmode="lin" valueType="num">
+                                      <p:cBhvr>
+                                        <p:cTn id="141" dur="1000"/>
+                                        <p:tgtEl>
+                                          <p:spTgt spid="48"/>
+                                        </p:tgtEl>
+                                        <p:attrNameLst>
+                                          <p:attrName>ppt_x</p:attrName>
+                                        </p:attrNameLst>
+                                      </p:cBhvr>
+                                      <p:tavLst>
+                                        <p:tav tm="0">
+                                          <p:val>
+                                            <p:strVal val="ppt_x"/>
+                                          </p:val>
+                                        </p:tav>
+                                        <p:tav tm="100000">
+                                          <p:val>
+                                            <p:strVal val="ppt_x"/>
+                                          </p:val>
+                                        </p:tav>
+                                      </p:tavLst>
+                                    </p:anim>
+                                    <p:anim calcmode="lin" valueType="num">
+                                      <p:cBhvr>
+                                        <p:cTn id="142" dur="1000"/>
+                                        <p:tgtEl>
+                                          <p:spTgt spid="48"/>
+                                        </p:tgtEl>
+                                        <p:attrNameLst>
+                                          <p:attrName>ppt_y</p:attrName>
+                                        </p:attrNameLst>
+                                      </p:cBhvr>
+                                      <p:tavLst>
+                                        <p:tav tm="0">
+                                          <p:val>
+                                            <p:strVal val="ppt_y"/>
+                                          </p:val>
+                                        </p:tav>
+                                        <p:tav tm="100000">
+                                          <p:val>
+                                            <p:strVal val="ppt_y-.1"/>
+                                          </p:val>
+                                        </p:tav>
+                                      </p:tavLst>
+                                    </p:anim>
                                     <p:set>
                                       <p:cBhvr>
-                                        <p:cTn id="142" dur="1" fill="hold">
-                                          <p:stCondLst>
-                                            <p:cond delay="0"/>
-                                          </p:stCondLst>
-                                        </p:cTn>
-                                        <p:tgtEl>
-                                          <p:spTgt spid="27"/>
+                                        <p:cTn id="143" dur="1" fill="hold">
+                                          <p:stCondLst>
+                                            <p:cond delay="999"/>
+                                          </p:stCondLst>
+                                        </p:cTn>
+                                        <p:tgtEl>
+                                          <p:spTgt spid="48"/>
                                         </p:tgtEl>
                                         <p:attrNameLst>
                                           <p:attrName>style.visibility</p:attrName>
                                         </p:attrNameLst>
                                       </p:cBhvr>
                                       <p:to>
-                                        <p:strVal val="visible"/>
+                                        <p:strVal val="hidden"/>
                                       </p:to>
                                     </p:set>
-                                    <p:animEffect transition="in" filter="fade">
-                                      <p:cBhvr>
-                                        <p:cTn id="143" dur="100"/>
-                                        <p:tgtEl>
-                                          <p:spTgt spid="27"/>
-                                        </p:tgtEl>
-                                      </p:cBhvr>
-                                    </p:animEffect>
-                                    <p:anim calcmode="lin" valueType="num">
-                                      <p:cBhvr>
-                                        <p:cTn id="144" dur="400" fill="hold"/>
-                                        <p:tgtEl>
-                                          <p:spTgt spid="27"/>
-                                        </p:tgtEl>
-                                        <p:attrNameLst>
-                                          <p:attrName>ppt_x</p:attrName>
-                                        </p:attrNameLst>
-                                      </p:cBhvr>
-                                      <p:tavLst>
-                                        <p:tav tm="0">
-                                          <p:val>
-                                            <p:strVal val="#ppt_x"/>
-                                          </p:val>
-                                        </p:tav>
-                                        <p:tav tm="100000">
-                                          <p:val>
-                                            <p:strVal val="#ppt_x"/>
-                                          </p:val>
-                                        </p:tav>
-                                      </p:tavLst>
-                                    </p:anim>
-                                    <p:anim calcmode="lin" valueType="num">
-                                      <p:cBhvr>
-                                        <p:cTn id="145" dur="400" fill="hold"/>
-                                        <p:tgtEl>
-                                          <p:spTgt spid="27"/>
-                                        </p:tgtEl>
-                                        <p:attrNameLst>
-                                          <p:attrName>ppt_y</p:attrName>
-                                        </p:attrNameLst>
-                                      </p:cBhvr>
-                                      <p:tavLst>
-                                        <p:tav tm="0">
-                                          <p:val>
-                                            <p:strVal val="#ppt_y+0.31"/>
-                                          </p:val>
-                                        </p:tav>
-                                        <p:tav tm="100000">
-                                          <p:val>
-                                            <p:strVal val="#ppt_y+0.31"/>
-                                          </p:val>
-                                        </p:tav>
-                                      </p:tavLst>
-                                    </p:anim>
-                                    <p:anim calcmode="lin" valueType="num">
-                                      <p:cBhvr>
-                                        <p:cTn id="146" dur="600" decel="50000" fill="hold">
-                                          <p:stCondLst>
-                                            <p:cond delay="400"/>
-                                          </p:stCondLst>
-                                        </p:cTn>
-                                        <p:tgtEl>
-                                          <p:spTgt spid="27"/>
-                                        </p:tgtEl>
-                                        <p:attrNameLst>
-                                          <p:attrName>ppt_x</p:attrName>
-                                        </p:attrNameLst>
-                                      </p:cBhvr>
-                                      <p:tavLst>
-                                        <p:tav tm="0">
-                                          <p:val>
-                                            <p:strVal val="#ppt_x"/>
-                                          </p:val>
-                                        </p:tav>
-                                        <p:tav tm="5000">
-                                          <p:val>
-                                            <p:strVal val="#ppt_x+0.0242"/>
-                                          </p:val>
-                                        </p:tav>
-                                        <p:tav tm="10000">
-                                          <p:val>
-                                            <p:strVal val="#ppt_x+0.0479"/>
-                                          </p:val>
-                                        </p:tav>
-                                        <p:tav tm="15000">
-                                          <p:val>
-                                            <p:strVal val="#ppt_x+0.0704"/>
-                                          </p:val>
-                                        </p:tav>
-                                        <p:tav tm="20000">
-                                          <p:val>
-                                            <p:strVal val="#ppt_x+0.0911"/>
-                                          </p:val>
-                                        </p:tav>
-                                        <p:tav tm="25000">
-                                          <p:val>
-                                            <p:strVal val="#ppt_x+0.1096"/>
-                                          </p:val>
-                                        </p:tav>
-                                        <p:tav tm="30000">
-                                          <p:val>
-                                            <p:strVal val="#ppt_x+0.1254"/>
-                                          </p:val>
-                                        </p:tav>
-                                        <p:tav tm="35000">
-                                          <p:val>
-                                            <p:strVal val="#ppt_x+0.1381"/>
-                                          </p:val>
-                                        </p:tav>
-                                        <p:tav tm="40000">
-                                          <p:val>
-                                            <p:strVal val="#ppt_x+0.1474"/>
-                                          </p:val>
-                                        </p:tav>
-                                        <p:tav tm="45000">
-                                          <p:val>
-                                            <p:strVal val="#ppt_x+0.1531"/>
-                                          </p:val>
-                                        </p:tav>
-                                        <p:tav tm="50000">
-                                          <p:val>
-                                            <p:strVal val="#ppt_x+0.1550"/>
-                                          </p:val>
-                                        </p:tav>
-                                        <p:tav tm="55000">
-                                          <p:val>
-                                            <p:strVal val="#ppt_x+0.1531"/>
-                                          </p:val>
-                                        </p:tav>
-                                        <p:tav tm="60000">
-                                          <p:val>
-                                            <p:strVal val="#ppt_x+0.1474"/>
-                                          </p:val>
-                                        </p:tav>
-                                        <p:tav tm="65000">
-                                          <p:val>
-                                            <p:strVal val="#ppt_x+0.1381"/>
-                                          </p:val>
-                                        </p:tav>
-                                        <p:tav tm="70000">
-                                          <p:val>
-                                            <p:strVal val="#ppt_x+0.1254"/>
-                                          </p:val>
-                                        </p:tav>
-                                        <p:tav tm="75000">
-                                          <p:val>
-                                            <p:strVal val="#ppt_x+0.1096"/>
-                                          </p:val>
-                                        </p:tav>
-                                        <p:tav tm="80000">
-                                          <p:val>
-                                            <p:strVal val="#ppt_x+0.0911"/>
-                                          </p:val>
-                                        </p:tav>
-                                        <p:tav tm="85000">
-                                          <p:val>
-                                            <p:strVal val="#ppt_x+0.0704"/>
-                                          </p:val>
-                                        </p:tav>
-                                        <p:tav tm="90000">
-                                          <p:val>
-                                            <p:strVal val="#ppt_x+0.0479"/>
-                                          </p:val>
-                                        </p:tav>
-                                        <p:tav tm="95000">
-                                          <p:val>
-                                            <p:strVal val="#ppt_x+0.0242"/>
-                                          </p:val>
-                                        </p:tav>
-                                        <p:tav tm="100000">
-                                          <p:val>
-                                            <p:strVal val="#ppt_x"/>
-                                          </p:val>
-                                        </p:tav>
-                                      </p:tavLst>
-                                    </p:anim>
-                                    <p:anim calcmode="lin" valueType="num">
-                                      <p:cBhvr>
-                                        <p:cTn id="147" dur="600" decel="50000" fill="hold">
-                                          <p:stCondLst>
-                                            <p:cond delay="400"/>
-                                          </p:stCondLst>
-                                        </p:cTn>
-                                        <p:tgtEl>
-                                          <p:spTgt spid="27"/>
-                                        </p:tgtEl>
-                                        <p:attrNameLst>
-                                          <p:attrName>ppt_y</p:attrName>
-                                        </p:attrNameLst>
-                                      </p:cBhvr>
-                                      <p:tavLst>
-                                        <p:tav tm="0">
-                                          <p:val>
-                                            <p:strVal val="#ppt_y+0.31"/>
-                                          </p:val>
-                                        </p:tav>
-                                        <p:tav tm="5000">
-                                          <p:val>
-                                            <p:strVal val="#ppt_y+0.308"/>
-                                          </p:val>
-                                        </p:tav>
-                                        <p:tav tm="10000">
-                                          <p:val>
-                                            <p:strVal val="#ppt_y+0.3024"/>
-                                          </p:val>
-                                        </p:tav>
-                                        <p:tav tm="15000">
-                                          <p:val>
-                                            <p:strVal val="#ppt_y+0.2931"/>
-                                          </p:val>
-                                        </p:tav>
-                                        <p:tav tm="20000">
-                                          <p:val>
-                                            <p:strVal val="#ppt_y+0.2804"/>
-                                          </p:val>
-                                        </p:tav>
-                                        <p:tav tm="25000">
-                                          <p:val>
-                                            <p:strVal val="#ppt_y+0.2646"/>
-                                          </p:val>
-                                        </p:tav>
-                                        <p:tav tm="30000">
-                                          <p:val>
-                                            <p:strVal val="#ppt_y+0.2461"/>
-                                          </p:val>
-                                        </p:tav>
-                                        <p:tav tm="35000">
-                                          <p:val>
-                                            <p:strVal val="#ppt_y+0.2253"/>
-                                          </p:val>
-                                        </p:tav>
-                                        <p:tav tm="40000">
-                                          <p:val>
-                                            <p:strVal val="#ppt_y+0.2029"/>
-                                          </p:val>
-                                        </p:tav>
-                                        <p:tav tm="45000">
-                                          <p:val>
-                                            <p:strVal val="#ppt_y+0.1792"/>
-                                          </p:val>
-                                        </p:tav>
-                                        <p:tav tm="50000">
-                                          <p:val>
-                                            <p:strVal val="#ppt_y+0.155"/>
-                                          </p:val>
-                                        </p:tav>
-                                        <p:tav tm="55000">
-                                          <p:val>
-                                            <p:strVal val="#ppt_y+0.1307"/>
-                                          </p:val>
-                                        </p:tav>
-                                        <p:tav tm="60000">
-                                          <p:val>
-                                            <p:strVal val="#ppt_y+0.1071"/>
-                                          </p:val>
-                                        </p:tav>
-                                        <p:tav tm="65000">
-                                          <p:val>
-                                            <p:strVal val="#ppt_y+0.0846"/>
-                                          </p:val>
-                                        </p:tav>
-                                        <p:tav tm="70000">
-                                          <p:val>
-                                            <p:strVal val="#ppt_y+0.0639"/>
-                                          </p:val>
-                                        </p:tav>
-                                        <p:tav tm="75000">
-                                          <p:val>
-                                            <p:strVal val="#ppt_y+0.0454"/>
-                                          </p:val>
-                                        </p:tav>
-                                        <p:tav tm="80000">
-                                          <p:val>
-                                            <p:strVal val="#ppt_y+0.0296"/>
-                                          </p:val>
-                                        </p:tav>
-                                        <p:tav tm="85000">
-                                          <p:val>
-                                            <p:strVal val="#ppt_y+0.0169"/>
-                                          </p:val>
-                                        </p:tav>
-                                        <p:tav tm="90000">
-                                          <p:val>
-                                            <p:strVal val="#ppt_y+0.0076"/>
-                                          </p:val>
-                                        </p:tav>
-                                        <p:tav tm="95000">
-                                          <p:val>
-                                            <p:strVal val="#ppt_y+0.0019"/>
-                                          </p:val>
-                                        </p:tav>
-                                        <p:tav tm="100000">
-                                          <p:val>
-                                            <p:strVal val="#ppt_y"/>
-                                          </p:val>
-                                        </p:tav>
-                                      </p:tavLst>
-                                    </p:anim>
-                                  </p:childTnLst>
-                                </p:cTn>
-                              </p:par>
-                              <p:par>
-                                <p:cTn id="148" presetID="43" presetClass="entr" presetSubtype="0" fill="hold" grpId="0" nodeType="withEffect">
-                                  <p:stCondLst>
-                                    <p:cond delay="0"/>
-                                  </p:stCondLst>
-                                  <p:childTnLst>
-                                    <p:set>
-                                      <p:cBhvr>
-                                        <p:cTn id="149" dur="1" fill="hold">
-                                          <p:stCondLst>
-                                            <p:cond delay="0"/>
-                                          </p:stCondLst>
-                                        </p:cTn>
-                                        <p:tgtEl>
-                                          <p:spTgt spid="28"/>
-                                        </p:tgtEl>
-                                        <p:attrNameLst>
-                                          <p:attrName>style.visibility</p:attrName>
-                                        </p:attrNameLst>
-                                      </p:cBhvr>
-                                      <p:to>
-                                        <p:strVal val="visible"/>
-                                      </p:to>
-                                    </p:set>
-                                    <p:animEffect transition="in" filter="fade">
-                                      <p:cBhvr>
-                                        <p:cTn id="150" dur="100"/>
-                                        <p:tgtEl>
-                                          <p:spTgt spid="28"/>
-                                        </p:tgtEl>
-                                      </p:cBhvr>
-                                    </p:animEffect>
-                                    <p:anim calcmode="lin" valueType="num">
-                                      <p:cBhvr>
-                                        <p:cTn id="151" dur="400" fill="hold"/>
-                                        <p:tgtEl>
-                                          <p:spTgt spid="28"/>
-                                        </p:tgtEl>
-                                        <p:attrNameLst>
-                                          <p:attrName>ppt_x</p:attrName>
-                                        </p:attrNameLst>
-                                      </p:cBhvr>
-                                      <p:tavLst>
-                                        <p:tav tm="0">
-                                          <p:val>
-                                            <p:strVal val="#ppt_x"/>
-                                          </p:val>
-                                        </p:tav>
-                                        <p:tav tm="100000">
-                                          <p:val>
-                                            <p:strVal val="#ppt_x"/>
-                                          </p:val>
-                                        </p:tav>
-                                      </p:tavLst>
-                                    </p:anim>
-                                    <p:anim calcmode="lin" valueType="num">
-                                      <p:cBhvr>
-                                        <p:cTn id="152" dur="400" fill="hold"/>
-                                        <p:tgtEl>
-                                          <p:spTgt spid="28"/>
-                                        </p:tgtEl>
-                                        <p:attrNameLst>
-                                          <p:attrName>ppt_y</p:attrName>
-                                        </p:attrNameLst>
-                                      </p:cBhvr>
-                                      <p:tavLst>
-                                        <p:tav tm="0">
-                                          <p:val>
-                                            <p:strVal val="#ppt_y+0.31"/>
-                                          </p:val>
-                                        </p:tav>
-                                        <p:tav tm="100000">
-                                          <p:val>
-                                            <p:strVal val="#ppt_y+0.31"/>
-                                          </p:val>
-                                        </p:tav>
-                                      </p:tavLst>
-                                    </p:anim>
-                                    <p:anim calcmode="lin" valueType="num">
-                                      <p:cBhvr>
-                                        <p:cTn id="153" dur="600" decel="50000" fill="hold">
-                                          <p:stCondLst>
-                                            <p:cond delay="400"/>
-                                          </p:stCondLst>
-                                        </p:cTn>
-                                        <p:tgtEl>
-                                          <p:spTgt spid="28"/>
-                                        </p:tgtEl>
-                                        <p:attrNameLst>
-                                          <p:attrName>ppt_x</p:attrName>
-                                        </p:attrNameLst>
-                                      </p:cBhvr>
-                                      <p:tavLst>
-                                        <p:tav tm="0">
-                                          <p:val>
-                                            <p:strVal val="#ppt_x"/>
-                                          </p:val>
-                                        </p:tav>
-                                        <p:tav tm="5000">
-                                          <p:val>
-                                            <p:strVal val="#ppt_x+0.0242"/>
-                                          </p:val>
-                                        </p:tav>
-                                        <p:tav tm="10000">
-                                          <p:val>
-                                            <p:strVal val="#ppt_x+0.0479"/>
-                                          </p:val>
-                                        </p:tav>
-                                        <p:tav tm="15000">
-                                          <p:val>
-                                            <p:strVal val="#ppt_x+0.0704"/>
-                                          </p:val>
-                                        </p:tav>
-                                        <p:tav tm="20000">
-                                          <p:val>
-                                            <p:strVal val="#ppt_x+0.0911"/>
-                                          </p:val>
-                                        </p:tav>
-                                        <p:tav tm="25000">
-                                          <p:val>
-                                            <p:strVal val="#ppt_x+0.1096"/>
-                                          </p:val>
-                                        </p:tav>
-                                        <p:tav tm="30000">
-                                          <p:val>
-                                            <p:strVal val="#ppt_x+0.1254"/>
-                                          </p:val>
-                                        </p:tav>
-                                        <p:tav tm="35000">
-                                          <p:val>
-                                            <p:strVal val="#ppt_x+0.1381"/>
-                                          </p:val>
-                                        </p:tav>
-                                        <p:tav tm="40000">
-                                          <p:val>
-                                            <p:strVal val="#ppt_x+0.1474"/>
-                                          </p:val>
-                                        </p:tav>
-                                        <p:tav tm="45000">
-                                          <p:val>
-                                            <p:strVal val="#ppt_x+0.1531"/>
-                                          </p:val>
-                                        </p:tav>
-                                        <p:tav tm="50000">
-                                          <p:val>
-                                            <p:strVal val="#ppt_x+0.1550"/>
-                                          </p:val>
-                                        </p:tav>
-                                        <p:tav tm="55000">
-                                          <p:val>
-                                            <p:strVal val="#ppt_x+0.1531"/>
-                                          </p:val>
-                                        </p:tav>
-                                        <p:tav tm="60000">
-                                          <p:val>
-                                            <p:strVal val="#ppt_x+0.1474"/>
-                                          </p:val>
-                                        </p:tav>
-                                        <p:tav tm="65000">
-                                          <p:val>
-                                            <p:strVal val="#ppt_x+0.1381"/>
-                                          </p:val>
-                                        </p:tav>
-                                        <p:tav tm="70000">
-                                          <p:val>
-                                            <p:strVal val="#ppt_x+0.1254"/>
-                                          </p:val>
-                                        </p:tav>
-                                        <p:tav tm="75000">
-                                          <p:val>
-                                            <p:strVal val="#ppt_x+0.1096"/>
-                                          </p:val>
-                                        </p:tav>
-                                        <p:tav tm="80000">
-                                          <p:val>
-                                            <p:strVal val="#ppt_x+0.0911"/>
-                                          </p:val>
-                                        </p:tav>
-                                        <p:tav tm="85000">
-                                          <p:val>
-                                            <p:strVal val="#ppt_x+0.0704"/>
-                                          </p:val>
-                                        </p:tav>
-                                        <p:tav tm="90000">
-                                          <p:val>
-                                            <p:strVal val="#ppt_x+0.0479"/>
-                                          </p:val>
-                                        </p:tav>
-                                        <p:tav tm="95000">
-                                          <p:val>
-                                            <p:strVal val="#ppt_x+0.0242"/>
-                                          </p:val>
-                                        </p:tav>
-                                        <p:tav tm="100000">
-                                          <p:val>
-                                            <p:strVal val="#ppt_x"/>
-                                          </p:val>
-                                        </p:tav>
-                                      </p:tavLst>
-                                    </p:anim>
-                                    <p:anim calcmode="lin" valueType="num">
-                                      <p:cBhvr>
-                                        <p:cTn id="154" dur="600" decel="50000" fill="hold">
-                                          <p:stCondLst>
-                                            <p:cond delay="400"/>
-                                          </p:stCondLst>
-                                        </p:cTn>
-                                        <p:tgtEl>
-                                          <p:spTgt spid="28"/>
-                                        </p:tgtEl>
-                                        <p:attrNameLst>
-                                          <p:attrName>ppt_y</p:attrName>
-                                        </p:attrNameLst>
-                                      </p:cBhvr>
-                                      <p:tavLst>
-                                        <p:tav tm="0">
-                                          <p:val>
-                                            <p:strVal val="#ppt_y+0.31"/>
-                                          </p:val>
-                                        </p:tav>
-                                        <p:tav tm="5000">
-                                          <p:val>
-                                            <p:strVal val="#ppt_y+0.308"/>
-                                          </p:val>
-                                        </p:tav>
-                                        <p:tav tm="10000">
-                                          <p:val>
-                                            <p:strVal val="#ppt_y+0.3024"/>
-                                          </p:val>
-                                        </p:tav>
-                                        <p:tav tm="15000">
-                                          <p:val>
-                                            <p:strVal val="#ppt_y+0.2931"/>
-                                          </p:val>
-                                        </p:tav>
-                                        <p:tav tm="20000">
-                                          <p:val>
-                                            <p:strVal val="#ppt_y+0.2804"/>
-                                          </p:val>
-                                        </p:tav>
-                                        <p:tav tm="25000">
-                                          <p:val>
-                                            <p:strVal val="#ppt_y+0.2646"/>
-                                          </p:val>
-                                        </p:tav>
-                                        <p:tav tm="30000">
-                                          <p:val>
-                                            <p:strVal val="#ppt_y+0.2461"/>
-                                          </p:val>
-                                        </p:tav>
-                                        <p:tav tm="35000">
-                                          <p:val>
-                                            <p:strVal val="#ppt_y+0.2253"/>
-                                          </p:val>
-                                        </p:tav>
-                                        <p:tav tm="40000">
-                                          <p:val>
-                                            <p:strVal val="#ppt_y+0.2029"/>
-                                          </p:val>
-                                        </p:tav>
-                                        <p:tav tm="45000">
-                                          <p:val>
-                                            <p:strVal val="#ppt_y+0.1792"/>
-                                          </p:val>
-                                        </p:tav>
-                                        <p:tav tm="50000">
-                                          <p:val>
-                                            <p:strVal val="#ppt_y+0.155"/>
-                                          </p:val>
-                                        </p:tav>
-                                        <p:tav tm="55000">
-                                          <p:val>
-                                            <p:strVal val="#ppt_y+0.1307"/>
-                                          </p:val>
-                                        </p:tav>
-                                        <p:tav tm="60000">
-                                          <p:val>
-                                            <p:strVal val="#ppt_y+0.1071"/>
-                                          </p:val>
-                                        </p:tav>
-                                        <p:tav tm="65000">
-                                          <p:val>
-                                            <p:strVal val="#ppt_y+0.0846"/>
-                                          </p:val>
-                                        </p:tav>
-                                        <p:tav tm="70000">
-                                          <p:val>
-                                            <p:strVal val="#ppt_y+0.0639"/>
-                                          </p:val>
-                                        </p:tav>
-                                        <p:tav tm="75000">
-                                          <p:val>
-                                            <p:strVal val="#ppt_y+0.0454"/>
-                                          </p:val>
-                                        </p:tav>
-                                        <p:tav tm="80000">
-                                          <p:val>
-                                            <p:strVal val="#ppt_y+0.0296"/>
-                                          </p:val>
-                                        </p:tav>
-                                        <p:tav tm="85000">
-                                          <p:val>
-                                            <p:strVal val="#ppt_y+0.0169"/>
-                                          </p:val>
-                                        </p:tav>
-                                        <p:tav tm="90000">
-                                          <p:val>
-                                            <p:strVal val="#ppt_y+0.0076"/>
-                                          </p:val>
-                                        </p:tav>
-                                        <p:tav tm="95000">
-                                          <p:val>
-                                            <p:strVal val="#ppt_y+0.0019"/>
-                                          </p:val>
-                                        </p:tav>
-                                        <p:tav tm="100000">
-                                          <p:val>
-                                            <p:strVal val="#ppt_y"/>
-                                          </p:val>
-                                        </p:tav>
-                                      </p:tavLst>
-                                    </p:anim>
                                   </p:childTnLst>
                                 </p:cTn>
                               </p:par>
@@ -12998,32 +12448,32 @@
                     </p:cTn>
                   </p:par>
                   <p:par>
-                    <p:cTn id="155" fill="hold">
+                    <p:cTn id="144" fill="hold">
                       <p:stCondLst>
                         <p:cond delay="indefinite"/>
                       </p:stCondLst>
                       <p:childTnLst>
                         <p:par>
-                          <p:cTn id="156" fill="hold">
+                          <p:cTn id="145" fill="hold">
                             <p:stCondLst>
                               <p:cond delay="0"/>
                             </p:stCondLst>
                             <p:childTnLst>
                               <p:par>
-                                <p:cTn id="157" presetID="43" presetClass="entr" presetSubtype="0" fill="hold" grpId="0" nodeType="clickEffect">
+                                <p:cTn id="146" presetID="43" presetClass="entr" presetSubtype="0" fill="hold" grpId="0" nodeType="clickEffect">
                                   <p:stCondLst>
                                     <p:cond delay="0"/>
                                   </p:stCondLst>
                                   <p:childTnLst>
                                     <p:set>
                                       <p:cBhvr>
-                                        <p:cTn id="158" dur="1" fill="hold">
+                                        <p:cTn id="147" dur="1" fill="hold">
                                           <p:stCondLst>
                                             <p:cond delay="0"/>
                                           </p:stCondLst>
                                         </p:cTn>
                                         <p:tgtEl>
-                                          <p:spTgt spid="54"/>
+                                          <p:spTgt spid="27"/>
                                         </p:tgtEl>
                                         <p:attrNameLst>
                                           <p:attrName>style.visibility</p:attrName>
@@ -13035,17 +12485,17 @@
                                     </p:set>
                                     <p:animEffect transition="in" filter="fade">
                                       <p:cBhvr>
-                                        <p:cTn id="159" dur="100"/>
-                                        <p:tgtEl>
-                                          <p:spTgt spid="54"/>
+                                        <p:cTn id="148" dur="100"/>
+                                        <p:tgtEl>
+                                          <p:spTgt spid="27"/>
                                         </p:tgtEl>
                                       </p:cBhvr>
                                     </p:animEffect>
                                     <p:anim calcmode="lin" valueType="num">
                                       <p:cBhvr>
-                                        <p:cTn id="160" dur="400" fill="hold"/>
-                                        <p:tgtEl>
-                                          <p:spTgt spid="54"/>
+                                        <p:cTn id="149" dur="400" fill="hold"/>
+                                        <p:tgtEl>
+                                          <p:spTgt spid="27"/>
                                         </p:tgtEl>
                                         <p:attrNameLst>
                                           <p:attrName>ppt_x</p:attrName>
@@ -13066,9 +12516,9 @@
                                     </p:anim>
                                     <p:anim calcmode="lin" valueType="num">
                                       <p:cBhvr>
-                                        <p:cTn id="161" dur="400" fill="hold"/>
-                                        <p:tgtEl>
-                                          <p:spTgt spid="54"/>
+                                        <p:cTn id="150" dur="400" fill="hold"/>
+                                        <p:tgtEl>
+                                          <p:spTgt spid="27"/>
                                         </p:tgtEl>
                                         <p:attrNameLst>
                                           <p:attrName>ppt_y</p:attrName>
@@ -13089,13 +12539,13 @@
                                     </p:anim>
                                     <p:anim calcmode="lin" valueType="num">
                                       <p:cBhvr>
-                                        <p:cTn id="162" dur="600" decel="50000" fill="hold">
+                                        <p:cTn id="151" dur="600" decel="50000" fill="hold">
                                           <p:stCondLst>
                                             <p:cond delay="400"/>
                                           </p:stCondLst>
                                         </p:cTn>
                                         <p:tgtEl>
-                                          <p:spTgt spid="54"/>
+                                          <p:spTgt spid="27"/>
                                         </p:tgtEl>
                                         <p:attrNameLst>
                                           <p:attrName>ppt_x</p:attrName>
@@ -13211,13 +12661,338 @@
                                     </p:anim>
                                     <p:anim calcmode="lin" valueType="num">
                                       <p:cBhvr>
-                                        <p:cTn id="163" dur="600" decel="50000" fill="hold">
+                                        <p:cTn id="152" dur="600" decel="50000" fill="hold">
                                           <p:stCondLst>
                                             <p:cond delay="400"/>
                                           </p:stCondLst>
                                         </p:cTn>
                                         <p:tgtEl>
-                                          <p:spTgt spid="54"/>
+                                          <p:spTgt spid="27"/>
+                                        </p:tgtEl>
+                                        <p:attrNameLst>
+                                          <p:attrName>ppt_y</p:attrName>
+                                        </p:attrNameLst>
+                                      </p:cBhvr>
+                                      <p:tavLst>
+                                        <p:tav tm="0">
+                                          <p:val>
+                                            <p:strVal val="#ppt_y+0.31"/>
+                                          </p:val>
+                                        </p:tav>
+                                        <p:tav tm="5000">
+                                          <p:val>
+                                            <p:strVal val="#ppt_y+0.308"/>
+                                          </p:val>
+                                        </p:tav>
+                                        <p:tav tm="10000">
+                                          <p:val>
+                                            <p:strVal val="#ppt_y+0.3024"/>
+                                          </p:val>
+                                        </p:tav>
+                                        <p:tav tm="15000">
+                                          <p:val>
+                                            <p:strVal val="#ppt_y+0.2931"/>
+                                          </p:val>
+                                        </p:tav>
+                                        <p:tav tm="20000">
+                                          <p:val>
+                                            <p:strVal val="#ppt_y+0.2804"/>
+                                          </p:val>
+                                        </p:tav>
+                                        <p:tav tm="25000">
+                                          <p:val>
+                                            <p:strVal val="#ppt_y+0.2646"/>
+                                          </p:val>
+                                        </p:tav>
+                                        <p:tav tm="30000">
+                                          <p:val>
+                                            <p:strVal val="#ppt_y+0.2461"/>
+                                          </p:val>
+                                        </p:tav>
+                                        <p:tav tm="35000">
+                                          <p:val>
+                                            <p:strVal val="#ppt_y+0.2253"/>
+                                          </p:val>
+                                        </p:tav>
+                                        <p:tav tm="40000">
+                                          <p:val>
+                                            <p:strVal val="#ppt_y+0.2029"/>
+                                          </p:val>
+                                        </p:tav>
+                                        <p:tav tm="45000">
+                                          <p:val>
+                                            <p:strVal val="#ppt_y+0.1792"/>
+                                          </p:val>
+                                        </p:tav>
+                                        <p:tav tm="50000">
+                                          <p:val>
+                                            <p:strVal val="#ppt_y+0.155"/>
+                                          </p:val>
+                                        </p:tav>
+                                        <p:tav tm="55000">
+                                          <p:val>
+                                            <p:strVal val="#ppt_y+0.1307"/>
+                                          </p:val>
+                                        </p:tav>
+                                        <p:tav tm="60000">
+                                          <p:val>
+                                            <p:strVal val="#ppt_y+0.1071"/>
+                                          </p:val>
+                                        </p:tav>
+                                        <p:tav tm="65000">
+                                          <p:val>
+                                            <p:strVal val="#ppt_y+0.0846"/>
+                                          </p:val>
+                                        </p:tav>
+                                        <p:tav tm="70000">
+                                          <p:val>
+                                            <p:strVal val="#ppt_y+0.0639"/>
+                                          </p:val>
+                                        </p:tav>
+                                        <p:tav tm="75000">
+                                          <p:val>
+                                            <p:strVal val="#ppt_y+0.0454"/>
+                                          </p:val>
+                                        </p:tav>
+                                        <p:tav tm="80000">
+                                          <p:val>
+                                            <p:strVal val="#ppt_y+0.0296"/>
+                                          </p:val>
+                                        </p:tav>
+                                        <p:tav tm="85000">
+                                          <p:val>
+                                            <p:strVal val="#ppt_y+0.0169"/>
+                                          </p:val>
+                                        </p:tav>
+                                        <p:tav tm="90000">
+                                          <p:val>
+                                            <p:strVal val="#ppt_y+0.0076"/>
+                                          </p:val>
+                                        </p:tav>
+                                        <p:tav tm="95000">
+                                          <p:val>
+                                            <p:strVal val="#ppt_y+0.0019"/>
+                                          </p:val>
+                                        </p:tav>
+                                        <p:tav tm="100000">
+                                          <p:val>
+                                            <p:strVal val="#ppt_y"/>
+                                          </p:val>
+                                        </p:tav>
+                                      </p:tavLst>
+                                    </p:anim>
+                                  </p:childTnLst>
+                                </p:cTn>
+                              </p:par>
+                              <p:par>
+                                <p:cTn id="153" presetID="43" presetClass="entr" presetSubtype="0" fill="hold" grpId="0" nodeType="withEffect">
+                                  <p:stCondLst>
+                                    <p:cond delay="0"/>
+                                  </p:stCondLst>
+                                  <p:childTnLst>
+                                    <p:set>
+                                      <p:cBhvr>
+                                        <p:cTn id="154" dur="1" fill="hold">
+                                          <p:stCondLst>
+                                            <p:cond delay="0"/>
+                                          </p:stCondLst>
+                                        </p:cTn>
+                                        <p:tgtEl>
+                                          <p:spTgt spid="28"/>
+                                        </p:tgtEl>
+                                        <p:attrNameLst>
+                                          <p:attrName>style.visibility</p:attrName>
+                                        </p:attrNameLst>
+                                      </p:cBhvr>
+                                      <p:to>
+                                        <p:strVal val="visible"/>
+                                      </p:to>
+                                    </p:set>
+                                    <p:animEffect transition="in" filter="fade">
+                                      <p:cBhvr>
+                                        <p:cTn id="155" dur="100"/>
+                                        <p:tgtEl>
+                                          <p:spTgt spid="28"/>
+                                        </p:tgtEl>
+                                      </p:cBhvr>
+                                    </p:animEffect>
+                                    <p:anim calcmode="lin" valueType="num">
+                                      <p:cBhvr>
+                                        <p:cTn id="156" dur="400" fill="hold"/>
+                                        <p:tgtEl>
+                                          <p:spTgt spid="28"/>
+                                        </p:tgtEl>
+                                        <p:attrNameLst>
+                                          <p:attrName>ppt_x</p:attrName>
+                                        </p:attrNameLst>
+                                      </p:cBhvr>
+                                      <p:tavLst>
+                                        <p:tav tm="0">
+                                          <p:val>
+                                            <p:strVal val="#ppt_x"/>
+                                          </p:val>
+                                        </p:tav>
+                                        <p:tav tm="100000">
+                                          <p:val>
+                                            <p:strVal val="#ppt_x"/>
+                                          </p:val>
+                                        </p:tav>
+                                      </p:tavLst>
+                                    </p:anim>
+                                    <p:anim calcmode="lin" valueType="num">
+                                      <p:cBhvr>
+                                        <p:cTn id="157" dur="400" fill="hold"/>
+                                        <p:tgtEl>
+                                          <p:spTgt spid="28"/>
+                                        </p:tgtEl>
+                                        <p:attrNameLst>
+                                          <p:attrName>ppt_y</p:attrName>
+                                        </p:attrNameLst>
+                                      </p:cBhvr>
+                                      <p:tavLst>
+                                        <p:tav tm="0">
+                                          <p:val>
+                                            <p:strVal val="#ppt_y+0.31"/>
+                                          </p:val>
+                                        </p:tav>
+                                        <p:tav tm="100000">
+                                          <p:val>
+                                            <p:strVal val="#ppt_y+0.31"/>
+                                          </p:val>
+                                        </p:tav>
+                                      </p:tavLst>
+                                    </p:anim>
+                                    <p:anim calcmode="lin" valueType="num">
+                                      <p:cBhvr>
+                                        <p:cTn id="158" dur="600" decel="50000" fill="hold">
+                                          <p:stCondLst>
+                                            <p:cond delay="400"/>
+                                          </p:stCondLst>
+                                        </p:cTn>
+                                        <p:tgtEl>
+                                          <p:spTgt spid="28"/>
+                                        </p:tgtEl>
+                                        <p:attrNameLst>
+                                          <p:attrName>ppt_x</p:attrName>
+                                        </p:attrNameLst>
+                                      </p:cBhvr>
+                                      <p:tavLst>
+                                        <p:tav tm="0">
+                                          <p:val>
+                                            <p:strVal val="#ppt_x"/>
+                                          </p:val>
+                                        </p:tav>
+                                        <p:tav tm="5000">
+                                          <p:val>
+                                            <p:strVal val="#ppt_x+0.0242"/>
+                                          </p:val>
+                                        </p:tav>
+                                        <p:tav tm="10000">
+                                          <p:val>
+                                            <p:strVal val="#ppt_x+0.0479"/>
+                                          </p:val>
+                                        </p:tav>
+                                        <p:tav tm="15000">
+                                          <p:val>
+                                            <p:strVal val="#ppt_x+0.0704"/>
+                                          </p:val>
+                                        </p:tav>
+                                        <p:tav tm="20000">
+                                          <p:val>
+                                            <p:strVal val="#ppt_x+0.0911"/>
+                                          </p:val>
+                                        </p:tav>
+                                        <p:tav tm="25000">
+                                          <p:val>
+                                            <p:strVal val="#ppt_x+0.1096"/>
+                                          </p:val>
+                                        </p:tav>
+                                        <p:tav tm="30000">
+                                          <p:val>
+                                            <p:strVal val="#ppt_x+0.1254"/>
+                                          </p:val>
+                                        </p:tav>
+                                        <p:tav tm="35000">
+                                          <p:val>
+                                            <p:strVal val="#ppt_x+0.1381"/>
+                                          </p:val>
+                                        </p:tav>
+                                        <p:tav tm="40000">
+                                          <p:val>
+                                            <p:strVal val="#ppt_x+0.1474"/>
+                                          </p:val>
+                                        </p:tav>
+                                        <p:tav tm="45000">
+                                          <p:val>
+                                            <p:strVal val="#ppt_x+0.1531"/>
+                                          </p:val>
+                                        </p:tav>
+                                        <p:tav tm="50000">
+                                          <p:val>
+                                            <p:strVal val="#ppt_x+0.1550"/>
+                                          </p:val>
+                                        </p:tav>
+                                        <p:tav tm="55000">
+                                          <p:val>
+                                            <p:strVal val="#ppt_x+0.1531"/>
+                                          </p:val>
+                                        </p:tav>
+                                        <p:tav tm="60000">
+                                          <p:val>
+                                            <p:strVal val="#ppt_x+0.1474"/>
+                                          </p:val>
+                                        </p:tav>
+                                        <p:tav tm="65000">
+                                          <p:val>
+                                            <p:strVal val="#ppt_x+0.1381"/>
+                                          </p:val>
+                                        </p:tav>
+                                        <p:tav tm="70000">
+                                          <p:val>
+                                            <p:strVal val="#ppt_x+0.1254"/>
+                                          </p:val>
+                                        </p:tav>
+                                        <p:tav tm="75000">
+                                          <p:val>
+                                            <p:strVal val="#ppt_x+0.1096"/>
+                                          </p:val>
+                                        </p:tav>
+                                        <p:tav tm="80000">
+                                          <p:val>
+                                            <p:strVal val="#ppt_x+0.0911"/>
+                                          </p:val>
+                                        </p:tav>
+                                        <p:tav tm="85000">
+                                          <p:val>
+                                            <p:strVal val="#ppt_x+0.0704"/>
+                                          </p:val>
+                                        </p:tav>
+                                        <p:tav tm="90000">
+                                          <p:val>
+                                            <p:strVal val="#ppt_x+0.0479"/>
+                                          </p:val>
+                                        </p:tav>
+                                        <p:tav tm="95000">
+                                          <p:val>
+                                            <p:strVal val="#ppt_x+0.0242"/>
+                                          </p:val>
+                                        </p:tav>
+                                        <p:tav tm="100000">
+                                          <p:val>
+                                            <p:strVal val="#ppt_x"/>
+                                          </p:val>
+                                        </p:tav>
+                                      </p:tavLst>
+                                    </p:anim>
+                                    <p:anim calcmode="lin" valueType="num">
+                                      <p:cBhvr>
+                                        <p:cTn id="159" dur="600" decel="50000" fill="hold">
+                                          <p:stCondLst>
+                                            <p:cond delay="400"/>
+                                          </p:stCondLst>
+                                        </p:cTn>
+                                        <p:tgtEl>
+                                          <p:spTgt spid="28"/>
                                         </p:tgtEl>
                                         <p:attrNameLst>
                                           <p:attrName>ppt_y</p:attrName>
@@ -13341,26 +13116,450 @@
                     </p:cTn>
                   </p:par>
                   <p:par>
-                    <p:cTn id="164" fill="hold">
+                    <p:cTn id="160" fill="hold">
                       <p:stCondLst>
                         <p:cond delay="indefinite"/>
                       </p:stCondLst>
                       <p:childTnLst>
                         <p:par>
-                          <p:cTn id="165" fill="hold">
+                          <p:cTn id="161" fill="hold">
                             <p:stCondLst>
                               <p:cond delay="0"/>
                             </p:stCondLst>
                             <p:childTnLst>
                               <p:par>
-                                <p:cTn id="166" presetID="26" presetClass="entr" presetSubtype="0" fill="hold" grpId="0" nodeType="clickEffect">
+                                <p:cTn id="162" presetID="43" presetClass="entr" presetSubtype="0" fill="hold" grpId="0" nodeType="clickEffect">
                                   <p:stCondLst>
                                     <p:cond delay="0"/>
                                   </p:stCondLst>
                                   <p:childTnLst>
                                     <p:set>
                                       <p:cBhvr>
-                                        <p:cTn id="167" dur="1" fill="hold">
+                                        <p:cTn id="163" dur="1" fill="hold">
+                                          <p:stCondLst>
+                                            <p:cond delay="0"/>
+                                          </p:stCondLst>
+                                        </p:cTn>
+                                        <p:tgtEl>
+                                          <p:spTgt spid="54"/>
+                                        </p:tgtEl>
+                                        <p:attrNameLst>
+                                          <p:attrName>style.visibility</p:attrName>
+                                        </p:attrNameLst>
+                                      </p:cBhvr>
+                                      <p:to>
+                                        <p:strVal val="visible"/>
+                                      </p:to>
+                                    </p:set>
+                                    <p:animEffect transition="in" filter="fade">
+                                      <p:cBhvr>
+                                        <p:cTn id="164" dur="100"/>
+                                        <p:tgtEl>
+                                          <p:spTgt spid="54"/>
+                                        </p:tgtEl>
+                                      </p:cBhvr>
+                                    </p:animEffect>
+                                    <p:anim calcmode="lin" valueType="num">
+                                      <p:cBhvr>
+                                        <p:cTn id="165" dur="400" fill="hold"/>
+                                        <p:tgtEl>
+                                          <p:spTgt spid="54"/>
+                                        </p:tgtEl>
+                                        <p:attrNameLst>
+                                          <p:attrName>ppt_x</p:attrName>
+                                        </p:attrNameLst>
+                                      </p:cBhvr>
+                                      <p:tavLst>
+                                        <p:tav tm="0">
+                                          <p:val>
+                                            <p:strVal val="#ppt_x"/>
+                                          </p:val>
+                                        </p:tav>
+                                        <p:tav tm="100000">
+                                          <p:val>
+                                            <p:strVal val="#ppt_x"/>
+                                          </p:val>
+                                        </p:tav>
+                                      </p:tavLst>
+                                    </p:anim>
+                                    <p:anim calcmode="lin" valueType="num">
+                                      <p:cBhvr>
+                                        <p:cTn id="166" dur="400" fill="hold"/>
+                                        <p:tgtEl>
+                                          <p:spTgt spid="54"/>
+                                        </p:tgtEl>
+                                        <p:attrNameLst>
+                                          <p:attrName>ppt_y</p:attrName>
+                                        </p:attrNameLst>
+                                      </p:cBhvr>
+                                      <p:tavLst>
+                                        <p:tav tm="0">
+                                          <p:val>
+                                            <p:strVal val="#ppt_y+0.31"/>
+                                          </p:val>
+                                        </p:tav>
+                                        <p:tav tm="100000">
+                                          <p:val>
+                                            <p:strVal val="#ppt_y+0.31"/>
+                                          </p:val>
+                                        </p:tav>
+                                      </p:tavLst>
+                                    </p:anim>
+                                    <p:anim calcmode="lin" valueType="num">
+                                      <p:cBhvr>
+                                        <p:cTn id="167" dur="600" decel="50000" fill="hold">
+                                          <p:stCondLst>
+                                            <p:cond delay="400"/>
+                                          </p:stCondLst>
+                                        </p:cTn>
+                                        <p:tgtEl>
+                                          <p:spTgt spid="54"/>
+                                        </p:tgtEl>
+                                        <p:attrNameLst>
+                                          <p:attrName>ppt_x</p:attrName>
+                                        </p:attrNameLst>
+                                      </p:cBhvr>
+                                      <p:tavLst>
+                                        <p:tav tm="0">
+                                          <p:val>
+                                            <p:strVal val="#ppt_x"/>
+                                          </p:val>
+                                        </p:tav>
+                                        <p:tav tm="5000">
+                                          <p:val>
+                                            <p:strVal val="#ppt_x+0.0242"/>
+                                          </p:val>
+                                        </p:tav>
+                                        <p:tav tm="10000">
+                                          <p:val>
+                                            <p:strVal val="#ppt_x+0.0479"/>
+                                          </p:val>
+                                        </p:tav>
+                                        <p:tav tm="15000">
+                                          <p:val>
+                                            <p:strVal val="#ppt_x+0.0704"/>
+                                          </p:val>
+                                        </p:tav>
+                                        <p:tav tm="20000">
+                                          <p:val>
+                                            <p:strVal val="#ppt_x+0.0911"/>
+                                          </p:val>
+                                        </p:tav>
+                                        <p:tav tm="25000">
+                                          <p:val>
+                                            <p:strVal val="#ppt_x+0.1096"/>
+                                          </p:val>
+                                        </p:tav>
+                                        <p:tav tm="30000">
+                                          <p:val>
+                                            <p:strVal val="#ppt_x+0.1254"/>
+                                          </p:val>
+                                        </p:tav>
+                                        <p:tav tm="35000">
+                                          <p:val>
+                                            <p:strVal val="#ppt_x+0.1381"/>
+                                          </p:val>
+                                        </p:tav>
+                                        <p:tav tm="40000">
+                                          <p:val>
+                                            <p:strVal val="#ppt_x+0.1474"/>
+                                          </p:val>
+                                        </p:tav>
+                                        <p:tav tm="45000">
+                                          <p:val>
+                                            <p:strVal val="#ppt_x+0.1531"/>
+                                          </p:val>
+                                        </p:tav>
+                                        <p:tav tm="50000">
+                                          <p:val>
+                                            <p:strVal val="#ppt_x+0.1550"/>
+                                          </p:val>
+                                        </p:tav>
+                                        <p:tav tm="55000">
+                                          <p:val>
+                                            <p:strVal val="#ppt_x+0.1531"/>
+                                          </p:val>
+                                        </p:tav>
+                                        <p:tav tm="60000">
+                                          <p:val>
+                                            <p:strVal val="#ppt_x+0.1474"/>
+                                          </p:val>
+                                        </p:tav>
+                                        <p:tav tm="65000">
+                                          <p:val>
+                                            <p:strVal val="#ppt_x+0.1381"/>
+                                          </p:val>
+                                        </p:tav>
+                                        <p:tav tm="70000">
+                                          <p:val>
+                                            <p:strVal val="#ppt_x+0.1254"/>
+                                          </p:val>
+                                        </p:tav>
+                                        <p:tav tm="75000">
+                                          <p:val>
+                                            <p:strVal val="#ppt_x+0.1096"/>
+                                          </p:val>
+                                        </p:tav>
+                                        <p:tav tm="80000">
+                                          <p:val>
+                                            <p:strVal val="#ppt_x+0.0911"/>
+                                          </p:val>
+                                        </p:tav>
+                                        <p:tav tm="85000">
+                                          <p:val>
+                                            <p:strVal val="#ppt_x+0.0704"/>
+                                          </p:val>
+                                        </p:tav>
+                                        <p:tav tm="90000">
+                                          <p:val>
+                                            <p:strVal val="#ppt_x+0.0479"/>
+                                          </p:val>
+                                        </p:tav>
+                                        <p:tav tm="95000">
+                                          <p:val>
+                                            <p:strVal val="#ppt_x+0.0242"/>
+                                          </p:val>
+                                        </p:tav>
+                                        <p:tav tm="100000">
+                                          <p:val>
+                                            <p:strVal val="#ppt_x"/>
+                                          </p:val>
+                                        </p:tav>
+                                      </p:tavLst>
+                                    </p:anim>
+                                    <p:anim calcmode="lin" valueType="num">
+                                      <p:cBhvr>
+                                        <p:cTn id="168" dur="600" decel="50000" fill="hold">
+                                          <p:stCondLst>
+                                            <p:cond delay="400"/>
+                                          </p:stCondLst>
+                                        </p:cTn>
+                                        <p:tgtEl>
+                                          <p:spTgt spid="54"/>
+                                        </p:tgtEl>
+                                        <p:attrNameLst>
+                                          <p:attrName>ppt_y</p:attrName>
+                                        </p:attrNameLst>
+                                      </p:cBhvr>
+                                      <p:tavLst>
+                                        <p:tav tm="0">
+                                          <p:val>
+                                            <p:strVal val="#ppt_y+0.31"/>
+                                          </p:val>
+                                        </p:tav>
+                                        <p:tav tm="5000">
+                                          <p:val>
+                                            <p:strVal val="#ppt_y+0.308"/>
+                                          </p:val>
+                                        </p:tav>
+                                        <p:tav tm="10000">
+                                          <p:val>
+                                            <p:strVal val="#ppt_y+0.3024"/>
+                                          </p:val>
+                                        </p:tav>
+                                        <p:tav tm="15000">
+                                          <p:val>
+                                            <p:strVal val="#ppt_y+0.2931"/>
+                                          </p:val>
+                                        </p:tav>
+                                        <p:tav tm="20000">
+                                          <p:val>
+                                            <p:strVal val="#ppt_y+0.2804"/>
+                                          </p:val>
+                                        </p:tav>
+                                        <p:tav tm="25000">
+                                          <p:val>
+                                            <p:strVal val="#ppt_y+0.2646"/>
+                                          </p:val>
+                                        </p:tav>
+                                        <p:tav tm="30000">
+                                          <p:val>
+                                            <p:strVal val="#ppt_y+0.2461"/>
+                                          </p:val>
+                                        </p:tav>
+                                        <p:tav tm="35000">
+                                          <p:val>
+                                            <p:strVal val="#ppt_y+0.2253"/>
+                                          </p:val>
+                                        </p:tav>
+                                        <p:tav tm="40000">
+                                          <p:val>
+                                            <p:strVal val="#ppt_y+0.2029"/>
+                                          </p:val>
+                                        </p:tav>
+                                        <p:tav tm="45000">
+                                          <p:val>
+                                            <p:strVal val="#ppt_y+0.1792"/>
+                                          </p:val>
+                                        </p:tav>
+                                        <p:tav tm="50000">
+                                          <p:val>
+                                            <p:strVal val="#ppt_y+0.155"/>
+                                          </p:val>
+                                        </p:tav>
+                                        <p:tav tm="55000">
+                                          <p:val>
+                                            <p:strVal val="#ppt_y+0.1307"/>
+                                          </p:val>
+                                        </p:tav>
+                                        <p:tav tm="60000">
+                                          <p:val>
+                                            <p:strVal val="#ppt_y+0.1071"/>
+                                          </p:val>
+                                        </p:tav>
+                                        <p:tav tm="65000">
+                                          <p:val>
+                                            <p:strVal val="#ppt_y+0.0846"/>
+                                          </p:val>
+                                        </p:tav>
+                                        <p:tav tm="70000">
+                                          <p:val>
+                                            <p:strVal val="#ppt_y+0.0639"/>
+                                          </p:val>
+                                        </p:tav>
+                                        <p:tav tm="75000">
+                                          <p:val>
+                                            <p:strVal val="#ppt_y+0.0454"/>
+                                          </p:val>
+                                        </p:tav>
+                                        <p:tav tm="80000">
+                                          <p:val>
+                                            <p:strVal val="#ppt_y+0.0296"/>
+                                          </p:val>
+                                        </p:tav>
+                                        <p:tav tm="85000">
+                                          <p:val>
+                                            <p:strVal val="#ppt_y+0.0169"/>
+                                          </p:val>
+                                        </p:tav>
+                                        <p:tav tm="90000">
+                                          <p:val>
+                                            <p:strVal val="#ppt_y+0.0076"/>
+                                          </p:val>
+                                        </p:tav>
+                                        <p:tav tm="95000">
+                                          <p:val>
+                                            <p:strVal val="#ppt_y+0.0019"/>
+                                          </p:val>
+                                        </p:tav>
+                                        <p:tav tm="100000">
+                                          <p:val>
+                                            <p:strVal val="#ppt_y"/>
+                                          </p:val>
+                                        </p:tav>
+                                      </p:tavLst>
+                                    </p:anim>
+                                  </p:childTnLst>
+                                </p:cTn>
+                              </p:par>
+                              <p:par>
+                                <p:cTn id="169" presetID="47" presetClass="exit" presetSubtype="0" fill="hold" grpId="1" nodeType="withEffect">
+                                  <p:stCondLst>
+                                    <p:cond delay="0"/>
+                                  </p:stCondLst>
+                                  <p:childTnLst>
+                                    <p:animEffect transition="out" filter="fade">
+                                      <p:cBhvr>
+                                        <p:cTn id="170" dur="1000"/>
+                                        <p:tgtEl>
+                                          <p:spTgt spid="45"/>
+                                        </p:tgtEl>
+                                      </p:cBhvr>
+                                    </p:animEffect>
+                                    <p:anim calcmode="lin" valueType="num">
+                                      <p:cBhvr>
+                                        <p:cTn id="171" dur="1000"/>
+                                        <p:tgtEl>
+                                          <p:spTgt spid="45"/>
+                                        </p:tgtEl>
+                                        <p:attrNameLst>
+                                          <p:attrName>ppt_x</p:attrName>
+                                        </p:attrNameLst>
+                                      </p:cBhvr>
+                                      <p:tavLst>
+                                        <p:tav tm="0">
+                                          <p:val>
+                                            <p:strVal val="ppt_x"/>
+                                          </p:val>
+                                        </p:tav>
+                                        <p:tav tm="100000">
+                                          <p:val>
+                                            <p:strVal val="ppt_x"/>
+                                          </p:val>
+                                        </p:tav>
+                                      </p:tavLst>
+                                    </p:anim>
+                                    <p:anim calcmode="lin" valueType="num">
+                                      <p:cBhvr>
+                                        <p:cTn id="172" dur="1000"/>
+                                        <p:tgtEl>
+                                          <p:spTgt spid="45"/>
+                                        </p:tgtEl>
+                                        <p:attrNameLst>
+                                          <p:attrName>ppt_y</p:attrName>
+                                        </p:attrNameLst>
+                                      </p:cBhvr>
+                                      <p:tavLst>
+                                        <p:tav tm="0">
+                                          <p:val>
+                                            <p:strVal val="ppt_y"/>
+                                          </p:val>
+                                        </p:tav>
+                                        <p:tav tm="100000">
+                                          <p:val>
+                                            <p:strVal val="ppt_y-.1"/>
+                                          </p:val>
+                                        </p:tav>
+                                      </p:tavLst>
+                                    </p:anim>
+                                    <p:set>
+                                      <p:cBhvr>
+                                        <p:cTn id="173" dur="1" fill="hold">
+                                          <p:stCondLst>
+                                            <p:cond delay="999"/>
+                                          </p:stCondLst>
+                                        </p:cTn>
+                                        <p:tgtEl>
+                                          <p:spTgt spid="45"/>
+                                        </p:tgtEl>
+                                        <p:attrNameLst>
+                                          <p:attrName>style.visibility</p:attrName>
+                                        </p:attrNameLst>
+                                      </p:cBhvr>
+                                      <p:to>
+                                        <p:strVal val="hidden"/>
+                                      </p:to>
+                                    </p:set>
+                                  </p:childTnLst>
+                                </p:cTn>
+                              </p:par>
+                            </p:childTnLst>
+                          </p:cTn>
+                        </p:par>
+                      </p:childTnLst>
+                    </p:cTn>
+                  </p:par>
+                  <p:par>
+                    <p:cTn id="174" fill="hold">
+                      <p:stCondLst>
+                        <p:cond delay="indefinite"/>
+                      </p:stCondLst>
+                      <p:childTnLst>
+                        <p:par>
+                          <p:cTn id="175" fill="hold">
+                            <p:stCondLst>
+                              <p:cond delay="0"/>
+                            </p:stCondLst>
+                            <p:childTnLst>
+                              <p:par>
+                                <p:cTn id="176" presetID="26" presetClass="entr" presetSubtype="0" fill="hold" grpId="0" nodeType="clickEffect">
+                                  <p:stCondLst>
+                                    <p:cond delay="0"/>
+                                  </p:stCondLst>
+                                  <p:childTnLst>
+                                    <p:set>
+                                      <p:cBhvr>
+                                        <p:cTn id="177" dur="1" fill="hold">
                                           <p:stCondLst>
                                             <p:cond delay="0"/>
                                           </p:stCondLst>
@@ -13378,7 +13577,7 @@
                                     </p:set>
                                     <p:animEffect transition="in" filter="wipe(down)">
                                       <p:cBhvr>
-                                        <p:cTn id="168" dur="580">
+                                        <p:cTn id="178" dur="580">
                                           <p:stCondLst>
                                             <p:cond delay="0"/>
                                           </p:stCondLst>
@@ -13390,7 +13589,7 @@
                                     </p:animEffect>
                                     <p:anim calcmode="lin" valueType="num">
                                       <p:cBhvr>
-                                        <p:cTn id="169" dur="1822" tmFilter="0,0; 0.14,0.36; 0.43,0.73; 0.71,0.91; 1.0,1.0">
+                                        <p:cTn id="179" dur="1822" tmFilter="0,0; 0.14,0.36; 0.43,0.73; 0.71,0.91; 1.0,1.0">
                                           <p:stCondLst>
                                             <p:cond delay="0"/>
                                           </p:stCondLst>
@@ -13417,7 +13616,7 @@
                                     </p:anim>
                                     <p:anim calcmode="lin" valueType="num">
                                       <p:cBhvr>
-                                        <p:cTn id="170" dur="664" tmFilter="0.0,0.0; 0.25,0.07; 0.50,0.2; 0.75,0.467; 1.0,1.0">
+                                        <p:cTn id="180" dur="664" tmFilter="0.0,0.0; 0.25,0.07; 0.50,0.2; 0.75,0.467; 1.0,1.0">
                                           <p:stCondLst>
                                             <p:cond delay="0"/>
                                           </p:stCondLst>
@@ -13444,7 +13643,7 @@
                                     </p:anim>
                                     <p:anim calcmode="lin" valueType="num">
                                       <p:cBhvr>
-                                        <p:cTn id="171" dur="664" tmFilter="0, 0; 0.125,0.2665; 0.25,0.4; 0.375,0.465; 0.5,0.5;  0.625,0.535; 0.75,0.6; 0.875,0.7335; 1,1">
+                                        <p:cTn id="181" dur="664" tmFilter="0, 0; 0.125,0.2665; 0.25,0.4; 0.375,0.465; 0.5,0.5;  0.625,0.535; 0.75,0.6; 0.875,0.7335; 1,1">
                                           <p:stCondLst>
                                             <p:cond delay="664"/>
                                           </p:stCondLst>
@@ -13471,7 +13670,7 @@
                                     </p:anim>
                                     <p:anim calcmode="lin" valueType="num">
                                       <p:cBhvr>
-                                        <p:cTn id="172" dur="332" tmFilter="0, 0; 0.125,0.2665; 0.25,0.4; 0.375,0.465; 0.5,0.5;  0.625,0.535; 0.75,0.6; 0.875,0.7335; 1,1">
+                                        <p:cTn id="182" dur="332" tmFilter="0, 0; 0.125,0.2665; 0.25,0.4; 0.375,0.465; 0.5,0.5;  0.625,0.535; 0.75,0.6; 0.875,0.7335; 1,1">
                                           <p:stCondLst>
                                             <p:cond delay="1324"/>
                                           </p:stCondLst>
@@ -13498,7 +13697,7 @@
                                     </p:anim>
                                     <p:anim calcmode="lin" valueType="num">
                                       <p:cBhvr>
-                                        <p:cTn id="173" dur="164" tmFilter="0, 0; 0.125,0.2665; 0.25,0.4; 0.375,0.465; 0.5,0.5;  0.625,0.535; 0.75,0.6; 0.875,0.7335; 1,1">
+                                        <p:cTn id="183" dur="164" tmFilter="0, 0; 0.125,0.2665; 0.25,0.4; 0.375,0.465; 0.5,0.5;  0.625,0.535; 0.75,0.6; 0.875,0.7335; 1,1">
                                           <p:stCondLst>
                                             <p:cond delay="1656"/>
                                           </p:stCondLst>
@@ -13525,7 +13724,7 @@
                                     </p:anim>
                                     <p:animScale>
                                       <p:cBhvr>
-                                        <p:cTn id="174" dur="26">
+                                        <p:cTn id="184" dur="26">
                                           <p:stCondLst>
                                             <p:cond delay="650"/>
                                           </p:stCondLst>
@@ -13538,7 +13737,7 @@
                                     </p:animScale>
                                     <p:animScale>
                                       <p:cBhvr>
-                                        <p:cTn id="175" dur="166" decel="50000">
+                                        <p:cTn id="185" dur="166" decel="50000">
                                           <p:stCondLst>
                                             <p:cond delay="676"/>
                                           </p:stCondLst>
@@ -13551,7 +13750,7 @@
                                     </p:animScale>
                                     <p:animScale>
                                       <p:cBhvr>
-                                        <p:cTn id="176" dur="26">
+                                        <p:cTn id="186" dur="26">
                                           <p:stCondLst>
                                             <p:cond delay="1312"/>
                                           </p:stCondLst>
@@ -13564,7 +13763,7 @@
                                     </p:animScale>
                                     <p:animScale>
                                       <p:cBhvr>
-                                        <p:cTn id="177" dur="166" decel="50000">
+                                        <p:cTn id="187" dur="166" decel="50000">
                                           <p:stCondLst>
                                             <p:cond delay="1338"/>
                                           </p:stCondLst>
@@ -13577,7 +13776,7 @@
                                     </p:animScale>
                                     <p:animScale>
                                       <p:cBhvr>
-                                        <p:cTn id="178" dur="26">
+                                        <p:cTn id="188" dur="26">
                                           <p:stCondLst>
                                             <p:cond delay="1642"/>
                                           </p:stCondLst>
@@ -13590,7 +13789,7 @@
                                     </p:animScale>
                                     <p:animScale>
                                       <p:cBhvr>
-                                        <p:cTn id="179" dur="166" decel="50000">
+                                        <p:cTn id="189" dur="166" decel="50000">
                                           <p:stCondLst>
                                             <p:cond delay="1668"/>
                                           </p:stCondLst>
@@ -13603,7 +13802,7 @@
                                     </p:animScale>
                                     <p:animScale>
                                       <p:cBhvr>
-                                        <p:cTn id="180" dur="26">
+                                        <p:cTn id="190" dur="26">
                                           <p:stCondLst>
                                             <p:cond delay="1808"/>
                                           </p:stCondLst>
@@ -13616,7 +13815,7 @@
                                     </p:animScale>
                                     <p:animScale>
                                       <p:cBhvr>
-                                        <p:cTn id="181" dur="166" decel="50000">
+                                        <p:cTn id="191" dur="166" decel="50000">
                                           <p:stCondLst>
                                             <p:cond delay="1834"/>
                                           </p:stCondLst>
@@ -13631,14 +13830,14 @@
                                 </p:cTn>
                               </p:par>
                               <p:par>
-                                <p:cTn id="182" presetID="26" presetClass="entr" presetSubtype="0" fill="hold" nodeType="withEffect">
+                                <p:cTn id="192" presetID="26" presetClass="entr" presetSubtype="0" fill="hold" nodeType="withEffect">
                                   <p:stCondLst>
                                     <p:cond delay="0"/>
                                   </p:stCondLst>
                                   <p:childTnLst>
                                     <p:set>
                                       <p:cBhvr>
-                                        <p:cTn id="183" dur="1" fill="hold">
+                                        <p:cTn id="193" dur="1" fill="hold">
                                           <p:stCondLst>
                                             <p:cond delay="0"/>
                                           </p:stCondLst>
@@ -13656,7 +13855,7 @@
                                     </p:set>
                                     <p:animEffect transition="in" filter="wipe(down)">
                                       <p:cBhvr>
-                                        <p:cTn id="184" dur="580">
+                                        <p:cTn id="194" dur="580">
                                           <p:stCondLst>
                                             <p:cond delay="0"/>
                                           </p:stCondLst>
@@ -13668,7 +13867,7 @@
                                     </p:animEffect>
                                     <p:anim calcmode="lin" valueType="num">
                                       <p:cBhvr>
-                                        <p:cTn id="185" dur="1822" tmFilter="0,0; 0.14,0.36; 0.43,0.73; 0.71,0.91; 1.0,1.0">
+                                        <p:cTn id="195" dur="1822" tmFilter="0,0; 0.14,0.36; 0.43,0.73; 0.71,0.91; 1.0,1.0">
                                           <p:stCondLst>
                                             <p:cond delay="0"/>
                                           </p:stCondLst>
@@ -13695,7 +13894,7 @@
                                     </p:anim>
                                     <p:anim calcmode="lin" valueType="num">
                                       <p:cBhvr>
-                                        <p:cTn id="186" dur="664" tmFilter="0.0,0.0; 0.25,0.07; 0.50,0.2; 0.75,0.467; 1.0,1.0">
+                                        <p:cTn id="196" dur="664" tmFilter="0.0,0.0; 0.25,0.07; 0.50,0.2; 0.75,0.467; 1.0,1.0">
                                           <p:stCondLst>
                                             <p:cond delay="0"/>
                                           </p:stCondLst>
@@ -13722,7 +13921,7 @@
                                     </p:anim>
                                     <p:anim calcmode="lin" valueType="num">
                                       <p:cBhvr>
-                                        <p:cTn id="187" dur="664" tmFilter="0, 0; 0.125,0.2665; 0.25,0.4; 0.375,0.465; 0.5,0.5;  0.625,0.535; 0.75,0.6; 0.875,0.7335; 1,1">
+                                        <p:cTn id="197" dur="664" tmFilter="0, 0; 0.125,0.2665; 0.25,0.4; 0.375,0.465; 0.5,0.5;  0.625,0.535; 0.75,0.6; 0.875,0.7335; 1,1">
                                           <p:stCondLst>
                                             <p:cond delay="664"/>
                                           </p:stCondLst>
@@ -13749,7 +13948,7 @@
                                     </p:anim>
                                     <p:anim calcmode="lin" valueType="num">
                                       <p:cBhvr>
-                                        <p:cTn id="188" dur="332" tmFilter="0, 0; 0.125,0.2665; 0.25,0.4; 0.375,0.465; 0.5,0.5;  0.625,0.535; 0.75,0.6; 0.875,0.7335; 1,1">
+                                        <p:cTn id="198" dur="332" tmFilter="0, 0; 0.125,0.2665; 0.25,0.4; 0.375,0.465; 0.5,0.5;  0.625,0.535; 0.75,0.6; 0.875,0.7335; 1,1">
                                           <p:stCondLst>
                                             <p:cond delay="1324"/>
                                           </p:stCondLst>
@@ -13776,7 +13975,7 @@
                                     </p:anim>
                                     <p:anim calcmode="lin" valueType="num">
                                       <p:cBhvr>
-                                        <p:cTn id="189" dur="164" tmFilter="0, 0; 0.125,0.2665; 0.25,0.4; 0.375,0.465; 0.5,0.5;  0.625,0.535; 0.75,0.6; 0.875,0.7335; 1,1">
+                                        <p:cTn id="199" dur="164" tmFilter="0, 0; 0.125,0.2665; 0.25,0.4; 0.375,0.465; 0.5,0.5;  0.625,0.535; 0.75,0.6; 0.875,0.7335; 1,1">
                                           <p:stCondLst>
                                             <p:cond delay="1656"/>
                                           </p:stCondLst>
@@ -13803,7 +14002,7 @@
                                     </p:anim>
                                     <p:animScale>
                                       <p:cBhvr>
-                                        <p:cTn id="190" dur="26">
+                                        <p:cTn id="200" dur="26">
                                           <p:stCondLst>
                                             <p:cond delay="650"/>
                                           </p:stCondLst>
@@ -13816,7 +14015,7 @@
                                     </p:animScale>
                                     <p:animScale>
                                       <p:cBhvr>
-                                        <p:cTn id="191" dur="166" decel="50000">
+                                        <p:cTn id="201" dur="166" decel="50000">
                                           <p:stCondLst>
                                             <p:cond delay="676"/>
                                           </p:stCondLst>
@@ -13829,7 +14028,7 @@
                                     </p:animScale>
                                     <p:animScale>
                                       <p:cBhvr>
-                                        <p:cTn id="192" dur="26">
+                                        <p:cTn id="202" dur="26">
                                           <p:stCondLst>
                                             <p:cond delay="1312"/>
                                           </p:stCondLst>
@@ -13842,7 +14041,7 @@
                                     </p:animScale>
                                     <p:animScale>
                                       <p:cBhvr>
-                                        <p:cTn id="193" dur="166" decel="50000">
+                                        <p:cTn id="203" dur="166" decel="50000">
                                           <p:stCondLst>
                                             <p:cond delay="1338"/>
                                           </p:stCondLst>
@@ -13855,7 +14054,7 @@
                                     </p:animScale>
                                     <p:animScale>
                                       <p:cBhvr>
-                                        <p:cTn id="194" dur="26">
+                                        <p:cTn id="204" dur="26">
                                           <p:stCondLst>
                                             <p:cond delay="1642"/>
                                           </p:stCondLst>
@@ -13868,7 +14067,7 @@
                                     </p:animScale>
                                     <p:animScale>
                                       <p:cBhvr>
-                                        <p:cTn id="195" dur="166" decel="50000">
+                                        <p:cTn id="205" dur="166" decel="50000">
                                           <p:stCondLst>
                                             <p:cond delay="1668"/>
                                           </p:stCondLst>
@@ -13881,7 +14080,7 @@
                                     </p:animScale>
                                     <p:animScale>
                                       <p:cBhvr>
-                                        <p:cTn id="196" dur="26">
+                                        <p:cTn id="206" dur="26">
                                           <p:stCondLst>
                                             <p:cond delay="1808"/>
                                           </p:stCondLst>
@@ -13894,7 +14093,7 @@
                                     </p:animScale>
                                     <p:animScale>
                                       <p:cBhvr>
-                                        <p:cTn id="197" dur="166" decel="50000">
+                                        <p:cTn id="207" dur="166" decel="50000">
                                           <p:stCondLst>
                                             <p:cond delay="1834"/>
                                           </p:stCondLst>
@@ -13915,26 +14114,26 @@
                     </p:cTn>
                   </p:par>
                   <p:par>
-                    <p:cTn id="198" fill="hold">
+                    <p:cTn id="208" fill="hold">
                       <p:stCondLst>
                         <p:cond delay="indefinite"/>
                       </p:stCondLst>
                       <p:childTnLst>
                         <p:par>
-                          <p:cTn id="199" fill="hold">
+                          <p:cTn id="209" fill="hold">
                             <p:stCondLst>
                               <p:cond delay="0"/>
                             </p:stCondLst>
                             <p:childTnLst>
                               <p:par>
-                                <p:cTn id="200" presetID="26" presetClass="entr" presetSubtype="0" fill="hold" grpId="0" nodeType="clickEffect">
+                                <p:cTn id="210" presetID="26" presetClass="entr" presetSubtype="0" fill="hold" grpId="0" nodeType="clickEffect">
                                   <p:stCondLst>
                                     <p:cond delay="0"/>
                                   </p:stCondLst>
                                   <p:childTnLst>
                                     <p:set>
                                       <p:cBhvr>
-                                        <p:cTn id="201" dur="1" fill="hold">
+                                        <p:cTn id="211" dur="1" fill="hold">
                                           <p:stCondLst>
                                             <p:cond delay="0"/>
                                           </p:stCondLst>
@@ -13952,7 +14151,7 @@
                                     </p:set>
                                     <p:animEffect transition="in" filter="wipe(down)">
                                       <p:cBhvr>
-                                        <p:cTn id="202" dur="580">
+                                        <p:cTn id="212" dur="580">
                                           <p:stCondLst>
                                             <p:cond delay="0"/>
                                           </p:stCondLst>
@@ -13964,7 +14163,7 @@
                                     </p:animEffect>
                                     <p:anim calcmode="lin" valueType="num">
                                       <p:cBhvr>
-                                        <p:cTn id="203" dur="1822" tmFilter="0,0; 0.14,0.36; 0.43,0.73; 0.71,0.91; 1.0,1.0">
+                                        <p:cTn id="213" dur="1822" tmFilter="0,0; 0.14,0.36; 0.43,0.73; 0.71,0.91; 1.0,1.0">
                                           <p:stCondLst>
                                             <p:cond delay="0"/>
                                           </p:stCondLst>
@@ -13991,7 +14190,7 @@
                                     </p:anim>
                                     <p:anim calcmode="lin" valueType="num">
                                       <p:cBhvr>
-                                        <p:cTn id="204" dur="664" tmFilter="0.0,0.0; 0.25,0.07; 0.50,0.2; 0.75,0.467; 1.0,1.0">
+                                        <p:cTn id="214" dur="664" tmFilter="0.0,0.0; 0.25,0.07; 0.50,0.2; 0.75,0.467; 1.0,1.0">
                                           <p:stCondLst>
                                             <p:cond delay="0"/>
                                           </p:stCondLst>
@@ -14018,7 +14217,7 @@
                                     </p:anim>
                                     <p:anim calcmode="lin" valueType="num">
                                       <p:cBhvr>
-                                        <p:cTn id="205" dur="664" tmFilter="0, 0; 0.125,0.2665; 0.25,0.4; 0.375,0.465; 0.5,0.5;  0.625,0.535; 0.75,0.6; 0.875,0.7335; 1,1">
+                                        <p:cTn id="215" dur="664" tmFilter="0, 0; 0.125,0.2665; 0.25,0.4; 0.375,0.465; 0.5,0.5;  0.625,0.535; 0.75,0.6; 0.875,0.7335; 1,1">
                                           <p:stCondLst>
                                             <p:cond delay="664"/>
                                           </p:stCondLst>
@@ -14045,7 +14244,7 @@
                                     </p:anim>
                                     <p:anim calcmode="lin" valueType="num">
                                       <p:cBhvr>
-                                        <p:cTn id="206" dur="332" tmFilter="0, 0; 0.125,0.2665; 0.25,0.4; 0.375,0.465; 0.5,0.5;  0.625,0.535; 0.75,0.6; 0.875,0.7335; 1,1">
+                                        <p:cTn id="216" dur="332" tmFilter="0, 0; 0.125,0.2665; 0.25,0.4; 0.375,0.465; 0.5,0.5;  0.625,0.535; 0.75,0.6; 0.875,0.7335; 1,1">
                                           <p:stCondLst>
                                             <p:cond delay="1324"/>
                                           </p:stCondLst>
@@ -14072,7 +14271,7 @@
                                     </p:anim>
                                     <p:anim calcmode="lin" valueType="num">
                                       <p:cBhvr>
-                                        <p:cTn id="207" dur="164" tmFilter="0, 0; 0.125,0.2665; 0.25,0.4; 0.375,0.465; 0.5,0.5;  0.625,0.535; 0.75,0.6; 0.875,0.7335; 1,1">
+                                        <p:cTn id="217" dur="164" tmFilter="0, 0; 0.125,0.2665; 0.25,0.4; 0.375,0.465; 0.5,0.5;  0.625,0.535; 0.75,0.6; 0.875,0.7335; 1,1">
                                           <p:stCondLst>
                                             <p:cond delay="1656"/>
                                           </p:stCondLst>
@@ -14099,7 +14298,7 @@
                                     </p:anim>
                                     <p:animScale>
                                       <p:cBhvr>
-                                        <p:cTn id="208" dur="26">
+                                        <p:cTn id="218" dur="26">
                                           <p:stCondLst>
                                             <p:cond delay="650"/>
                                           </p:stCondLst>
@@ -14112,7 +14311,7 @@
                                     </p:animScale>
                                     <p:animScale>
                                       <p:cBhvr>
-                                        <p:cTn id="209" dur="166" decel="50000">
+                                        <p:cTn id="219" dur="166" decel="50000">
                                           <p:stCondLst>
                                             <p:cond delay="676"/>
                                           </p:stCondLst>
@@ -14125,7 +14324,7 @@
                                     </p:animScale>
                                     <p:animScale>
                                       <p:cBhvr>
-                                        <p:cTn id="210" dur="26">
+                                        <p:cTn id="220" dur="26">
                                           <p:stCondLst>
                                             <p:cond delay="1312"/>
                                           </p:stCondLst>
@@ -14138,7 +14337,7 @@
                                     </p:animScale>
                                     <p:animScale>
                                       <p:cBhvr>
-                                        <p:cTn id="211" dur="166" decel="50000">
+                                        <p:cTn id="221" dur="166" decel="50000">
                                           <p:stCondLst>
                                             <p:cond delay="1338"/>
                                           </p:stCondLst>
@@ -14151,7 +14350,7 @@
                                     </p:animScale>
                                     <p:animScale>
                                       <p:cBhvr>
-                                        <p:cTn id="212" dur="26">
+                                        <p:cTn id="222" dur="26">
                                           <p:stCondLst>
                                             <p:cond delay="1642"/>
                                           </p:stCondLst>
@@ -14164,7 +14363,7 @@
                                     </p:animScale>
                                     <p:animScale>
                                       <p:cBhvr>
-                                        <p:cTn id="213" dur="166" decel="50000">
+                                        <p:cTn id="223" dur="166" decel="50000">
                                           <p:stCondLst>
                                             <p:cond delay="1668"/>
                                           </p:stCondLst>
@@ -14177,7 +14376,7 @@
                                     </p:animScale>
                                     <p:animScale>
                                       <p:cBhvr>
-                                        <p:cTn id="214" dur="26">
+                                        <p:cTn id="224" dur="26">
                                           <p:stCondLst>
                                             <p:cond delay="1808"/>
                                           </p:stCondLst>
@@ -14190,7 +14389,7 @@
                                     </p:animScale>
                                     <p:animScale>
                                       <p:cBhvr>
-                                        <p:cTn id="215" dur="166" decel="50000">
+                                        <p:cTn id="225" dur="166" decel="50000">
                                           <p:stCondLst>
                                             <p:cond delay="1834"/>
                                           </p:stCondLst>
@@ -14205,14 +14404,14 @@
                                 </p:cTn>
                               </p:par>
                               <p:par>
-                                <p:cTn id="216" presetID="26" presetClass="entr" presetSubtype="0" fill="hold" nodeType="withEffect">
+                                <p:cTn id="226" presetID="26" presetClass="entr" presetSubtype="0" fill="hold" nodeType="withEffect">
                                   <p:stCondLst>
                                     <p:cond delay="0"/>
                                   </p:stCondLst>
                                   <p:childTnLst>
                                     <p:set>
                                       <p:cBhvr>
-                                        <p:cTn id="217" dur="1" fill="hold">
+                                        <p:cTn id="227" dur="1" fill="hold">
                                           <p:stCondLst>
                                             <p:cond delay="0"/>
                                           </p:stCondLst>
@@ -14230,7 +14429,7 @@
                                     </p:set>
                                     <p:animEffect transition="in" filter="wipe(down)">
                                       <p:cBhvr>
-                                        <p:cTn id="218" dur="580">
+                                        <p:cTn id="228" dur="580">
                                           <p:stCondLst>
                                             <p:cond delay="0"/>
                                           </p:stCondLst>
@@ -14242,7 +14441,7 @@
                                     </p:animEffect>
                                     <p:anim calcmode="lin" valueType="num">
                                       <p:cBhvr>
-                                        <p:cTn id="219" dur="1822" tmFilter="0,0; 0.14,0.36; 0.43,0.73; 0.71,0.91; 1.0,1.0">
+                                        <p:cTn id="229" dur="1822" tmFilter="0,0; 0.14,0.36; 0.43,0.73; 0.71,0.91; 1.0,1.0">
                                           <p:stCondLst>
                                             <p:cond delay="0"/>
                                           </p:stCondLst>
@@ -14269,7 +14468,7 @@
                                     </p:anim>
                                     <p:anim calcmode="lin" valueType="num">
                                       <p:cBhvr>
-                                        <p:cTn id="220" dur="664" tmFilter="0.0,0.0; 0.25,0.07; 0.50,0.2; 0.75,0.467; 1.0,1.0">
+                                        <p:cTn id="230" dur="664" tmFilter="0.0,0.0; 0.25,0.07; 0.50,0.2; 0.75,0.467; 1.0,1.0">
                                           <p:stCondLst>
                                             <p:cond delay="0"/>
                                           </p:stCondLst>
@@ -14296,7 +14495,7 @@
                                     </p:anim>
                                     <p:anim calcmode="lin" valueType="num">
                                       <p:cBhvr>
-                                        <p:cTn id="221" dur="664" tmFilter="0, 0; 0.125,0.2665; 0.25,0.4; 0.375,0.465; 0.5,0.5;  0.625,0.535; 0.75,0.6; 0.875,0.7335; 1,1">
+                                        <p:cTn id="231" dur="664" tmFilter="0, 0; 0.125,0.2665; 0.25,0.4; 0.375,0.465; 0.5,0.5;  0.625,0.535; 0.75,0.6; 0.875,0.7335; 1,1">
                                           <p:stCondLst>
                                             <p:cond delay="664"/>
                                           </p:stCondLst>
@@ -14323,7 +14522,7 @@
                                     </p:anim>
                                     <p:anim calcmode="lin" valueType="num">
                                       <p:cBhvr>
-                                        <p:cTn id="222" dur="332" tmFilter="0, 0; 0.125,0.2665; 0.25,0.4; 0.375,0.465; 0.5,0.5;  0.625,0.535; 0.75,0.6; 0.875,0.7335; 1,1">
+                                        <p:cTn id="232" dur="332" tmFilter="0, 0; 0.125,0.2665; 0.25,0.4; 0.375,0.465; 0.5,0.5;  0.625,0.535; 0.75,0.6; 0.875,0.7335; 1,1">
                                           <p:stCondLst>
                                             <p:cond delay="1324"/>
                                           </p:stCondLst>
@@ -14350,7 +14549,7 @@
                                     </p:anim>
                                     <p:anim calcmode="lin" valueType="num">
                                       <p:cBhvr>
-                                        <p:cTn id="223" dur="164" tmFilter="0, 0; 0.125,0.2665; 0.25,0.4; 0.375,0.465; 0.5,0.5;  0.625,0.535; 0.75,0.6; 0.875,0.7335; 1,1">
+                                        <p:cTn id="233" dur="164" tmFilter="0, 0; 0.125,0.2665; 0.25,0.4; 0.375,0.465; 0.5,0.5;  0.625,0.535; 0.75,0.6; 0.875,0.7335; 1,1">
                                           <p:stCondLst>
                                             <p:cond delay="1656"/>
                                           </p:stCondLst>
@@ -14377,7 +14576,7 @@
                                     </p:anim>
                                     <p:animScale>
                                       <p:cBhvr>
-                                        <p:cTn id="224" dur="26">
+                                        <p:cTn id="234" dur="26">
                                           <p:stCondLst>
                                             <p:cond delay="650"/>
                                           </p:stCondLst>
@@ -14390,7 +14589,7 @@
                                     </p:animScale>
                                     <p:animScale>
                                       <p:cBhvr>
-                                        <p:cTn id="225" dur="166" decel="50000">
+                                        <p:cTn id="235" dur="166" decel="50000">
                                           <p:stCondLst>
                                             <p:cond delay="676"/>
                                           </p:stCondLst>
@@ -14403,7 +14602,7 @@
                                     </p:animScale>
                                     <p:animScale>
                                       <p:cBhvr>
-                                        <p:cTn id="226" dur="26">
+                                        <p:cTn id="236" dur="26">
                                           <p:stCondLst>
                                             <p:cond delay="1312"/>
                                           </p:stCondLst>
@@ -14416,7 +14615,7 @@
                                     </p:animScale>
                                     <p:animScale>
                                       <p:cBhvr>
-                                        <p:cTn id="227" dur="166" decel="50000">
+                                        <p:cTn id="237" dur="166" decel="50000">
                                           <p:stCondLst>
                                             <p:cond delay="1338"/>
                                           </p:stCondLst>
@@ -14429,7 +14628,7 @@
                                     </p:animScale>
                                     <p:animScale>
                                       <p:cBhvr>
-                                        <p:cTn id="228" dur="26">
+                                        <p:cTn id="238" dur="26">
                                           <p:stCondLst>
                                             <p:cond delay="1642"/>
                                           </p:stCondLst>
@@ -14442,7 +14641,7 @@
                                     </p:animScale>
                                     <p:animScale>
                                       <p:cBhvr>
-                                        <p:cTn id="229" dur="166" decel="50000">
+                                        <p:cTn id="239" dur="166" decel="50000">
                                           <p:stCondLst>
                                             <p:cond delay="1668"/>
                                           </p:stCondLst>
@@ -14455,7 +14654,7 @@
                                     </p:animScale>
                                     <p:animScale>
                                       <p:cBhvr>
-                                        <p:cTn id="230" dur="26">
+                                        <p:cTn id="240" dur="26">
                                           <p:stCondLst>
                                             <p:cond delay="1808"/>
                                           </p:stCondLst>
@@ -14468,7 +14667,7 @@
                                     </p:animScale>
                                     <p:animScale>
                                       <p:cBhvr>
-                                        <p:cTn id="231" dur="166" decel="50000">
+                                        <p:cTn id="241" dur="166" decel="50000">
                                           <p:stCondLst>
                                             <p:cond delay="1834"/>
                                           </p:stCondLst>
@@ -14489,26 +14688,26 @@
                     </p:cTn>
                   </p:par>
                   <p:par>
-                    <p:cTn id="232" fill="hold">
+                    <p:cTn id="242" fill="hold">
                       <p:stCondLst>
                         <p:cond delay="indefinite"/>
                       </p:stCondLst>
                       <p:childTnLst>
                         <p:par>
-                          <p:cTn id="233" fill="hold">
+                          <p:cTn id="243" fill="hold">
                             <p:stCondLst>
                               <p:cond delay="0"/>
                             </p:stCondLst>
                             <p:childTnLst>
                               <p:par>
-                                <p:cTn id="234" presetID="35" presetClass="entr" presetSubtype="0" fill="hold" grpId="0" nodeType="clickEffect">
+                                <p:cTn id="244" presetID="35" presetClass="entr" presetSubtype="0" fill="hold" grpId="0" nodeType="clickEffect">
                                   <p:stCondLst>
                                     <p:cond delay="0"/>
                                   </p:stCondLst>
                                   <p:childTnLst>
                                     <p:set>
                                       <p:cBhvr>
-                                        <p:cTn id="235" dur="1" fill="hold">
+                                        <p:cTn id="245" dur="1" fill="hold">
                                           <p:stCondLst>
                                             <p:cond delay="0"/>
                                           </p:stCondLst>
@@ -14526,7 +14725,7 @@
                                     </p:set>
                                     <p:animEffect transition="in" filter="fade">
                                       <p:cBhvr>
-                                        <p:cTn id="236" dur="2000"/>
+                                        <p:cTn id="246" dur="2000"/>
                                         <p:tgtEl>
                                           <p:spTgt spid="37"/>
                                         </p:tgtEl>
@@ -14534,7 +14733,7 @@
                                     </p:animEffect>
                                     <p:anim calcmode="lin" valueType="num">
                                       <p:cBhvr>
-                                        <p:cTn id="237" dur="2000" fill="hold"/>
+                                        <p:cTn id="247" dur="2000" fill="hold"/>
                                         <p:tgtEl>
                                           <p:spTgt spid="37"/>
                                         </p:tgtEl>
@@ -14557,7 +14756,7 @@
                                     </p:anim>
                                     <p:anim calcmode="lin" valueType="num">
                                       <p:cBhvr>
-                                        <p:cTn id="238" dur="2000" fill="hold"/>
+                                        <p:cTn id="248" dur="2000" fill="hold"/>
                                         <p:tgtEl>
                                           <p:spTgt spid="37"/>
                                         </p:tgtEl>
@@ -14580,7 +14779,7 @@
                                     </p:anim>
                                     <p:anim calcmode="lin" valueType="num">
                                       <p:cBhvr>
-                                        <p:cTn id="239" dur="2000" fill="hold"/>
+                                        <p:cTn id="249" dur="2000" fill="hold"/>
                                         <p:tgtEl>
                                           <p:spTgt spid="37"/>
                                         </p:tgtEl>
@@ -14611,26 +14810,26 @@
                     </p:cTn>
                   </p:par>
                   <p:par>
-                    <p:cTn id="240" fill="hold">
+                    <p:cTn id="250" fill="hold">
                       <p:stCondLst>
                         <p:cond delay="indefinite"/>
                       </p:stCondLst>
                       <p:childTnLst>
                         <p:par>
-                          <p:cTn id="241" fill="hold">
+                          <p:cTn id="251" fill="hold">
                             <p:stCondLst>
                               <p:cond delay="0"/>
                             </p:stCondLst>
                             <p:childTnLst>
                               <p:par>
-                                <p:cTn id="242" presetID="26" presetClass="entr" presetSubtype="0" fill="hold" grpId="0" nodeType="clickEffect">
+                                <p:cTn id="252" presetID="1" presetClass="entr" presetSubtype="0" fill="hold" grpId="0" nodeType="clickEffect">
                                   <p:stCondLst>
                                     <p:cond delay="0"/>
                                   </p:stCondLst>
                                   <p:childTnLst>
                                     <p:set>
                                       <p:cBhvr>
-                                        <p:cTn id="243" dur="1" fill="hold">
+                                        <p:cTn id="253" dur="1" fill="hold">
                                           <p:stCondLst>
                                             <p:cond delay="0"/>
                                           </p:stCondLst>
@@ -14646,257 +14845,33 @@
                                         <p:strVal val="visible"/>
                                       </p:to>
                                     </p:set>
-                                    <p:animEffect transition="in" filter="wipe(down)">
-                                      <p:cBhvr>
-                                        <p:cTn id="244" dur="580">
+                                  </p:childTnLst>
+                                </p:cTn>
+                              </p:par>
+                              <p:par>
+                                <p:cTn id="254" presetID="1" presetClass="entr" presetSubtype="0" fill="hold" grpId="0" nodeType="withEffect">
+                                  <p:stCondLst>
+                                    <p:cond delay="0"/>
+                                  </p:stCondLst>
+                                  <p:childTnLst>
+                                    <p:set>
+                                      <p:cBhvr>
+                                        <p:cTn id="255" dur="1" fill="hold">
                                           <p:stCondLst>
                                             <p:cond delay="0"/>
                                           </p:stCondLst>
                                         </p:cTn>
                                         <p:tgtEl>
-                                          <p:spTgt spid="38"/>
-                                        </p:tgtEl>
-                                      </p:cBhvr>
-                                    </p:animEffect>
-                                    <p:anim calcmode="lin" valueType="num">
-                                      <p:cBhvr>
-                                        <p:cTn id="245" dur="1822" tmFilter="0,0; 0.14,0.36; 0.43,0.73; 0.71,0.91; 1.0,1.0">
-                                          <p:stCondLst>
-                                            <p:cond delay="0"/>
-                                          </p:stCondLst>
-                                        </p:cTn>
-                                        <p:tgtEl>
-                                          <p:spTgt spid="38"/>
-                                        </p:tgtEl>
-                                        <p:attrNameLst>
-                                          <p:attrName>ppt_x</p:attrName>
-                                        </p:attrNameLst>
-                                      </p:cBhvr>
-                                      <p:tavLst>
-                                        <p:tav tm="0">
-                                          <p:val>
-                                            <p:strVal val="#ppt_x-0.25"/>
-                                          </p:val>
-                                        </p:tav>
-                                        <p:tav tm="100000">
-                                          <p:val>
-                                            <p:strVal val="#ppt_x"/>
-                                          </p:val>
-                                        </p:tav>
-                                      </p:tavLst>
-                                    </p:anim>
-                                    <p:anim calcmode="lin" valueType="num">
-                                      <p:cBhvr>
-                                        <p:cTn id="246" dur="664" tmFilter="0.0,0.0; 0.25,0.07; 0.50,0.2; 0.75,0.467; 1.0,1.0">
-                                          <p:stCondLst>
-                                            <p:cond delay="0"/>
-                                          </p:stCondLst>
-                                        </p:cTn>
-                                        <p:tgtEl>
-                                          <p:spTgt spid="38"/>
-                                        </p:tgtEl>
-                                        <p:attrNameLst>
-                                          <p:attrName>ppt_y</p:attrName>
-                                        </p:attrNameLst>
-                                      </p:cBhvr>
-                                      <p:tavLst>
-                                        <p:tav tm="0" fmla="#ppt_y-sin(pi*$)/3">
-                                          <p:val>
-                                            <p:fltVal val="0.5"/>
-                                          </p:val>
-                                        </p:tav>
-                                        <p:tav tm="100000">
-                                          <p:val>
-                                            <p:fltVal val="1"/>
-                                          </p:val>
-                                        </p:tav>
-                                      </p:tavLst>
-                                    </p:anim>
-                                    <p:anim calcmode="lin" valueType="num">
-                                      <p:cBhvr>
-                                        <p:cTn id="247" dur="664" tmFilter="0, 0; 0.125,0.2665; 0.25,0.4; 0.375,0.465; 0.5,0.5;  0.625,0.535; 0.75,0.6; 0.875,0.7335; 1,1">
-                                          <p:stCondLst>
-                                            <p:cond delay="664"/>
-                                          </p:stCondLst>
-                                        </p:cTn>
-                                        <p:tgtEl>
-                                          <p:spTgt spid="38"/>
-                                        </p:tgtEl>
-                                        <p:attrNameLst>
-                                          <p:attrName>ppt_y</p:attrName>
-                                        </p:attrNameLst>
-                                      </p:cBhvr>
-                                      <p:tavLst>
-                                        <p:tav tm="0" fmla="#ppt_y-sin(pi*$)/9">
-                                          <p:val>
-                                            <p:fltVal val="0"/>
-                                          </p:val>
-                                        </p:tav>
-                                        <p:tav tm="100000">
-                                          <p:val>
-                                            <p:fltVal val="1"/>
-                                          </p:val>
-                                        </p:tav>
-                                      </p:tavLst>
-                                    </p:anim>
-                                    <p:anim calcmode="lin" valueType="num">
-                                      <p:cBhvr>
-                                        <p:cTn id="248" dur="332" tmFilter="0, 0; 0.125,0.2665; 0.25,0.4; 0.375,0.465; 0.5,0.5;  0.625,0.535; 0.75,0.6; 0.875,0.7335; 1,1">
-                                          <p:stCondLst>
-                                            <p:cond delay="1324"/>
-                                          </p:stCondLst>
-                                        </p:cTn>
-                                        <p:tgtEl>
-                                          <p:spTgt spid="38"/>
-                                        </p:tgtEl>
-                                        <p:attrNameLst>
-                                          <p:attrName>ppt_y</p:attrName>
-                                        </p:attrNameLst>
-                                      </p:cBhvr>
-                                      <p:tavLst>
-                                        <p:tav tm="0" fmla="#ppt_y-sin(pi*$)/27">
-                                          <p:val>
-                                            <p:fltVal val="0"/>
-                                          </p:val>
-                                        </p:tav>
-                                        <p:tav tm="100000">
-                                          <p:val>
-                                            <p:fltVal val="1"/>
-                                          </p:val>
-                                        </p:tav>
-                                      </p:tavLst>
-                                    </p:anim>
-                                    <p:anim calcmode="lin" valueType="num">
-                                      <p:cBhvr>
-                                        <p:cTn id="249" dur="164" tmFilter="0, 0; 0.125,0.2665; 0.25,0.4; 0.375,0.465; 0.5,0.5;  0.625,0.535; 0.75,0.6; 0.875,0.7335; 1,1">
-                                          <p:stCondLst>
-                                            <p:cond delay="1656"/>
-                                          </p:stCondLst>
-                                        </p:cTn>
-                                        <p:tgtEl>
-                                          <p:spTgt spid="38"/>
-                                        </p:tgtEl>
-                                        <p:attrNameLst>
-                                          <p:attrName>ppt_y</p:attrName>
-                                        </p:attrNameLst>
-                                      </p:cBhvr>
-                                      <p:tavLst>
-                                        <p:tav tm="0" fmla="#ppt_y-sin(pi*$)/81">
-                                          <p:val>
-                                            <p:fltVal val="0"/>
-                                          </p:val>
-                                        </p:tav>
-                                        <p:tav tm="100000">
-                                          <p:val>
-                                            <p:fltVal val="1"/>
-                                          </p:val>
-                                        </p:tav>
-                                      </p:tavLst>
-                                    </p:anim>
-                                    <p:animScale>
-                                      <p:cBhvr>
-                                        <p:cTn id="250" dur="26">
-                                          <p:stCondLst>
-                                            <p:cond delay="650"/>
-                                          </p:stCondLst>
-                                        </p:cTn>
-                                        <p:tgtEl>
-                                          <p:spTgt spid="38"/>
-                                        </p:tgtEl>
-                                      </p:cBhvr>
-                                      <p:to x="100000" y="60000"/>
-                                    </p:animScale>
-                                    <p:animScale>
-                                      <p:cBhvr>
-                                        <p:cTn id="251" dur="166" decel="50000">
-                                          <p:stCondLst>
-                                            <p:cond delay="676"/>
-                                          </p:stCondLst>
-                                        </p:cTn>
-                                        <p:tgtEl>
-                                          <p:spTgt spid="38"/>
-                                        </p:tgtEl>
-                                      </p:cBhvr>
-                                      <p:to x="100000" y="100000"/>
-                                    </p:animScale>
-                                    <p:animScale>
-                                      <p:cBhvr>
-                                        <p:cTn id="252" dur="26">
-                                          <p:stCondLst>
-                                            <p:cond delay="1312"/>
-                                          </p:stCondLst>
-                                        </p:cTn>
-                                        <p:tgtEl>
-                                          <p:spTgt spid="38"/>
-                                        </p:tgtEl>
-                                      </p:cBhvr>
-                                      <p:to x="100000" y="80000"/>
-                                    </p:animScale>
-                                    <p:animScale>
-                                      <p:cBhvr>
-                                        <p:cTn id="253" dur="166" decel="50000">
-                                          <p:stCondLst>
-                                            <p:cond delay="1338"/>
-                                          </p:stCondLst>
-                                        </p:cTn>
-                                        <p:tgtEl>
-                                          <p:spTgt spid="38"/>
-                                        </p:tgtEl>
-                                      </p:cBhvr>
-                                      <p:to x="100000" y="100000"/>
-                                    </p:animScale>
-                                    <p:animScale>
-                                      <p:cBhvr>
-                                        <p:cTn id="254" dur="26">
-                                          <p:stCondLst>
-                                            <p:cond delay="1642"/>
-                                          </p:stCondLst>
-                                        </p:cTn>
-                                        <p:tgtEl>
-                                          <p:spTgt spid="38"/>
-                                        </p:tgtEl>
-                                      </p:cBhvr>
-                                      <p:to x="100000" y="90000"/>
-                                    </p:animScale>
-                                    <p:animScale>
-                                      <p:cBhvr>
-                                        <p:cTn id="255" dur="166" decel="50000">
-                                          <p:stCondLst>
-                                            <p:cond delay="1668"/>
-                                          </p:stCondLst>
-                                        </p:cTn>
-                                        <p:tgtEl>
-                                          <p:spTgt spid="38"/>
-                                        </p:tgtEl>
-                                      </p:cBhvr>
-                                      <p:to x="100000" y="100000"/>
-                                    </p:animScale>
-                                    <p:animScale>
-                                      <p:cBhvr>
-                                        <p:cTn id="256" dur="26">
-                                          <p:stCondLst>
-                                            <p:cond delay="1808"/>
-                                          </p:stCondLst>
-                                        </p:cTn>
-                                        <p:tgtEl>
-                                          <p:spTgt spid="38"/>
-                                        </p:tgtEl>
-                                      </p:cBhvr>
-                                      <p:to x="100000" y="95000"/>
-                                    </p:animScale>
-                                    <p:animScale>
-                                      <p:cBhvr>
-                                        <p:cTn id="257" dur="166" decel="50000">
-                                          <p:stCondLst>
-                                            <p:cond delay="1834"/>
-                                          </p:stCondLst>
-                                        </p:cTn>
-                                        <p:tgtEl>
-                                          <p:spTgt spid="38"/>
-                                        </p:tgtEl>
-                                      </p:cBhvr>
-                                      <p:to x="100000" y="100000"/>
-                                    </p:animScale>
+                                          <p:spTgt spid="4"/>
+                                        </p:tgtEl>
+                                        <p:attrNameLst>
+                                          <p:attrName>style.visibility</p:attrName>
+                                        </p:attrNameLst>
+                                      </p:cBhvr>
+                                      <p:to>
+                                        <p:strVal val="visible"/>
+                                      </p:to>
+                                    </p:set>
                                   </p:childTnLst>
                                 </p:cTn>
                               </p:par>
@@ -14907,26 +14882,26 @@
                     </p:cTn>
                   </p:par>
                   <p:par>
-                    <p:cTn id="258" fill="hold">
+                    <p:cTn id="256" fill="hold">
                       <p:stCondLst>
                         <p:cond delay="indefinite"/>
                       </p:stCondLst>
                       <p:childTnLst>
                         <p:par>
-                          <p:cTn id="259" fill="hold">
+                          <p:cTn id="257" fill="hold">
                             <p:stCondLst>
                               <p:cond delay="0"/>
                             </p:stCondLst>
                             <p:childTnLst>
                               <p:par>
-                                <p:cTn id="260" presetID="42" presetClass="entr" presetSubtype="0" fill="hold" grpId="0" nodeType="clickEffect">
+                                <p:cTn id="258" presetID="42" presetClass="entr" presetSubtype="0" fill="hold" grpId="0" nodeType="clickEffect">
                                   <p:stCondLst>
                                     <p:cond delay="0"/>
                                   </p:stCondLst>
                                   <p:childTnLst>
                                     <p:set>
                                       <p:cBhvr>
-                                        <p:cTn id="261" dur="1" fill="hold">
+                                        <p:cTn id="259" dur="1" fill="hold">
                                           <p:stCondLst>
                                             <p:cond delay="0"/>
                                           </p:stCondLst>
@@ -14944,7 +14919,7 @@
                                     </p:set>
                                     <p:animEffect transition="in" filter="fade">
                                       <p:cBhvr>
-                                        <p:cTn id="262" dur="1000"/>
+                                        <p:cTn id="260" dur="1000"/>
                                         <p:tgtEl>
                                           <p:spTgt spid="40"/>
                                         </p:tgtEl>
@@ -14952,7 +14927,7 @@
                                     </p:animEffect>
                                     <p:anim calcmode="lin" valueType="num">
                                       <p:cBhvr>
-                                        <p:cTn id="263" dur="1000" fill="hold"/>
+                                        <p:cTn id="261" dur="1000" fill="hold"/>
                                         <p:tgtEl>
                                           <p:spTgt spid="40"/>
                                         </p:tgtEl>
@@ -14975,7 +14950,7 @@
                                     </p:anim>
                                     <p:anim calcmode="lin" valueType="num">
                                       <p:cBhvr>
-                                        <p:cTn id="264" dur="1000" fill="hold"/>
+                                        <p:cTn id="262" dur="1000" fill="hold"/>
                                         <p:tgtEl>
                                           <p:spTgt spid="40"/>
                                         </p:tgtEl>
@@ -15000,14 +14975,14 @@
                                 </p:cTn>
                               </p:par>
                               <p:par>
-                                <p:cTn id="265" presetID="42" presetClass="entr" presetSubtype="0" fill="hold" grpId="0" nodeType="withEffect">
+                                <p:cTn id="263" presetID="42" presetClass="entr" presetSubtype="0" fill="hold" grpId="0" nodeType="withEffect">
                                   <p:stCondLst>
                                     <p:cond delay="0"/>
                                   </p:stCondLst>
                                   <p:childTnLst>
                                     <p:set>
                                       <p:cBhvr>
-                                        <p:cTn id="266" dur="1" fill="hold">
+                                        <p:cTn id="264" dur="1" fill="hold">
                                           <p:stCondLst>
                                             <p:cond delay="0"/>
                                           </p:stCondLst>
@@ -15025,7 +15000,7 @@
                                     </p:set>
                                     <p:animEffect transition="in" filter="fade">
                                       <p:cBhvr>
-                                        <p:cTn id="267" dur="1000"/>
+                                        <p:cTn id="265" dur="1000"/>
                                         <p:tgtEl>
                                           <p:spTgt spid="39"/>
                                         </p:tgtEl>
@@ -15033,7 +15008,7 @@
                                     </p:animEffect>
                                     <p:anim calcmode="lin" valueType="num">
                                       <p:cBhvr>
-                                        <p:cTn id="268" dur="1000" fill="hold"/>
+                                        <p:cTn id="266" dur="1000" fill="hold"/>
                                         <p:tgtEl>
                                           <p:spTgt spid="39"/>
                                         </p:tgtEl>
@@ -15056,7 +15031,7 @@
                                     </p:anim>
                                     <p:anim calcmode="lin" valueType="num">
                                       <p:cBhvr>
-                                        <p:cTn id="269" dur="1000" fill="hold"/>
+                                        <p:cTn id="267" dur="1000" fill="hold"/>
                                         <p:tgtEl>
                                           <p:spTgt spid="39"/>
                                         </p:tgtEl>
@@ -15081,14 +15056,14 @@
                                 </p:cTn>
                               </p:par>
                               <p:par>
-                                <p:cTn id="270" presetID="42" presetClass="entr" presetSubtype="0" fill="hold" nodeType="withEffect">
+                                <p:cTn id="268" presetID="42" presetClass="entr" presetSubtype="0" fill="hold" nodeType="withEffect">
                                   <p:stCondLst>
                                     <p:cond delay="0"/>
                                   </p:stCondLst>
                                   <p:childTnLst>
                                     <p:set>
                                       <p:cBhvr>
-                                        <p:cTn id="271" dur="1" fill="hold">
+                                        <p:cTn id="269" dur="1" fill="hold">
                                           <p:stCondLst>
                                             <p:cond delay="0"/>
                                           </p:stCondLst>
@@ -15106,7 +15081,7 @@
                                     </p:set>
                                     <p:animEffect transition="in" filter="fade">
                                       <p:cBhvr>
-                                        <p:cTn id="272" dur="1000"/>
+                                        <p:cTn id="270" dur="1000"/>
                                         <p:tgtEl>
                                           <p:spTgt spid="42"/>
                                         </p:tgtEl>
@@ -15114,7 +15089,7 @@
                                     </p:animEffect>
                                     <p:anim calcmode="lin" valueType="num">
                                       <p:cBhvr>
-                                        <p:cTn id="273" dur="1000" fill="hold"/>
+                                        <p:cTn id="271" dur="1000" fill="hold"/>
                                         <p:tgtEl>
                                           <p:spTgt spid="42"/>
                                         </p:tgtEl>
@@ -15137,7 +15112,7 @@
                                     </p:anim>
                                     <p:anim calcmode="lin" valueType="num">
                                       <p:cBhvr>
-                                        <p:cTn id="274" dur="1000" fill="hold"/>
+                                        <p:cTn id="272" dur="1000" fill="hold"/>
                                         <p:tgtEl>
                                           <p:spTgt spid="42"/>
                                         </p:tgtEl>
@@ -15168,26 +15143,26 @@
                     </p:cTn>
                   </p:par>
                   <p:par>
-                    <p:cTn id="275" fill="hold">
+                    <p:cTn id="273" fill="hold">
                       <p:stCondLst>
                         <p:cond delay="indefinite"/>
                       </p:stCondLst>
                       <p:childTnLst>
                         <p:par>
-                          <p:cTn id="276" fill="hold">
+                          <p:cTn id="274" fill="hold">
                             <p:stCondLst>
                               <p:cond delay="0"/>
                             </p:stCondLst>
                             <p:childTnLst>
                               <p:par>
-                                <p:cTn id="277" presetID="42" presetClass="entr" presetSubtype="0" fill="hold" grpId="0" nodeType="clickEffect">
+                                <p:cTn id="275" presetID="42" presetClass="entr" presetSubtype="0" fill="hold" grpId="0" nodeType="clickEffect">
                                   <p:stCondLst>
                                     <p:cond delay="0"/>
                                   </p:stCondLst>
                                   <p:childTnLst>
                                     <p:set>
                                       <p:cBhvr>
-                                        <p:cTn id="278" dur="1" fill="hold">
+                                        <p:cTn id="276" dur="1" fill="hold">
                                           <p:stCondLst>
                                             <p:cond delay="0"/>
                                           </p:stCondLst>
@@ -15205,7 +15180,7 @@
                                     </p:set>
                                     <p:animEffect transition="in" filter="fade">
                                       <p:cBhvr>
-                                        <p:cTn id="279" dur="1000"/>
+                                        <p:cTn id="277" dur="1000"/>
                                         <p:tgtEl>
                                           <p:spTgt spid="53"/>
                                         </p:tgtEl>
@@ -15213,7 +15188,7 @@
                                     </p:animEffect>
                                     <p:anim calcmode="lin" valueType="num">
                                       <p:cBhvr>
-                                        <p:cTn id="280" dur="1000" fill="hold"/>
+                                        <p:cTn id="278" dur="1000" fill="hold"/>
                                         <p:tgtEl>
                                           <p:spTgt spid="53"/>
                                         </p:tgtEl>
@@ -15236,7 +15211,7 @@
                                     </p:anim>
                                     <p:anim calcmode="lin" valueType="num">
                                       <p:cBhvr>
-                                        <p:cTn id="281" dur="1000" fill="hold"/>
+                                        <p:cTn id="279" dur="1000" fill="hold"/>
                                         <p:tgtEl>
                                           <p:spTgt spid="53"/>
                                         </p:tgtEl>
@@ -15267,95 +15242,95 @@
                     </p:cTn>
                   </p:par>
                   <p:par>
-                    <p:cTn id="282" fill="hold">
+                    <p:cTn id="280" fill="hold">
                       <p:stCondLst>
                         <p:cond delay="indefinite"/>
                       </p:stCondLst>
                       <p:childTnLst>
                         <p:par>
-                          <p:cTn id="283" fill="hold">
+                          <p:cTn id="281" fill="hold">
                             <p:stCondLst>
                               <p:cond delay="0"/>
                             </p:stCondLst>
                             <p:childTnLst>
                               <p:par>
-                                <p:cTn id="284" presetID="42" presetClass="entr" presetSubtype="0" fill="hold" grpId="0" nodeType="clickEffect">
+                                <p:cTn id="282" presetID="47" presetClass="exit" presetSubtype="0" fill="hold" grpId="1" nodeType="clickEffect">
                                   <p:stCondLst>
                                     <p:cond delay="0"/>
                                   </p:stCondLst>
                                   <p:childTnLst>
+                                    <p:animEffect transition="out" filter="fade">
+                                      <p:cBhvr>
+                                        <p:cTn id="283" dur="1000"/>
+                                        <p:tgtEl>
+                                          <p:spTgt spid="54"/>
+                                        </p:tgtEl>
+                                      </p:cBhvr>
+                                    </p:animEffect>
+                                    <p:anim calcmode="lin" valueType="num">
+                                      <p:cBhvr>
+                                        <p:cTn id="284" dur="1000"/>
+                                        <p:tgtEl>
+                                          <p:spTgt spid="54"/>
+                                        </p:tgtEl>
+                                        <p:attrNameLst>
+                                          <p:attrName>ppt_x</p:attrName>
+                                        </p:attrNameLst>
+                                      </p:cBhvr>
+                                      <p:tavLst>
+                                        <p:tav tm="0">
+                                          <p:val>
+                                            <p:strVal val="ppt_x"/>
+                                          </p:val>
+                                        </p:tav>
+                                        <p:tav tm="100000">
+                                          <p:val>
+                                            <p:strVal val="ppt_x"/>
+                                          </p:val>
+                                        </p:tav>
+                                      </p:tavLst>
+                                    </p:anim>
+                                    <p:anim calcmode="lin" valueType="num">
+                                      <p:cBhvr>
+                                        <p:cTn id="285" dur="1000"/>
+                                        <p:tgtEl>
+                                          <p:spTgt spid="54"/>
+                                        </p:tgtEl>
+                                        <p:attrNameLst>
+                                          <p:attrName>ppt_y</p:attrName>
+                                        </p:attrNameLst>
+                                      </p:cBhvr>
+                                      <p:tavLst>
+                                        <p:tav tm="0">
+                                          <p:val>
+                                            <p:strVal val="ppt_y"/>
+                                          </p:val>
+                                        </p:tav>
+                                        <p:tav tm="100000">
+                                          <p:val>
+                                            <p:strVal val="ppt_y-.1"/>
+                                          </p:val>
+                                        </p:tav>
+                                      </p:tavLst>
+                                    </p:anim>
                                     <p:set>
                                       <p:cBhvr>
-                                        <p:cTn id="285" dur="1" fill="hold">
-                                          <p:stCondLst>
-                                            <p:cond delay="0"/>
-                                          </p:stCondLst>
-                                        </p:cTn>
-                                        <p:tgtEl>
-                                          <p:spTgt spid="46"/>
+                                        <p:cTn id="286" dur="1" fill="hold">
+                                          <p:stCondLst>
+                                            <p:cond delay="999"/>
+                                          </p:stCondLst>
+                                        </p:cTn>
+                                        <p:tgtEl>
+                                          <p:spTgt spid="54"/>
                                         </p:tgtEl>
                                         <p:attrNameLst>
                                           <p:attrName>style.visibility</p:attrName>
                                         </p:attrNameLst>
                                       </p:cBhvr>
                                       <p:to>
-                                        <p:strVal val="visible"/>
+                                        <p:strVal val="hidden"/>
                                       </p:to>
                                     </p:set>
-                                    <p:animEffect transition="in" filter="fade">
-                                      <p:cBhvr>
-                                        <p:cTn id="286" dur="1000"/>
-                                        <p:tgtEl>
-                                          <p:spTgt spid="46"/>
-                                        </p:tgtEl>
-                                      </p:cBhvr>
-                                    </p:animEffect>
-                                    <p:anim calcmode="lin" valueType="num">
-                                      <p:cBhvr>
-                                        <p:cTn id="287" dur="1000" fill="hold"/>
-                                        <p:tgtEl>
-                                          <p:spTgt spid="46"/>
-                                        </p:tgtEl>
-                                        <p:attrNameLst>
-                                          <p:attrName>ppt_x</p:attrName>
-                                        </p:attrNameLst>
-                                      </p:cBhvr>
-                                      <p:tavLst>
-                                        <p:tav tm="0">
-                                          <p:val>
-                                            <p:strVal val="#ppt_x"/>
-                                          </p:val>
-                                        </p:tav>
-                                        <p:tav tm="100000">
-                                          <p:val>
-                                            <p:strVal val="#ppt_x"/>
-                                          </p:val>
-                                        </p:tav>
-                                      </p:tavLst>
-                                    </p:anim>
-                                    <p:anim calcmode="lin" valueType="num">
-                                      <p:cBhvr>
-                                        <p:cTn id="288" dur="1000" fill="hold"/>
-                                        <p:tgtEl>
-                                          <p:spTgt spid="46"/>
-                                        </p:tgtEl>
-                                        <p:attrNameLst>
-                                          <p:attrName>ppt_y</p:attrName>
-                                        </p:attrNameLst>
-                                      </p:cBhvr>
-                                      <p:tavLst>
-                                        <p:tav tm="0">
-                                          <p:val>
-                                            <p:strVal val="#ppt_y+.1"/>
-                                          </p:val>
-                                        </p:tav>
-                                        <p:tav tm="100000">
-                                          <p:val>
-                                            <p:strVal val="#ppt_y"/>
-                                          </p:val>
-                                        </p:tav>
-                                      </p:tavLst>
-                                    </p:anim>
                                   </p:childTnLst>
                                 </p:cTn>
                               </p:par>
@@ -15407,15 +15382,18 @@
       <p:bldP spid="32" grpId="0"/>
       <p:bldP spid="34" grpId="0"/>
       <p:bldP spid="37" grpId="0" animBg="1"/>
-      <p:bldP spid="38" grpId="0"/>
       <p:bldP spid="39" grpId="0" animBg="1"/>
       <p:bldP spid="40" grpId="0" animBg="1"/>
-      <p:bldP spid="46" grpId="0"/>
       <p:bldP spid="45" grpId="0" animBg="1"/>
+      <p:bldP spid="45" grpId="1" animBg="1"/>
       <p:bldP spid="48" grpId="0" animBg="1"/>
+      <p:bldP spid="48" grpId="1" animBg="1"/>
       <p:bldP spid="53" grpId="0" animBg="1"/>
       <p:bldP spid="44" grpId="0" animBg="1"/>
       <p:bldP spid="54" grpId="0" animBg="1"/>
+      <p:bldP spid="54" grpId="1" animBg="1"/>
+      <p:bldP spid="4" grpId="0" animBg="1"/>
+      <p:bldP spid="38" grpId="0"/>
     </p:bldLst>
   </p:timing>
 </p:sld>
@@ -16988,7 +16966,7 @@
   <p:timing>
     <p:tnLst>
       <p:par>
-        <p:cTn xmlns:p14="http://schemas.microsoft.com/office/powerpoint/2010/main" id="1" dur="indefinite" restart="never" nodeType="tmRoot">
+        <p:cTn id="1" dur="indefinite" restart="never" nodeType="tmRoot">
           <p:childTnLst>
             <p:seq concurrent="1" nextAc="seek">
               <p:cTn id="2" dur="indefinite" nodeType="mainSeq">
@@ -24784,7 +24762,7 @@
   <p:timing>
     <p:tnLst>
       <p:par>
-        <p:cTn xmlns:p14="http://schemas.microsoft.com/office/powerpoint/2010/main" id="1" dur="indefinite" restart="never" nodeType="tmRoot">
+        <p:cTn id="1" dur="indefinite" restart="never" nodeType="tmRoot">
           <p:childTnLst>
             <p:seq concurrent="1" nextAc="seek">
               <p:cTn id="2" dur="indefinite" nodeType="mainSeq">

</xml_diff>

<commit_message>
more slides added for the day 2 lab work
</commit_message>
<xml_diff>
--- a/Intro_to_SCM_and_Git-presentation.pptx
+++ b/Intro_to_SCM_and_Git-presentation.pptx
@@ -7,18 +7,22 @@
     <p:sldMasterId id="2147483667" r:id="rId3"/>
   </p:sldMasterIdLst>
   <p:notesMasterIdLst>
-    <p:notesMasterId r:id="rId10"/>
+    <p:notesMasterId r:id="rId14"/>
   </p:notesMasterIdLst>
   <p:handoutMasterIdLst>
-    <p:handoutMasterId r:id="rId11"/>
+    <p:handoutMasterId r:id="rId15"/>
   </p:handoutMasterIdLst>
   <p:sldIdLst>
     <p:sldId id="282" r:id="rId4"/>
-    <p:sldId id="316" r:id="rId5"/>
-    <p:sldId id="320" r:id="rId6"/>
-    <p:sldId id="318" r:id="rId7"/>
-    <p:sldId id="319" r:id="rId8"/>
-    <p:sldId id="321" r:id="rId9"/>
+    <p:sldId id="320" r:id="rId5"/>
+    <p:sldId id="318" r:id="rId6"/>
+    <p:sldId id="319" r:id="rId7"/>
+    <p:sldId id="321" r:id="rId8"/>
+    <p:sldId id="322" r:id="rId9"/>
+    <p:sldId id="323" r:id="rId10"/>
+    <p:sldId id="325" r:id="rId11"/>
+    <p:sldId id="326" r:id="rId12"/>
+    <p:sldId id="327" r:id="rId13"/>
   </p:sldIdLst>
   <p:sldSz cx="9144000" cy="6858000" type="screen4x3"/>
   <p:notesSz cx="6858000" cy="9144000"/>
@@ -203,7 +207,7 @@
             <a:fld id="{45CFCF10-915A-49F5-B6D7-514E231DCDF1}" type="datetimeFigureOut">
               <a:rPr lang="en-US" smtClean="0"/>
               <a:pPr/>
-              <a:t>11/12/2014</a:t>
+              <a:t>11/15/14</a:t>
             </a:fld>
             <a:endParaRPr lang="en-US"/>
           </a:p>
@@ -370,7 +374,7 @@
             <a:fld id="{6FD0678E-F882-4F2D-B288-7FD22A23E63D}" type="datetimeFigureOut">
               <a:rPr lang="en-US" smtClean="0"/>
               <a:pPr/>
-              <a:t>11/12/2014</a:t>
+              <a:t>11/15/14</a:t>
             </a:fld>
             <a:endParaRPr lang="en-US"/>
           </a:p>
@@ -764,88 +768,6 @@
         </p:nvSpPr>
         <p:spPr/>
         <p:txBody>
-          <a:bodyPr>
-            <a:normAutofit/>
-          </a:bodyPr>
-          <a:lstStyle/>
-          <a:p>
-            <a:endParaRPr lang="en-US"/>
-          </a:p>
-        </p:txBody>
-      </p:sp>
-      <p:sp>
-        <p:nvSpPr>
-          <p:cNvPr id="4" name="Slide Number Placeholder 3"/>
-          <p:cNvSpPr>
-            <a:spLocks noGrp="1"/>
-          </p:cNvSpPr>
-          <p:nvPr>
-            <p:ph type="sldNum" sz="quarter" idx="10"/>
-          </p:nvPr>
-        </p:nvSpPr>
-        <p:spPr/>
-        <p:txBody>
-          <a:bodyPr/>
-          <a:lstStyle/>
-          <a:p>
-            <a:fld id="{5B7DCD79-E8EA-4F14-B85B-563E129758F3}" type="slidenum">
-              <a:rPr lang="en-US" smtClean="0"/>
-              <a:pPr/>
-              <a:t>2</a:t>
-            </a:fld>
-            <a:endParaRPr lang="en-US"/>
-          </a:p>
-        </p:txBody>
-      </p:sp>
-    </p:spTree>
-  </p:cSld>
-  <p:clrMapOvr>
-    <a:masterClrMapping/>
-  </p:clrMapOvr>
-</p:notes>
-</file>
-
-<file path=ppt/notesSlides/notesSlide3.xml><?xml version="1.0" encoding="utf-8"?>
-<p:notes xmlns:a="http://schemas.openxmlformats.org/drawingml/2006/main" xmlns:r="http://schemas.openxmlformats.org/officeDocument/2006/relationships" xmlns:p="http://schemas.openxmlformats.org/presentationml/2006/main">
-  <p:cSld>
-    <p:spTree>
-      <p:nvGrpSpPr>
-        <p:cNvPr id="1" name=""/>
-        <p:cNvGrpSpPr/>
-        <p:nvPr/>
-      </p:nvGrpSpPr>
-      <p:grpSpPr>
-        <a:xfrm>
-          <a:off x="0" y="0"/>
-          <a:ext cx="0" cy="0"/>
-          <a:chOff x="0" y="0"/>
-          <a:chExt cx="0" cy="0"/>
-        </a:xfrm>
-      </p:grpSpPr>
-      <p:sp>
-        <p:nvSpPr>
-          <p:cNvPr id="2" name="Slide Image Placeholder 1"/>
-          <p:cNvSpPr>
-            <a:spLocks noGrp="1" noRot="1" noChangeAspect="1"/>
-          </p:cNvSpPr>
-          <p:nvPr>
-            <p:ph type="sldImg"/>
-          </p:nvPr>
-        </p:nvSpPr>
-        <p:spPr/>
-      </p:sp>
-      <p:sp>
-        <p:nvSpPr>
-          <p:cNvPr id="3" name="Notes Placeholder 2"/>
-          <p:cNvSpPr>
-            <a:spLocks noGrp="1"/>
-          </p:cNvSpPr>
-          <p:nvPr>
-            <p:ph type="body" idx="1"/>
-          </p:nvPr>
-        </p:nvSpPr>
-        <p:spPr/>
-        <p:txBody>
           <a:bodyPr/>
           <a:lstStyle/>
           <a:p>
@@ -870,7 +792,7 @@
           <a:p>
             <a:fld id="{B1A4C5B2-AF5A-3746-A64B-FA1AFB391F9D}" type="slidenum">
               <a:rPr lang="en-US" smtClean="0"/>
-              <a:t>3</a:t>
+              <a:t>2</a:t>
             </a:fld>
             <a:endParaRPr lang="en-US"/>
           </a:p>
@@ -889,7 +811,7 @@
 </p:notes>
 </file>
 
-<file path=ppt/notesSlides/notesSlide4.xml><?xml version="1.0" encoding="utf-8"?>
+<file path=ppt/notesSlides/notesSlide3.xml><?xml version="1.0" encoding="utf-8"?>
 <p:notes xmlns:a="http://schemas.openxmlformats.org/drawingml/2006/main" xmlns:r="http://schemas.openxmlformats.org/officeDocument/2006/relationships" xmlns:p="http://schemas.openxmlformats.org/presentationml/2006/main">
   <p:cSld>
     <p:spTree>
@@ -962,7 +884,7 @@
           <a:p>
             <a:fld id="{B1A4C5B2-AF5A-3746-A64B-FA1AFB391F9D}" type="slidenum">
               <a:rPr lang="en-US" smtClean="0"/>
-              <a:t>4</a:t>
+              <a:t>3</a:t>
             </a:fld>
             <a:endParaRPr lang="en-US"/>
           </a:p>
@@ -981,7 +903,7 @@
 </p:notes>
 </file>
 
-<file path=ppt/notesSlides/notesSlide5.xml><?xml version="1.0" encoding="utf-8"?>
+<file path=ppt/notesSlides/notesSlide4.xml><?xml version="1.0" encoding="utf-8"?>
 <p:notes xmlns:a="http://schemas.openxmlformats.org/drawingml/2006/main" xmlns:r="http://schemas.openxmlformats.org/officeDocument/2006/relationships" xmlns:p="http://schemas.openxmlformats.org/presentationml/2006/main">
   <p:cSld>
     <p:spTree>
@@ -1046,7 +968,7 @@
           <a:p>
             <a:fld id="{B1A4C5B2-AF5A-3746-A64B-FA1AFB391F9D}" type="slidenum">
               <a:rPr lang="en-US" smtClean="0"/>
-              <a:t>5</a:t>
+              <a:t>4</a:t>
             </a:fld>
             <a:endParaRPr lang="en-US"/>
           </a:p>
@@ -1281,7 +1203,7 @@
             <a:fld id="{4612DF9C-874E-47D4-81D0-65C9DE5115B7}" type="datetime1">
               <a:rPr lang="en-US" smtClean="0"/>
               <a:pPr/>
-              <a:t>11/12/2014</a:t>
+              <a:t>11/15/14</a:t>
             </a:fld>
             <a:endParaRPr lang="en-US"/>
           </a:p>
@@ -1295,7 +1217,7 @@
   <p:timing>
     <p:tnLst>
       <p:par>
-        <p:cTn id="1" dur="indefinite" restart="never" nodeType="tmRoot"/>
+        <p:cTn xmlns:p14="http://schemas.microsoft.com/office/powerpoint/2010/main" id="1" dur="indefinite" restart="never" nodeType="tmRoot"/>
       </p:par>
     </p:tnLst>
   </p:timing>
@@ -1303,6 +1225,239 @@
 </file>
 
 <file path=ppt/slideLayouts/slideLayout10.xml><?xml version="1.0" encoding="utf-8"?>
+<p:sldLayout xmlns:a="http://schemas.openxmlformats.org/drawingml/2006/main" xmlns:r="http://schemas.openxmlformats.org/officeDocument/2006/relationships" xmlns:p="http://schemas.openxmlformats.org/presentationml/2006/main" userDrawn="1">
+  <p:cSld name="Innehåll med bildtext och underrubrik">
+    <p:spTree>
+      <p:nvGrpSpPr>
+        <p:cNvPr id="1" name=""/>
+        <p:cNvGrpSpPr/>
+        <p:nvPr/>
+      </p:nvGrpSpPr>
+      <p:grpSpPr>
+        <a:xfrm>
+          <a:off x="0" y="0"/>
+          <a:ext cx="0" cy="0"/>
+          <a:chOff x="0" y="0"/>
+          <a:chExt cx="0" cy="0"/>
+        </a:xfrm>
+      </p:grpSpPr>
+      <p:sp>
+        <p:nvSpPr>
+          <p:cNvPr id="5" name="Platshållare för datum 4"/>
+          <p:cNvSpPr>
+            <a:spLocks noGrp="1"/>
+          </p:cNvSpPr>
+          <p:nvPr>
+            <p:ph type="dt" sz="half" idx="10"/>
+          </p:nvPr>
+        </p:nvSpPr>
+        <p:spPr/>
+        <p:txBody>
+          <a:bodyPr/>
+          <a:lstStyle/>
+          <a:p>
+            <a:fld id="{72F8B864-2A5B-4B57-9C52-476B6FC89539}" type="datetime1">
+              <a:rPr lang="sv-SE" smtClean="0"/>
+              <a:t>11/15/14</a:t>
+            </a:fld>
+            <a:endParaRPr lang="sv-SE" dirty="0"/>
+          </a:p>
+        </p:txBody>
+      </p:sp>
+      <p:sp>
+        <p:nvSpPr>
+          <p:cNvPr id="6" name="Platshållare för sidfot 5"/>
+          <p:cNvSpPr>
+            <a:spLocks noGrp="1"/>
+          </p:cNvSpPr>
+          <p:nvPr>
+            <p:ph type="ftr" sz="quarter" idx="11"/>
+          </p:nvPr>
+        </p:nvSpPr>
+        <p:spPr/>
+        <p:txBody>
+          <a:bodyPr/>
+          <a:lstStyle/>
+          <a:p>
+            <a:endParaRPr lang="sv-SE" dirty="0"/>
+          </a:p>
+        </p:txBody>
+      </p:sp>
+      <p:sp>
+        <p:nvSpPr>
+          <p:cNvPr id="7" name="Platshållare för bildnummer 6"/>
+          <p:cNvSpPr>
+            <a:spLocks noGrp="1"/>
+          </p:cNvSpPr>
+          <p:nvPr>
+            <p:ph type="sldNum" sz="quarter" idx="12"/>
+          </p:nvPr>
+        </p:nvSpPr>
+        <p:spPr/>
+        <p:txBody>
+          <a:bodyPr/>
+          <a:lstStyle/>
+          <a:p>
+            <a:fld id="{FBD926E4-2B13-4465-A5B0-7D9EB9E6EE0C}" type="slidenum">
+              <a:rPr lang="sv-SE" smtClean="0"/>
+              <a:t>‹#›</a:t>
+            </a:fld>
+            <a:endParaRPr lang="sv-SE" dirty="0"/>
+          </a:p>
+        </p:txBody>
+      </p:sp>
+      <p:sp>
+        <p:nvSpPr>
+          <p:cNvPr id="8" name="Rubrik 7"/>
+          <p:cNvSpPr>
+            <a:spLocks noGrp="1"/>
+          </p:cNvSpPr>
+          <p:nvPr>
+            <p:ph type="title" hasCustomPrompt="1"/>
+          </p:nvPr>
+        </p:nvSpPr>
+        <p:spPr/>
+        <p:txBody>
+          <a:bodyPr/>
+          <a:lstStyle>
+            <a:lvl1pPr>
+              <a:defRPr/>
+            </a:lvl1pPr>
+          </a:lstStyle>
+          <a:p>
+            <a:r>
+              <a:rPr lang="sv-SE" dirty="0" smtClean="0"/>
+              <a:t>Rubrik</a:t>
+            </a:r>
+            <a:endParaRPr lang="sv-SE" dirty="0"/>
+          </a:p>
+        </p:txBody>
+      </p:sp>
+      <p:sp>
+        <p:nvSpPr>
+          <p:cNvPr id="10" name="Platshållare för innehåll 9"/>
+          <p:cNvSpPr>
+            <a:spLocks noGrp="1"/>
+          </p:cNvSpPr>
+          <p:nvPr>
+            <p:ph sz="quarter" idx="13" hasCustomPrompt="1"/>
+          </p:nvPr>
+        </p:nvSpPr>
+        <p:spPr>
+          <a:xfrm>
+            <a:off x="539750" y="1691943"/>
+            <a:ext cx="4752975" cy="4233335"/>
+          </a:xfrm>
+        </p:spPr>
+        <p:txBody>
+          <a:bodyPr/>
+          <a:lstStyle>
+            <a:lvl1pPr marL="0" indent="0">
+              <a:buNone/>
+              <a:defRPr/>
+            </a:lvl1pPr>
+            <a:lvl2pPr marL="288000" indent="-144000">
+              <a:buFont typeface="Arial" panose="020B0604020202020204" pitchFamily="34" charset="0"/>
+              <a:buChar char="•"/>
+              <a:defRPr/>
+            </a:lvl2pPr>
+          </a:lstStyle>
+          <a:p>
+            <a:pPr lvl="0"/>
+            <a:r>
+              <a:rPr lang="sv-SE" dirty="0" smtClean="0"/>
+              <a:t>Använd knappen Öka listnivå efter </a:t>
+            </a:r>
+            <a:r>
+              <a:rPr lang="sv-SE" dirty="0" err="1" smtClean="0"/>
+              <a:t>Enter</a:t>
+            </a:r>
+            <a:r>
+              <a:rPr lang="sv-SE" dirty="0" smtClean="0"/>
+              <a:t> för nästa nivå punktlista</a:t>
+            </a:r>
+          </a:p>
+          <a:p>
+            <a:pPr lvl="1"/>
+            <a:r>
+              <a:rPr lang="sv-SE" dirty="0" smtClean="0"/>
+              <a:t>Nivå två</a:t>
+            </a:r>
+          </a:p>
+          <a:p>
+            <a:pPr lvl="2"/>
+            <a:r>
+              <a:rPr lang="sv-SE" dirty="0" smtClean="0"/>
+              <a:t>Nivå tre</a:t>
+            </a:r>
+          </a:p>
+          <a:p>
+            <a:pPr lvl="3"/>
+            <a:r>
+              <a:rPr lang="sv-SE" dirty="0" smtClean="0"/>
+              <a:t>Nivå fyra</a:t>
+            </a:r>
+          </a:p>
+          <a:p>
+            <a:pPr lvl="4"/>
+            <a:r>
+              <a:rPr lang="sv-SE" dirty="0" smtClean="0"/>
+              <a:t>Nivå fem</a:t>
+            </a:r>
+            <a:endParaRPr lang="sv-SE" dirty="0"/>
+          </a:p>
+        </p:txBody>
+      </p:sp>
+      <p:sp>
+        <p:nvSpPr>
+          <p:cNvPr id="3" name="Platshållare för bild 2"/>
+          <p:cNvSpPr>
+            <a:spLocks noGrp="1"/>
+          </p:cNvSpPr>
+          <p:nvPr>
+            <p:ph type="pic" sz="quarter" idx="14"/>
+          </p:nvPr>
+        </p:nvSpPr>
+        <p:spPr>
+          <a:xfrm>
+            <a:off x="5580064" y="1691943"/>
+            <a:ext cx="3024187" cy="4233335"/>
+          </a:xfrm>
+        </p:spPr>
+        <p:txBody>
+          <a:bodyPr/>
+          <a:lstStyle/>
+          <a:p>
+            <a:r>
+              <a:rPr lang="sv-SE" smtClean="0"/>
+              <a:t>Klicka på ikonen för att lägga till en bild</a:t>
+            </a:r>
+            <a:endParaRPr lang="sv-SE"/>
+          </a:p>
+        </p:txBody>
+      </p:sp>
+    </p:spTree>
+    <p:extLst>
+      <p:ext uri="{BB962C8B-B14F-4D97-AF65-F5344CB8AC3E}">
+        <p14:creationId xmlns:p14="http://schemas.microsoft.com/office/powerpoint/2010/main" val="3380181402"/>
+      </p:ext>
+    </p:extLst>
+  </p:cSld>
+  <p:clrMapOvr>
+    <a:masterClrMapping/>
+  </p:clrMapOvr>
+  <mc:AlternateContent xmlns:mc="http://schemas.openxmlformats.org/markup-compatibility/2006" xmlns:p14="http://schemas.microsoft.com/office/powerpoint/2010/main">
+    <mc:Choice Requires="p14">
+      <p:transition p14:dur="0"/>
+    </mc:Choice>
+    <mc:Fallback xmlns="">
+      <p:transition/>
+    </mc:Fallback>
+  </mc:AlternateContent>
+</p:sldLayout>
+</file>
+
+<file path=ppt/slideLayouts/slideLayout11.xml><?xml version="1.0" encoding="utf-8"?>
 <p:sldLayout xmlns:a="http://schemas.openxmlformats.org/drawingml/2006/main" xmlns:r="http://schemas.openxmlformats.org/officeDocument/2006/relationships" xmlns:p="http://schemas.openxmlformats.org/presentationml/2006/main" preserve="1" userDrawn="1">
   <p:cSld name="1_Title and Content">
     <p:spTree>
@@ -1404,7 +1559,7 @@
 </p:sldLayout>
 </file>
 
-<file path=ppt/slideLayouts/slideLayout11.xml><?xml version="1.0" encoding="utf-8"?>
+<file path=ppt/slideLayouts/slideLayout12.xml><?xml version="1.0" encoding="utf-8"?>
 <p:sldLayout xmlns:a="http://schemas.openxmlformats.org/drawingml/2006/main" xmlns:r="http://schemas.openxmlformats.org/officeDocument/2006/relationships" xmlns:p="http://schemas.openxmlformats.org/presentationml/2006/main" preserve="1" userDrawn="1">
   <p:cSld name="Custom Layout">
     <p:spTree>
@@ -1491,7 +1646,7 @@
 </p:sldLayout>
 </file>
 
-<file path=ppt/slideLayouts/slideLayout12.xml><?xml version="1.0" encoding="utf-8"?>
+<file path=ppt/slideLayouts/slideLayout13.xml><?xml version="1.0" encoding="utf-8"?>
 <p:sldLayout xmlns:a="http://schemas.openxmlformats.org/drawingml/2006/main" xmlns:r="http://schemas.openxmlformats.org/officeDocument/2006/relationships" xmlns:p="http://schemas.openxmlformats.org/presentationml/2006/main" preserve="1" userDrawn="1">
   <p:cSld name="1_Custom Layout">
     <p:spTree>
@@ -1912,7 +2067,7 @@
             <a:fld id="{F1F58A51-BF2E-42AC-8E65-C585A8BA80BA}" type="datetime1">
               <a:rPr lang="en-US" smtClean="0"/>
               <a:pPr/>
-              <a:t>11/12/2014</a:t>
+              <a:t>11/15/14</a:t>
             </a:fld>
             <a:endParaRPr lang="en-US"/>
           </a:p>
@@ -2201,7 +2356,7 @@
             <a:fld id="{3000F0DF-1E7D-4DBD-833B-E7E7F0E29C0F}" type="datetime1">
               <a:rPr lang="en-US" smtClean="0"/>
               <a:pPr/>
-              <a:t>11/12/2014</a:t>
+              <a:t>11/15/14</a:t>
             </a:fld>
             <a:endParaRPr lang="en-US"/>
           </a:p>
@@ -2636,7 +2791,7 @@
             <a:fld id="{475D2F3D-312F-4B9D-A6D5-98FA0DBD9BEB}" type="datetime1">
               <a:rPr lang="en-US" smtClean="0"/>
               <a:pPr/>
-              <a:t>11/12/2014</a:t>
+              <a:t>11/15/14</a:t>
             </a:fld>
             <a:endParaRPr lang="en-US"/>
           </a:p>
@@ -2751,7 +2906,7 @@
             <a:fld id="{1F2B999D-B673-4BF6-AFED-DE82BB78A551}" type="datetime1">
               <a:rPr lang="en-US" smtClean="0"/>
               <a:pPr/>
-              <a:t>11/12/2014</a:t>
+              <a:t>11/15/14</a:t>
             </a:fld>
             <a:endParaRPr lang="en-US"/>
           </a:p>
@@ -2808,7 +2963,7 @@
   <p:timing>
     <p:tnLst>
       <p:par>
-        <p:cTn id="1" dur="indefinite" restart="never" nodeType="tmRoot"/>
+        <p:cTn xmlns:p14="http://schemas.microsoft.com/office/powerpoint/2010/main" id="1" dur="indefinite" restart="never" nodeType="tmRoot"/>
       </p:par>
     </p:tnLst>
   </p:timing>
@@ -2992,7 +3147,7 @@
             <a:fld id="{15EE75C9-4165-49D6-889E-AD319E617BC4}" type="datetime1">
               <a:rPr lang="en-US" smtClean="0"/>
               <a:pPr/>
-              <a:t>11/12/2014</a:t>
+              <a:t>11/15/14</a:t>
             </a:fld>
             <a:endParaRPr lang="en-US"/>
           </a:p>
@@ -3090,7 +3245,7 @@
   <p:timing>
     <p:tnLst>
       <p:par>
-        <p:cTn id="1" dur="indefinite" restart="never" nodeType="tmRoot"/>
+        <p:cTn xmlns:p14="http://schemas.microsoft.com/office/powerpoint/2010/main" id="1" dur="indefinite" restart="never" nodeType="tmRoot"/>
       </p:par>
     </p:tnLst>
   </p:timing>
@@ -3394,7 +3549,7 @@
           <p:nvPr/>
         </p:nvPicPr>
         <p:blipFill>
-          <a:blip r:embed="rId6" cstate="print"/>
+          <a:blip r:embed="rId7" cstate="print"/>
           <a:stretch>
             <a:fillRect/>
           </a:stretch>
@@ -3419,7 +3574,7 @@
           <p:nvPr/>
         </p:nvPicPr>
         <p:blipFill>
-          <a:blip r:embed="rId7" cstate="print"/>
+          <a:blip r:embed="rId8" cstate="print"/>
           <a:stretch>
             <a:fillRect/>
           </a:stretch>
@@ -3565,7 +3720,7 @@
             <a:fld id="{A0D14760-8281-4D63-AA62-EE78DA6EC742}" type="datetime1">
               <a:rPr lang="en-US" smtClean="0"/>
               <a:pPr/>
-              <a:t>11/12/2014</a:t>
+              <a:t>11/15/14</a:t>
             </a:fld>
             <a:endParaRPr lang="en-US"/>
           </a:p>
@@ -3656,11 +3811,12 @@
     <p:sldLayoutId id="2147483664" r:id="rId2"/>
     <p:sldLayoutId id="2147483665" r:id="rId3"/>
     <p:sldLayoutId id="2147483666" r:id="rId4"/>
+    <p:sldLayoutId id="2147483678" r:id="rId5"/>
   </p:sldLayoutIdLst>
   <p:timing>
     <p:tnLst>
       <p:par>
-        <p:cTn id="1" dur="indefinite" restart="never" nodeType="tmRoot"/>
+        <p:cTn xmlns:p14="http://schemas.microsoft.com/office/powerpoint/2010/main" id="1" dur="indefinite" restart="never" nodeType="tmRoot"/>
       </p:par>
     </p:tnLst>
   </p:timing>
@@ -4110,7 +4266,7 @@
             <a:fld id="{4062407C-A2E4-4F88-9519-110C5AA102FA}" type="datetime1">
               <a:rPr lang="en-US" smtClean="0"/>
               <a:pPr/>
-              <a:t>11/12/2014</a:t>
+              <a:t>11/15/14</a:t>
             </a:fld>
             <a:endParaRPr lang="en-US"/>
           </a:p>
@@ -4204,7 +4360,7 @@
   <p:timing>
     <p:tnLst>
       <p:par>
-        <p:cTn id="1" dur="indefinite" restart="never" nodeType="tmRoot"/>
+        <p:cTn xmlns:p14="http://schemas.microsoft.com/office/powerpoint/2010/main" id="1" dur="indefinite" restart="never" nodeType="tmRoot"/>
       </p:par>
     </p:tnLst>
   </p:timing>
@@ -4534,14 +4690,14 @@
   <p:timing>
     <p:tnLst>
       <p:par>
-        <p:cTn id="1" dur="indefinite" restart="never" nodeType="tmRoot"/>
+        <p:cTn xmlns:p14="http://schemas.microsoft.com/office/powerpoint/2010/main" id="1" dur="indefinite" restart="never" nodeType="tmRoot"/>
       </p:par>
     </p:tnLst>
   </p:timing>
 </p:sld>
 </file>
 
-<file path=ppt/slides/slide2.xml><?xml version="1.0" encoding="utf-8"?>
+<file path=ppt/slides/slide10.xml><?xml version="1.0" encoding="utf-8"?>
 <p:sld xmlns:a="http://schemas.openxmlformats.org/drawingml/2006/main" xmlns:r="http://schemas.openxmlformats.org/officeDocument/2006/relationships" xmlns:p="http://schemas.openxmlformats.org/presentationml/2006/main">
   <p:cSld>
     <p:spTree>
@@ -4560,7 +4716,30 @@
       </p:grpSpPr>
       <p:sp>
         <p:nvSpPr>
-          <p:cNvPr id="8" name="Title 7"/>
+          <p:cNvPr id="2" name="Slide Number Placeholder 1"/>
+          <p:cNvSpPr>
+            <a:spLocks noGrp="1"/>
+          </p:cNvSpPr>
+          <p:nvPr>
+            <p:ph type="sldNum" sz="quarter" idx="12"/>
+          </p:nvPr>
+        </p:nvSpPr>
+        <p:spPr/>
+        <p:txBody>
+          <a:bodyPr/>
+          <a:lstStyle/>
+          <a:p>
+            <a:fld id="{FBD926E4-2B13-4465-A5B0-7D9EB9E6EE0C}" type="slidenum">
+              <a:rPr lang="sv-SE" smtClean="0"/>
+              <a:t>10</a:t>
+            </a:fld>
+            <a:endParaRPr lang="sv-SE" dirty="0"/>
+          </a:p>
+        </p:txBody>
+      </p:sp>
+      <p:sp>
+        <p:nvSpPr>
+          <p:cNvPr id="3" name="Title 2"/>
           <p:cNvSpPr>
             <a:spLocks noGrp="1"/>
           </p:cNvSpPr>
@@ -4574,451 +4753,72 @@
           <a:lstStyle/>
           <a:p>
             <a:r>
-              <a:rPr lang="sv-SE" dirty="0" err="1" smtClean="0"/>
-              <a:t>Python</a:t>
+              <a:rPr lang="en-US" dirty="0" smtClean="0"/>
+              <a:t>Kdiff3</a:t>
             </a:r>
             <a:endParaRPr lang="en-US" dirty="0"/>
           </a:p>
         </p:txBody>
       </p:sp>
-      <p:sp>
-        <p:nvSpPr>
-          <p:cNvPr id="5" name="Slide Number Placeholder 4"/>
-          <p:cNvSpPr>
-            <a:spLocks noGrp="1"/>
-          </p:cNvSpPr>
+      <p:pic>
+        <p:nvPicPr>
+          <p:cNvPr id="9" name="Content Placeholder 8" descr="kdiff3_1.png"/>
+          <p:cNvPicPr>
+            <a:picLocks noGrp="1" noChangeAspect="1"/>
+          </p:cNvPicPr>
           <p:nvPr>
-            <p:ph type="sldNum" sz="quarter" idx="12"/>
+            <p:ph sz="quarter" idx="13"/>
           </p:nvPr>
-        </p:nvSpPr>
-        <p:spPr/>
-        <p:txBody>
-          <a:bodyPr/>
-          <a:lstStyle/>
-          <a:p>
-            <a:fld id="{11DA82ED-F820-4319-BD97-F25880B325A1}" type="slidenum">
-              <a:rPr lang="en-US" smtClean="0"/>
-              <a:pPr/>
-              <a:t>2</a:t>
-            </a:fld>
-            <a:endParaRPr lang="en-US"/>
-          </a:p>
-        </p:txBody>
-      </p:sp>
-      <p:sp>
-        <p:nvSpPr>
-          <p:cNvPr id="6" name="Rectangle 3"/>
-          <p:cNvSpPr txBox="1">
-            <a:spLocks noChangeArrowheads="1"/>
-          </p:cNvSpPr>
-          <p:nvPr/>
-        </p:nvSpPr>
+        </p:nvPicPr>
+        <p:blipFill>
+          <a:blip r:embed="rId2" cstate="print">
+            <a:extLst>
+              <a:ext uri="{28A0092B-C50C-407E-A947-70E740481C1C}">
+                <a14:useLocalDpi xmlns:a14="http://schemas.microsoft.com/office/drawing/2010/main" val="0"/>
+              </a:ext>
+            </a:extLst>
+          </a:blip>
+          <a:srcRect t="8016" b="8016"/>
+          <a:stretch>
+            <a:fillRect/>
+          </a:stretch>
+        </p:blipFill>
         <p:spPr>
           <a:xfrm>
-            <a:off x="685800" y="1484784"/>
-            <a:ext cx="7772400" cy="4611216"/>
+            <a:off x="539750" y="1628801"/>
+            <a:ext cx="8064500" cy="4295750"/>
           </a:xfrm>
-          <a:prstGeom prst="rect">
-            <a:avLst/>
-          </a:prstGeom>
         </p:spPr>
-        <p:txBody>
-          <a:bodyPr vert="horz" lIns="91440" tIns="45720" rIns="91440" bIns="45720" rtlCol="0">
-            <a:normAutofit/>
-          </a:bodyPr>
-          <a:lstStyle/>
-          <a:p>
-            <a:pPr marL="180975" marR="0" lvl="0" indent="-180975" algn="l" defTabSz="914400" rtl="0" eaLnBrk="1" fontAlgn="auto" latinLnBrk="0" hangingPunct="1">
-              <a:lnSpc>
-                <a:spcPct val="100000"/>
-              </a:lnSpc>
-              <a:spcBef>
-                <a:spcPct val="20000"/>
-              </a:spcBef>
-              <a:spcAft>
-                <a:spcPts val="0"/>
-              </a:spcAft>
-              <a:buClr>
-                <a:schemeClr val="accent3"/>
-              </a:buClr>
-              <a:buSzTx/>
-              <a:buFontTx/>
-              <a:buNone/>
-              <a:tabLst/>
-              <a:defRPr/>
-            </a:pPr>
-            <a:r>
-              <a:rPr kumimoji="0" lang="sv-SE" sz="1800" b="0" i="0" u="none" strike="noStrike" kern="1200" cap="none" spc="0" normalizeH="0" baseline="0" noProof="0" smtClean="0">
-                <a:ln>
-                  <a:noFill/>
-                </a:ln>
-                <a:solidFill>
-                  <a:schemeClr val="tx1"/>
-                </a:solidFill>
-                <a:effectLst/>
-                <a:uLnTx/>
-                <a:uFillTx/>
-                <a:latin typeface="Courier New" pitchFamily="49" charset="0"/>
-                <a:ea typeface="+mn-ea"/>
-                <a:cs typeface="+mn-cs"/>
-              </a:rPr>
-              <a:t>import os</a:t>
-            </a:r>
-          </a:p>
-          <a:p>
-            <a:pPr marL="180975" marR="0" lvl="0" indent="-180975" algn="l" defTabSz="914400" rtl="0" eaLnBrk="1" fontAlgn="auto" latinLnBrk="0" hangingPunct="1">
-              <a:lnSpc>
-                <a:spcPct val="100000"/>
-              </a:lnSpc>
-              <a:spcBef>
-                <a:spcPct val="20000"/>
-              </a:spcBef>
-              <a:spcAft>
-                <a:spcPts val="0"/>
-              </a:spcAft>
-              <a:buClr>
-                <a:schemeClr val="accent3"/>
-              </a:buClr>
-              <a:buSzTx/>
-              <a:buFontTx/>
-              <a:buNone/>
-              <a:tabLst/>
-              <a:defRPr/>
-            </a:pPr>
-            <a:r>
-              <a:rPr kumimoji="0" lang="sv-SE" sz="1800" b="0" i="0" u="none" strike="noStrike" kern="1200" cap="none" spc="0" normalizeH="0" baseline="0" noProof="0" smtClean="0">
-                <a:ln>
-                  <a:noFill/>
-                </a:ln>
-                <a:solidFill>
-                  <a:schemeClr val="tx1"/>
-                </a:solidFill>
-                <a:effectLst/>
-                <a:uLnTx/>
-                <a:uFillTx/>
-                <a:latin typeface="Courier New" pitchFamily="49" charset="0"/>
-                <a:ea typeface="+mn-ea"/>
-                <a:cs typeface="+mn-cs"/>
-              </a:rPr>
-              <a:t>from os.path import join</a:t>
-            </a:r>
-          </a:p>
-          <a:p>
-            <a:pPr marL="180975" marR="0" lvl="0" indent="-180975" algn="l" defTabSz="914400" rtl="0" eaLnBrk="1" fontAlgn="auto" latinLnBrk="0" hangingPunct="1">
-              <a:lnSpc>
-                <a:spcPct val="100000"/>
-              </a:lnSpc>
-              <a:spcBef>
-                <a:spcPct val="20000"/>
-              </a:spcBef>
-              <a:spcAft>
-                <a:spcPts val="0"/>
-              </a:spcAft>
-              <a:buClr>
-                <a:schemeClr val="accent3"/>
-              </a:buClr>
-              <a:buSzTx/>
-              <a:buFontTx/>
-              <a:buNone/>
-              <a:tabLst/>
-              <a:defRPr/>
-            </a:pPr>
-            <a:endParaRPr kumimoji="0" lang="sv-SE" sz="1800" b="0" i="0" u="none" strike="noStrike" kern="1200" cap="none" spc="0" normalizeH="0" baseline="0" noProof="0" smtClean="0">
-              <a:ln>
-                <a:noFill/>
-              </a:ln>
-              <a:solidFill>
-                <a:schemeClr val="tx1"/>
-              </a:solidFill>
-              <a:effectLst/>
-              <a:uLnTx/>
-              <a:uFillTx/>
-              <a:latin typeface="Courier New" pitchFamily="49" charset="0"/>
-              <a:ea typeface="+mn-ea"/>
-              <a:cs typeface="+mn-cs"/>
-            </a:endParaRPr>
-          </a:p>
-          <a:p>
-            <a:pPr marL="180975" marR="0" lvl="0" indent="-180975" algn="l" defTabSz="914400" rtl="0" eaLnBrk="1" fontAlgn="auto" latinLnBrk="0" hangingPunct="1">
-              <a:lnSpc>
-                <a:spcPct val="100000"/>
-              </a:lnSpc>
-              <a:spcBef>
-                <a:spcPct val="20000"/>
-              </a:spcBef>
-              <a:spcAft>
-                <a:spcPts val="0"/>
-              </a:spcAft>
-              <a:buClr>
-                <a:schemeClr val="accent3"/>
-              </a:buClr>
-              <a:buSzTx/>
-              <a:buFontTx/>
-              <a:buNone/>
-              <a:tabLst/>
-              <a:defRPr/>
-            </a:pPr>
-            <a:r>
-              <a:rPr kumimoji="0" lang="sv-SE" sz="1800" b="0" i="0" u="none" strike="noStrike" kern="1200" cap="none" spc="0" normalizeH="0" baseline="0" noProof="0" smtClean="0">
-                <a:ln>
-                  <a:noFill/>
-                </a:ln>
-                <a:solidFill>
-                  <a:schemeClr val="tx1"/>
-                </a:solidFill>
-                <a:effectLst/>
-                <a:uLnTx/>
-                <a:uFillTx/>
-                <a:latin typeface="Courier New" pitchFamily="49" charset="0"/>
-                <a:ea typeface="+mn-ea"/>
-                <a:cs typeface="+mn-cs"/>
-              </a:rPr>
-              <a:t>for root, dirs, files in os.walk('.', topdown=False):</a:t>
-            </a:r>
-          </a:p>
-          <a:p>
-            <a:pPr marL="180975" marR="0" lvl="0" indent="-180975" algn="l" defTabSz="914400" rtl="0" eaLnBrk="1" fontAlgn="auto" latinLnBrk="0" hangingPunct="1">
-              <a:lnSpc>
-                <a:spcPct val="100000"/>
-              </a:lnSpc>
-              <a:spcBef>
-                <a:spcPct val="20000"/>
-              </a:spcBef>
-              <a:spcAft>
-                <a:spcPts val="0"/>
-              </a:spcAft>
-              <a:buClr>
-                <a:schemeClr val="accent3"/>
-              </a:buClr>
-              <a:buSzTx/>
-              <a:buFontTx/>
-              <a:buNone/>
-              <a:tabLst/>
-              <a:defRPr/>
-            </a:pPr>
-            <a:r>
-              <a:rPr kumimoji="0" lang="sv-SE" sz="1800" b="0" i="0" u="none" strike="noStrike" kern="1200" cap="none" spc="0" normalizeH="0" baseline="0" noProof="0" smtClean="0">
-                <a:ln>
-                  <a:noFill/>
-                </a:ln>
-                <a:solidFill>
-                  <a:schemeClr val="tx1"/>
-                </a:solidFill>
-                <a:effectLst/>
-                <a:uLnTx/>
-                <a:uFillTx/>
-                <a:latin typeface="Courier New" pitchFamily="49" charset="0"/>
-                <a:ea typeface="+mn-ea"/>
-                <a:cs typeface="+mn-cs"/>
-              </a:rPr>
-              <a:t>    for file in files + dirs:</a:t>
-            </a:r>
-          </a:p>
-          <a:p>
-            <a:pPr marL="180975" marR="0" lvl="0" indent="-180975" algn="l" defTabSz="914400" rtl="0" eaLnBrk="1" fontAlgn="auto" latinLnBrk="0" hangingPunct="1">
-              <a:lnSpc>
-                <a:spcPct val="100000"/>
-              </a:lnSpc>
-              <a:spcBef>
-                <a:spcPct val="20000"/>
-              </a:spcBef>
-              <a:spcAft>
-                <a:spcPts val="0"/>
-              </a:spcAft>
-              <a:buClr>
-                <a:schemeClr val="accent3"/>
-              </a:buClr>
-              <a:buSzTx/>
-              <a:buFontTx/>
-              <a:buNone/>
-              <a:tabLst/>
-              <a:defRPr/>
-            </a:pPr>
-            <a:r>
-              <a:rPr kumimoji="0" lang="sv-SE" sz="1800" b="0" i="0" u="none" strike="noStrike" kern="1200" cap="none" spc="0" normalizeH="0" baseline="0" noProof="0" smtClean="0">
-                <a:ln>
-                  <a:noFill/>
-                </a:ln>
-                <a:solidFill>
-                  <a:schemeClr val="tx1"/>
-                </a:solidFill>
-                <a:effectLst/>
-                <a:uLnTx/>
-                <a:uFillTx/>
-                <a:latin typeface="Courier New" pitchFamily="49" charset="0"/>
-                <a:ea typeface="+mn-ea"/>
-                <a:cs typeface="+mn-cs"/>
-              </a:rPr>
-              <a:t>        if file.upper() == file:</a:t>
-            </a:r>
-          </a:p>
-          <a:p>
-            <a:pPr marL="180975" marR="0" lvl="0" indent="-180975" algn="l" defTabSz="914400" rtl="0" eaLnBrk="1" fontAlgn="auto" latinLnBrk="0" hangingPunct="1">
-              <a:lnSpc>
-                <a:spcPct val="100000"/>
-              </a:lnSpc>
-              <a:spcBef>
-                <a:spcPct val="20000"/>
-              </a:spcBef>
-              <a:spcAft>
-                <a:spcPts val="0"/>
-              </a:spcAft>
-              <a:buClr>
-                <a:schemeClr val="accent3"/>
-              </a:buClr>
-              <a:buSzTx/>
-              <a:buFontTx/>
-              <a:buNone/>
-              <a:tabLst/>
-              <a:defRPr/>
-            </a:pPr>
-            <a:r>
-              <a:rPr kumimoji="0" lang="sv-SE" sz="1800" b="0" i="0" u="none" strike="noStrike" kern="1200" cap="none" spc="0" normalizeH="0" baseline="0" noProof="0" smtClean="0">
-                <a:ln>
-                  <a:noFill/>
-                </a:ln>
-                <a:solidFill>
-                  <a:schemeClr val="tx1"/>
-                </a:solidFill>
-                <a:effectLst/>
-                <a:uLnTx/>
-                <a:uFillTx/>
-                <a:latin typeface="Courier New" pitchFamily="49" charset="0"/>
-                <a:ea typeface="+mn-ea"/>
-                <a:cs typeface="+mn-cs"/>
-              </a:rPr>
-              <a:t>            old = join(root, file)</a:t>
-            </a:r>
-          </a:p>
-          <a:p>
-            <a:pPr marL="180975" marR="0" lvl="0" indent="-180975" algn="l" defTabSz="914400" rtl="0" eaLnBrk="1" fontAlgn="auto" latinLnBrk="0" hangingPunct="1">
-              <a:lnSpc>
-                <a:spcPct val="100000"/>
-              </a:lnSpc>
-              <a:spcBef>
-                <a:spcPct val="20000"/>
-              </a:spcBef>
-              <a:spcAft>
-                <a:spcPts val="0"/>
-              </a:spcAft>
-              <a:buClr>
-                <a:schemeClr val="accent3"/>
-              </a:buClr>
-              <a:buSzTx/>
-              <a:buFontTx/>
-              <a:buNone/>
-              <a:tabLst/>
-              <a:defRPr/>
-            </a:pPr>
-            <a:r>
-              <a:rPr kumimoji="0" lang="sv-SE" sz="1800" b="0" i="0" u="none" strike="noStrike" kern="1200" cap="none" spc="0" normalizeH="0" baseline="0" noProof="0" smtClean="0">
-                <a:ln>
-                  <a:noFill/>
-                </a:ln>
-                <a:solidFill>
-                  <a:schemeClr val="tx1"/>
-                </a:solidFill>
-                <a:effectLst/>
-                <a:uLnTx/>
-                <a:uFillTx/>
-                <a:latin typeface="Courier New" pitchFamily="49" charset="0"/>
-                <a:ea typeface="+mn-ea"/>
-                <a:cs typeface="+mn-cs"/>
-              </a:rPr>
-              <a:t>            new = join(root, file.lower())</a:t>
-            </a:r>
-          </a:p>
-          <a:p>
-            <a:pPr marL="180975" marR="0" lvl="0" indent="-180975" algn="l" defTabSz="914400" rtl="0" eaLnBrk="1" fontAlgn="auto" latinLnBrk="0" hangingPunct="1">
-              <a:lnSpc>
-                <a:spcPct val="100000"/>
-              </a:lnSpc>
-              <a:spcBef>
-                <a:spcPct val="20000"/>
-              </a:spcBef>
-              <a:spcAft>
-                <a:spcPts val="0"/>
-              </a:spcAft>
-              <a:buClr>
-                <a:schemeClr val="accent3"/>
-              </a:buClr>
-              <a:buSzTx/>
-              <a:buFontTx/>
-              <a:buNone/>
-              <a:tabLst/>
-              <a:defRPr/>
-            </a:pPr>
-            <a:r>
-              <a:rPr kumimoji="0" lang="sv-SE" sz="1800" b="0" i="0" u="none" strike="noStrike" kern="1200" cap="none" spc="0" normalizeH="0" baseline="0" noProof="0" smtClean="0">
-                <a:ln>
-                  <a:noFill/>
-                </a:ln>
-                <a:solidFill>
-                  <a:schemeClr val="tx1"/>
-                </a:solidFill>
-                <a:effectLst/>
-                <a:uLnTx/>
-                <a:uFillTx/>
-                <a:latin typeface="Courier New" pitchFamily="49" charset="0"/>
-                <a:ea typeface="+mn-ea"/>
-                <a:cs typeface="+mn-cs"/>
-              </a:rPr>
-              <a:t>            os.rename(old, new)</a:t>
-            </a:r>
-          </a:p>
-          <a:p>
-            <a:pPr marL="180975" marR="0" lvl="0" indent="-180975" algn="l" defTabSz="914400" rtl="0" eaLnBrk="1" fontAlgn="auto" latinLnBrk="0" hangingPunct="1">
-              <a:lnSpc>
-                <a:spcPct val="80000"/>
-              </a:lnSpc>
-              <a:spcBef>
-                <a:spcPct val="20000"/>
-              </a:spcBef>
-              <a:spcAft>
-                <a:spcPts val="0"/>
-              </a:spcAft>
-              <a:buClr>
-                <a:schemeClr val="accent3"/>
-              </a:buClr>
-              <a:buSzTx/>
-              <a:buFontTx/>
-              <a:buNone/>
-              <a:tabLst/>
-              <a:defRPr/>
-            </a:pPr>
-            <a:endParaRPr kumimoji="0" lang="en-US" sz="1800" b="0" i="0" u="none" strike="noStrike" kern="1200" cap="none" spc="0" normalizeH="0" baseline="0" noProof="0" dirty="0" smtClean="0">
-              <a:ln>
-                <a:noFill/>
-              </a:ln>
-              <a:solidFill>
-                <a:schemeClr val="tx1"/>
-              </a:solidFill>
-              <a:effectLst/>
-              <a:uLnTx/>
-              <a:uFillTx/>
-              <a:latin typeface="Courier New" pitchFamily="49" charset="0"/>
-              <a:ea typeface="+mn-ea"/>
-              <a:cs typeface="+mn-cs"/>
-            </a:endParaRPr>
-          </a:p>
-        </p:txBody>
-      </p:sp>
+      </p:pic>
     </p:spTree>
+    <p:extLst>
+      <p:ext uri="{BB962C8B-B14F-4D97-AF65-F5344CB8AC3E}">
+        <p14:creationId xmlns:p14="http://schemas.microsoft.com/office/powerpoint/2010/main" val="799952648"/>
+      </p:ext>
+    </p:extLst>
   </p:cSld>
   <p:clrMapOvr>
     <a:masterClrMapping/>
   </p:clrMapOvr>
+  <mc:AlternateContent xmlns:mc="http://schemas.openxmlformats.org/markup-compatibility/2006" xmlns:p14="http://schemas.microsoft.com/office/powerpoint/2010/main">
+    <mc:Choice Requires="p14">
+      <p:transition p14:dur="0"/>
+    </mc:Choice>
+    <mc:Fallback xmlns="">
+      <p:transition/>
+    </mc:Fallback>
+  </mc:AlternateContent>
   <p:timing>
     <p:tnLst>
       <p:par>
-        <p:cTn id="1" dur="indefinite" restart="never" nodeType="tmRoot"/>
+        <p:cTn xmlns:p14="http://schemas.microsoft.com/office/powerpoint/2010/main" id="1" dur="indefinite" restart="never" nodeType="tmRoot"/>
       </p:par>
     </p:tnLst>
   </p:timing>
 </p:sld>
 </file>
 
-<file path=ppt/slides/slide3.xml><?xml version="1.0" encoding="utf-8"?>
+<file path=ppt/slides/slide2.xml><?xml version="1.0" encoding="utf-8"?>
 <p:sld xmlns:a="http://schemas.openxmlformats.org/drawingml/2006/main" xmlns:r="http://schemas.openxmlformats.org/officeDocument/2006/relationships" xmlns:p="http://schemas.openxmlformats.org/presentationml/2006/main">
   <p:cSld>
     <p:spTree>
@@ -6493,7 +6293,7 @@
   <p:timing>
     <p:tnLst>
       <p:par>
-        <p:cTn id="1" dur="indefinite" restart="never" nodeType="tmRoot">
+        <p:cTn xmlns:p14="http://schemas.microsoft.com/office/powerpoint/2010/main" id="1" dur="indefinite" restart="never" nodeType="tmRoot">
           <p:childTnLst>
             <p:seq concurrent="1" nextAc="seek">
               <p:cTn id="2" dur="indefinite" nodeType="mainSeq">
@@ -7797,7 +7597,7 @@
 </p:sld>
 </file>
 
-<file path=ppt/slides/slide4.xml><?xml version="1.0" encoding="utf-8"?>
+<file path=ppt/slides/slide3.xml><?xml version="1.0" encoding="utf-8"?>
 <p:sld xmlns:a="http://schemas.openxmlformats.org/drawingml/2006/main" xmlns:r="http://schemas.openxmlformats.org/officeDocument/2006/relationships" xmlns:p="http://schemas.openxmlformats.org/presentationml/2006/main">
   <p:cSld>
     <p:spTree>
@@ -8070,11 +7870,7 @@
           <a:p>
             <a:r>
               <a:rPr lang="en-US" i="1" dirty="0" smtClean="0"/>
-              <a:t>Alice’s </a:t>
-            </a:r>
-            <a:r>
-              <a:rPr lang="en-US" i="1" dirty="0" smtClean="0"/>
-              <a:t>branches:</a:t>
+              <a:t>Alice’s branches:</a:t>
             </a:r>
             <a:endParaRPr lang="en-US" i="1" dirty="0"/>
           </a:p>
@@ -9231,7 +9027,6 @@
               <a:rPr lang="en-US" dirty="0"/>
               <a:t>HEAD </a:t>
             </a:r>
-            <a:endParaRPr lang="en-US" dirty="0"/>
           </a:p>
         </p:txBody>
       </p:sp>
@@ -9326,7 +9121,6 @@
               <a:rPr lang="en-US" dirty="0"/>
               <a:t>HEAD </a:t>
             </a:r>
-            <a:endParaRPr lang="en-US" dirty="0"/>
           </a:p>
         </p:txBody>
       </p:sp>
@@ -9481,7 +9275,7 @@
   <p:timing>
     <p:tnLst>
       <p:par>
-        <p:cTn id="1" dur="indefinite" restart="never" nodeType="tmRoot">
+        <p:cTn xmlns:p14="http://schemas.microsoft.com/office/powerpoint/2010/main" id="1" dur="indefinite" restart="never" nodeType="tmRoot">
           <p:childTnLst>
             <p:seq concurrent="1" nextAc="seek">
               <p:cTn id="2" dur="indefinite" nodeType="mainSeq">
@@ -15399,7 +15193,7 @@
 </p:sld>
 </file>
 
-<file path=ppt/slides/slide5.xml><?xml version="1.0" encoding="utf-8"?>
+<file path=ppt/slides/slide4.xml><?xml version="1.0" encoding="utf-8"?>
 <p:sld xmlns:a="http://schemas.openxmlformats.org/drawingml/2006/main" xmlns:r="http://schemas.openxmlformats.org/officeDocument/2006/relationships" xmlns:p="http://schemas.openxmlformats.org/presentationml/2006/main">
   <p:cSld>
     <p:spTree>
@@ -16966,7 +16760,7 @@
   <p:timing>
     <p:tnLst>
       <p:par>
-        <p:cTn id="1" dur="indefinite" restart="never" nodeType="tmRoot">
+        <p:cTn xmlns:p14="http://schemas.microsoft.com/office/powerpoint/2010/main" id="1" dur="indefinite" restart="never" nodeType="tmRoot">
           <p:childTnLst>
             <p:seq concurrent="1" nextAc="seek">
               <p:cTn id="2" dur="indefinite" nodeType="mainSeq">
@@ -23034,7 +22828,7 @@
 </p:sld>
 </file>
 
-<file path=ppt/slides/slide6.xml><?xml version="1.0" encoding="utf-8"?>
+<file path=ppt/slides/slide5.xml><?xml version="1.0" encoding="utf-8"?>
 <p:sld xmlns:a="http://schemas.openxmlformats.org/drawingml/2006/main" xmlns:r="http://schemas.openxmlformats.org/officeDocument/2006/relationships" xmlns:p="http://schemas.openxmlformats.org/presentationml/2006/main">
   <p:cSld>
     <p:spTree>
@@ -24762,7 +24556,7 @@
   <p:timing>
     <p:tnLst>
       <p:par>
-        <p:cTn id="1" dur="indefinite" restart="never" nodeType="tmRoot">
+        <p:cTn xmlns:p14="http://schemas.microsoft.com/office/powerpoint/2010/main" id="1" dur="indefinite" restart="never" nodeType="tmRoot">
           <p:childTnLst>
             <p:seq concurrent="1" nextAc="seek">
               <p:cTn id="2" dur="indefinite" nodeType="mainSeq">
@@ -29060,6 +28854,3032 @@
       <p:bldP spid="53" grpId="0"/>
       <p:bldP spid="56" grpId="0"/>
     </p:bldLst>
+  </p:timing>
+</p:sld>
+</file>
+
+<file path=ppt/slides/slide6.xml><?xml version="1.0" encoding="utf-8"?>
+<p:sld xmlns:a="http://schemas.openxmlformats.org/drawingml/2006/main" xmlns:r="http://schemas.openxmlformats.org/officeDocument/2006/relationships" xmlns:p="http://schemas.openxmlformats.org/presentationml/2006/main">
+  <p:cSld>
+    <p:spTree>
+      <p:nvGrpSpPr>
+        <p:cNvPr id="1" name=""/>
+        <p:cNvGrpSpPr/>
+        <p:nvPr/>
+      </p:nvGrpSpPr>
+      <p:grpSpPr>
+        <a:xfrm>
+          <a:off x="0" y="0"/>
+          <a:ext cx="0" cy="0"/>
+          <a:chOff x="0" y="0"/>
+          <a:chExt cx="0" cy="0"/>
+        </a:xfrm>
+      </p:grpSpPr>
+      <p:sp>
+        <p:nvSpPr>
+          <p:cNvPr id="2" name="Title 1"/>
+          <p:cNvSpPr>
+            <a:spLocks noGrp="1"/>
+          </p:cNvSpPr>
+          <p:nvPr>
+            <p:ph type="title"/>
+          </p:nvPr>
+        </p:nvSpPr>
+        <p:spPr/>
+        <p:txBody>
+          <a:bodyPr/>
+          <a:lstStyle/>
+          <a:p>
+            <a:r>
+              <a:rPr lang="en-US" dirty="0" smtClean="0"/>
+              <a:t>LAB work  </a:t>
+            </a:r>
+            <a:endParaRPr lang="en-US" dirty="0"/>
+          </a:p>
+        </p:txBody>
+      </p:sp>
+      <p:sp>
+        <p:nvSpPr>
+          <p:cNvPr id="3" name="Content Placeholder 2"/>
+          <p:cNvSpPr>
+            <a:spLocks noGrp="1"/>
+          </p:cNvSpPr>
+          <p:nvPr>
+            <p:ph sz="half" idx="1"/>
+          </p:nvPr>
+        </p:nvSpPr>
+        <p:spPr/>
+        <p:txBody>
+          <a:bodyPr/>
+          <a:lstStyle/>
+          <a:p>
+            <a:r>
+              <a:rPr lang="en-US" dirty="0" err="1" smtClean="0"/>
+              <a:t>Github</a:t>
+            </a:r>
+            <a:r>
+              <a:rPr lang="en-US" dirty="0" smtClean="0"/>
+              <a:t> repository thing here and the scenario we will demonstrate in the second day together with people of the course</a:t>
+            </a:r>
+            <a:endParaRPr lang="en-US" dirty="0"/>
+          </a:p>
+        </p:txBody>
+      </p:sp>
+      <p:sp>
+        <p:nvSpPr>
+          <p:cNvPr id="4" name="Content Placeholder 3"/>
+          <p:cNvSpPr>
+            <a:spLocks noGrp="1"/>
+          </p:cNvSpPr>
+          <p:nvPr>
+            <p:ph sz="half" idx="2"/>
+          </p:nvPr>
+        </p:nvSpPr>
+        <p:spPr/>
+        <p:txBody>
+          <a:bodyPr/>
+          <a:lstStyle/>
+          <a:p>
+            <a:endParaRPr lang="en-US"/>
+          </a:p>
+        </p:txBody>
+      </p:sp>
+      <p:sp>
+        <p:nvSpPr>
+          <p:cNvPr id="5" name="Slide Number Placeholder 4"/>
+          <p:cNvSpPr>
+            <a:spLocks noGrp="1"/>
+          </p:cNvSpPr>
+          <p:nvPr>
+            <p:ph type="sldNum" sz="quarter" idx="12"/>
+          </p:nvPr>
+        </p:nvSpPr>
+        <p:spPr/>
+        <p:txBody>
+          <a:bodyPr/>
+          <a:lstStyle/>
+          <a:p>
+            <a:fld id="{11DA82ED-F820-4319-BD97-F25880B325A1}" type="slidenum">
+              <a:rPr lang="en-US" smtClean="0"/>
+              <a:pPr/>
+              <a:t>6</a:t>
+            </a:fld>
+            <a:endParaRPr lang="en-US"/>
+          </a:p>
+        </p:txBody>
+      </p:sp>
+    </p:spTree>
+    <p:extLst>
+      <p:ext uri="{BB962C8B-B14F-4D97-AF65-F5344CB8AC3E}">
+        <p14:creationId xmlns:p14="http://schemas.microsoft.com/office/powerpoint/2010/main" val="1992528243"/>
+      </p:ext>
+    </p:extLst>
+  </p:cSld>
+  <p:clrMapOvr>
+    <a:masterClrMapping/>
+  </p:clrMapOvr>
+</p:sld>
+</file>
+
+<file path=ppt/slides/slide7.xml><?xml version="1.0" encoding="utf-8"?>
+<p:sld xmlns:a="http://schemas.openxmlformats.org/drawingml/2006/main" xmlns:r="http://schemas.openxmlformats.org/officeDocument/2006/relationships" xmlns:p="http://schemas.openxmlformats.org/presentationml/2006/main">
+  <p:cSld>
+    <p:spTree>
+      <p:nvGrpSpPr>
+        <p:cNvPr id="1" name=""/>
+        <p:cNvGrpSpPr/>
+        <p:nvPr/>
+      </p:nvGrpSpPr>
+      <p:grpSpPr>
+        <a:xfrm>
+          <a:off x="0" y="0"/>
+          <a:ext cx="0" cy="0"/>
+          <a:chOff x="0" y="0"/>
+          <a:chExt cx="0" cy="0"/>
+        </a:xfrm>
+      </p:grpSpPr>
+      <p:sp>
+        <p:nvSpPr>
+          <p:cNvPr id="2" name="Title 1"/>
+          <p:cNvSpPr>
+            <a:spLocks noGrp="1"/>
+          </p:cNvSpPr>
+          <p:nvPr>
+            <p:ph type="title"/>
+          </p:nvPr>
+        </p:nvSpPr>
+        <p:spPr/>
+        <p:txBody>
+          <a:bodyPr/>
+          <a:lstStyle/>
+          <a:p>
+            <a:r>
+              <a:rPr lang="en-US" dirty="0" smtClean="0"/>
+              <a:t>GIT GUI clients</a:t>
+            </a:r>
+            <a:endParaRPr lang="en-US" dirty="0"/>
+          </a:p>
+        </p:txBody>
+      </p:sp>
+      <p:sp>
+        <p:nvSpPr>
+          <p:cNvPr id="3" name="Content Placeholder 2"/>
+          <p:cNvSpPr>
+            <a:spLocks noGrp="1"/>
+          </p:cNvSpPr>
+          <p:nvPr>
+            <p:ph sz="half" idx="1"/>
+          </p:nvPr>
+        </p:nvSpPr>
+        <p:spPr>
+          <a:xfrm>
+            <a:off x="395288" y="1341439"/>
+            <a:ext cx="3888000" cy="3599730"/>
+          </a:xfrm>
+        </p:spPr>
+        <p:txBody>
+          <a:bodyPr>
+            <a:normAutofit/>
+          </a:bodyPr>
+          <a:lstStyle/>
+          <a:p>
+            <a:r>
+              <a:rPr lang="en-US" sz="1800" dirty="0" err="1" smtClean="0"/>
+              <a:t>GIThub</a:t>
+            </a:r>
+            <a:r>
+              <a:rPr lang="en-US" sz="1800" dirty="0" smtClean="0"/>
+              <a:t> for MAC </a:t>
+            </a:r>
+          </a:p>
+          <a:p>
+            <a:r>
+              <a:rPr lang="en-US" sz="1800" dirty="0" smtClean="0"/>
+              <a:t>Tower </a:t>
+            </a:r>
+          </a:p>
+          <a:p>
+            <a:r>
+              <a:rPr lang="en-US" sz="1800" dirty="0" err="1" smtClean="0"/>
+              <a:t>GITbox</a:t>
+            </a:r>
+            <a:endParaRPr lang="en-US" sz="1800" dirty="0"/>
+          </a:p>
+          <a:p>
+            <a:r>
+              <a:rPr lang="en-US" sz="1800" dirty="0" smtClean="0"/>
+              <a:t>Source tree	</a:t>
+            </a:r>
+          </a:p>
+          <a:p>
+            <a:r>
+              <a:rPr lang="en-US" sz="1800" dirty="0" err="1" smtClean="0"/>
+              <a:t>Git</a:t>
+            </a:r>
+            <a:r>
+              <a:rPr lang="en-US" sz="1800" dirty="0" smtClean="0"/>
+              <a:t> cola </a:t>
+            </a:r>
+          </a:p>
+          <a:p>
+            <a:r>
+              <a:rPr lang="en-US" sz="1800" dirty="0" err="1" smtClean="0"/>
+              <a:t>Gitg</a:t>
+            </a:r>
+            <a:r>
+              <a:rPr lang="en-US" sz="1800" dirty="0" smtClean="0"/>
+              <a:t>	</a:t>
+            </a:r>
+            <a:endParaRPr lang="en-US" sz="1800" dirty="0"/>
+          </a:p>
+        </p:txBody>
+      </p:sp>
+      <p:sp>
+        <p:nvSpPr>
+          <p:cNvPr id="4" name="Content Placeholder 3"/>
+          <p:cNvSpPr>
+            <a:spLocks noGrp="1"/>
+          </p:cNvSpPr>
+          <p:nvPr>
+            <p:ph sz="half" idx="2"/>
+          </p:nvPr>
+        </p:nvSpPr>
+        <p:spPr/>
+        <p:txBody>
+          <a:bodyPr/>
+          <a:lstStyle/>
+          <a:p>
+            <a:r>
+              <a:rPr lang="en-US" sz="1800" dirty="0" smtClean="0"/>
+              <a:t>Find and use the one you are most comfortable with</a:t>
+            </a:r>
+          </a:p>
+          <a:p>
+            <a:r>
+              <a:rPr lang="sv-SE" sz="1800" dirty="0" smtClean="0"/>
+              <a:t> </a:t>
+            </a:r>
+            <a:r>
+              <a:rPr lang="sv-SE" sz="1800" dirty="0" err="1" smtClean="0"/>
+              <a:t>Download</a:t>
+            </a:r>
+            <a:r>
+              <a:rPr lang="sv-SE" sz="1800" dirty="0" smtClean="0"/>
+              <a:t> </a:t>
+            </a:r>
+            <a:r>
+              <a:rPr lang="sv-SE" sz="1800" dirty="0" err="1" smtClean="0"/>
+              <a:t>link</a:t>
+            </a:r>
+            <a:r>
+              <a:rPr lang="sv-SE" sz="1800" dirty="0" smtClean="0"/>
+              <a:t>:</a:t>
+            </a:r>
+            <a:endParaRPr lang="sv-SE" sz="1800" dirty="0"/>
+          </a:p>
+          <a:p>
+            <a:r>
+              <a:rPr lang="pl-PL" sz="1800" dirty="0">
+                <a:hlinkClick r:id="rId2"/>
+              </a:rPr>
+              <a:t>http</a:t>
+            </a:r>
+            <a:r>
+              <a:rPr lang="pl-PL" sz="1800" dirty="0" smtClean="0">
+                <a:hlinkClick r:id="rId2"/>
+              </a:rPr>
+              <a:t>:/</a:t>
+            </a:r>
+            <a:r>
+              <a:rPr lang="pl-PL" sz="1800" dirty="0">
+                <a:hlinkClick r:id="rId2"/>
+              </a:rPr>
+              <a:t>/git-scm.com/download/gui/</a:t>
+            </a:r>
+            <a:r>
+              <a:rPr lang="pl-PL" sz="1800" dirty="0" smtClean="0">
+                <a:hlinkClick r:id="rId2"/>
+              </a:rPr>
+              <a:t>linux</a:t>
+            </a:r>
+            <a:endParaRPr lang="pl-PL" sz="1800" dirty="0" smtClean="0"/>
+          </a:p>
+          <a:p>
+            <a:endParaRPr lang="en-US" dirty="0" smtClean="0"/>
+          </a:p>
+        </p:txBody>
+      </p:sp>
+      <p:sp>
+        <p:nvSpPr>
+          <p:cNvPr id="5" name="Slide Number Placeholder 4"/>
+          <p:cNvSpPr>
+            <a:spLocks noGrp="1"/>
+          </p:cNvSpPr>
+          <p:nvPr>
+            <p:ph type="sldNum" sz="quarter" idx="12"/>
+          </p:nvPr>
+        </p:nvSpPr>
+        <p:spPr/>
+        <p:txBody>
+          <a:bodyPr/>
+          <a:lstStyle/>
+          <a:p>
+            <a:fld id="{11DA82ED-F820-4319-BD97-F25880B325A1}" type="slidenum">
+              <a:rPr lang="en-US" smtClean="0"/>
+              <a:pPr/>
+              <a:t>7</a:t>
+            </a:fld>
+            <a:endParaRPr lang="en-US"/>
+          </a:p>
+        </p:txBody>
+      </p:sp>
+    </p:spTree>
+    <p:extLst>
+      <p:ext uri="{BB962C8B-B14F-4D97-AF65-F5344CB8AC3E}">
+        <p14:creationId xmlns:p14="http://schemas.microsoft.com/office/powerpoint/2010/main" val="1745436384"/>
+      </p:ext>
+    </p:extLst>
+  </p:cSld>
+  <p:clrMapOvr>
+    <a:masterClrMapping/>
+  </p:clrMapOvr>
+  <p:timing>
+    <p:tnLst>
+      <p:par>
+        <p:cTn xmlns:p14="http://schemas.microsoft.com/office/powerpoint/2010/main" id="1" dur="indefinite" restart="never" nodeType="tmRoot"/>
+      </p:par>
+    </p:tnLst>
+  </p:timing>
+</p:sld>
+</file>
+
+<file path=ppt/slides/slide8.xml><?xml version="1.0" encoding="utf-8"?>
+<p:sld xmlns:a="http://schemas.openxmlformats.org/drawingml/2006/main" xmlns:r="http://schemas.openxmlformats.org/officeDocument/2006/relationships" xmlns:p="http://schemas.openxmlformats.org/presentationml/2006/main">
+  <p:cSld>
+    <p:spTree>
+      <p:nvGrpSpPr>
+        <p:cNvPr id="1" name=""/>
+        <p:cNvGrpSpPr/>
+        <p:nvPr/>
+      </p:nvGrpSpPr>
+      <p:grpSpPr>
+        <a:xfrm>
+          <a:off x="0" y="0"/>
+          <a:ext cx="0" cy="0"/>
+          <a:chOff x="0" y="0"/>
+          <a:chExt cx="0" cy="0"/>
+        </a:xfrm>
+      </p:grpSpPr>
+      <p:sp>
+        <p:nvSpPr>
+          <p:cNvPr id="2" name="Date Placeholder 1"/>
+          <p:cNvSpPr>
+            <a:spLocks noGrp="1"/>
+          </p:cNvSpPr>
+          <p:nvPr>
+            <p:ph type="dt" sz="half" idx="10"/>
+          </p:nvPr>
+        </p:nvSpPr>
+        <p:spPr/>
+        <p:txBody>
+          <a:bodyPr/>
+          <a:lstStyle/>
+          <a:p>
+            <a:fld id="{72F8B864-2A5B-4B57-9C52-476B6FC89539}" type="datetime1">
+              <a:rPr lang="sv-SE" smtClean="0"/>
+              <a:t>11/15/14</a:t>
+            </a:fld>
+            <a:endParaRPr lang="sv-SE" dirty="0"/>
+          </a:p>
+        </p:txBody>
+      </p:sp>
+      <p:sp>
+        <p:nvSpPr>
+          <p:cNvPr id="3" name="Slide Number Placeholder 2"/>
+          <p:cNvSpPr>
+            <a:spLocks noGrp="1"/>
+          </p:cNvSpPr>
+          <p:nvPr>
+            <p:ph type="sldNum" sz="quarter" idx="12"/>
+          </p:nvPr>
+        </p:nvSpPr>
+        <p:spPr/>
+        <p:txBody>
+          <a:bodyPr/>
+          <a:lstStyle/>
+          <a:p>
+            <a:fld id="{FBD926E4-2B13-4465-A5B0-7D9EB9E6EE0C}" type="slidenum">
+              <a:rPr lang="sv-SE" smtClean="0"/>
+              <a:t>8</a:t>
+            </a:fld>
+            <a:endParaRPr lang="sv-SE" dirty="0"/>
+          </a:p>
+        </p:txBody>
+      </p:sp>
+      <p:sp>
+        <p:nvSpPr>
+          <p:cNvPr id="4" name="Title 3"/>
+          <p:cNvSpPr>
+            <a:spLocks noGrp="1"/>
+          </p:cNvSpPr>
+          <p:nvPr>
+            <p:ph type="title"/>
+          </p:nvPr>
+        </p:nvSpPr>
+        <p:spPr>
+          <a:xfrm>
+            <a:off x="539751" y="332656"/>
+            <a:ext cx="8064500" cy="408046"/>
+          </a:xfrm>
+        </p:spPr>
+        <p:txBody>
+          <a:bodyPr/>
+          <a:lstStyle/>
+          <a:p>
+            <a:r>
+              <a:rPr lang="en-US" dirty="0" smtClean="0"/>
+              <a:t>Source tree </a:t>
+            </a:r>
+            <a:endParaRPr lang="en-US" dirty="0"/>
+          </a:p>
+        </p:txBody>
+      </p:sp>
+      <p:pic>
+        <p:nvPicPr>
+          <p:cNvPr id="7" name="Content Placeholder 6" descr="Screen Shot 2014-11-04 at 10.05.03 PM.png"/>
+          <p:cNvPicPr>
+            <a:picLocks noGrp="1" noChangeAspect="1"/>
+          </p:cNvPicPr>
+          <p:nvPr>
+            <p:ph sz="quarter" idx="13"/>
+          </p:nvPr>
+        </p:nvPicPr>
+        <p:blipFill>
+          <a:blip r:embed="rId2">
+            <a:extLst>
+              <a:ext uri="{28A0092B-C50C-407E-A947-70E740481C1C}">
+                <a14:useLocalDpi xmlns:a14="http://schemas.microsoft.com/office/drawing/2010/main" val="0"/>
+              </a:ext>
+            </a:extLst>
+          </a:blip>
+          <a:srcRect t="12866" b="12866"/>
+          <a:stretch>
+            <a:fillRect/>
+          </a:stretch>
+        </p:blipFill>
+        <p:spPr>
+          <a:xfrm>
+            <a:off x="1115616" y="1412776"/>
+            <a:ext cx="7128792" cy="4703797"/>
+          </a:xfrm>
+        </p:spPr>
+      </p:pic>
+      <p:sp>
+        <p:nvSpPr>
+          <p:cNvPr id="8" name="Rectangle 7"/>
+          <p:cNvSpPr/>
+          <p:nvPr/>
+        </p:nvSpPr>
+        <p:spPr>
+          <a:xfrm>
+            <a:off x="2555776" y="2564904"/>
+            <a:ext cx="1224136" cy="864096"/>
+          </a:xfrm>
+          <a:prstGeom prst="rect">
+            <a:avLst/>
+          </a:prstGeom>
+          <a:solidFill>
+            <a:schemeClr val="tx1"/>
+          </a:solidFill>
+          <a:ln>
+            <a:solidFill>
+              <a:schemeClr val="accent2"/>
+            </a:solidFill>
+          </a:ln>
+        </p:spPr>
+        <p:style>
+          <a:lnRef idx="2">
+            <a:schemeClr val="accent1">
+              <a:shade val="50000"/>
+            </a:schemeClr>
+          </a:lnRef>
+          <a:fillRef idx="1">
+            <a:schemeClr val="accent1"/>
+          </a:fillRef>
+          <a:effectRef idx="0">
+            <a:schemeClr val="accent1"/>
+          </a:effectRef>
+          <a:fontRef idx="minor">
+            <a:schemeClr val="lt1"/>
+          </a:fontRef>
+        </p:style>
+        <p:txBody>
+          <a:bodyPr rtlCol="0" anchor="ctr"/>
+          <a:lstStyle/>
+          <a:p>
+            <a:pPr algn="ctr"/>
+            <a:r>
+              <a:rPr lang="en-US" sz="1400" dirty="0" smtClean="0"/>
+              <a:t>Push </a:t>
+            </a:r>
+          </a:p>
+        </p:txBody>
+      </p:sp>
+      <p:sp>
+        <p:nvSpPr>
+          <p:cNvPr id="9" name="Rectangle 8"/>
+          <p:cNvSpPr/>
+          <p:nvPr/>
+        </p:nvSpPr>
+        <p:spPr>
+          <a:xfrm>
+            <a:off x="3995936" y="2372883"/>
+            <a:ext cx="1224136" cy="864096"/>
+          </a:xfrm>
+          <a:prstGeom prst="rect">
+            <a:avLst/>
+          </a:prstGeom>
+          <a:solidFill>
+            <a:schemeClr val="tx1"/>
+          </a:solidFill>
+          <a:ln>
+            <a:solidFill>
+              <a:schemeClr val="accent2"/>
+            </a:solidFill>
+          </a:ln>
+        </p:spPr>
+        <p:style>
+          <a:lnRef idx="2">
+            <a:schemeClr val="accent1">
+              <a:shade val="50000"/>
+            </a:schemeClr>
+          </a:lnRef>
+          <a:fillRef idx="1">
+            <a:schemeClr val="accent1"/>
+          </a:fillRef>
+          <a:effectRef idx="0">
+            <a:schemeClr val="accent1"/>
+          </a:effectRef>
+          <a:fontRef idx="minor">
+            <a:schemeClr val="lt1"/>
+          </a:fontRef>
+        </p:style>
+        <p:txBody>
+          <a:bodyPr rtlCol="0" anchor="ctr"/>
+          <a:lstStyle/>
+          <a:p>
+            <a:pPr algn="ctr"/>
+            <a:r>
+              <a:rPr lang="en-US" sz="1400" dirty="0" smtClean="0"/>
+              <a:t>Pull</a:t>
+            </a:r>
+          </a:p>
+        </p:txBody>
+      </p:sp>
+      <p:sp>
+        <p:nvSpPr>
+          <p:cNvPr id="10" name="Rectangle 9"/>
+          <p:cNvSpPr/>
+          <p:nvPr/>
+        </p:nvSpPr>
+        <p:spPr>
+          <a:xfrm>
+            <a:off x="5364088" y="2372883"/>
+            <a:ext cx="1224136" cy="864096"/>
+          </a:xfrm>
+          <a:prstGeom prst="rect">
+            <a:avLst/>
+          </a:prstGeom>
+          <a:solidFill>
+            <a:schemeClr val="tx1"/>
+          </a:solidFill>
+          <a:ln>
+            <a:solidFill>
+              <a:schemeClr val="accent2"/>
+            </a:solidFill>
+          </a:ln>
+        </p:spPr>
+        <p:style>
+          <a:lnRef idx="2">
+            <a:schemeClr val="accent1">
+              <a:shade val="50000"/>
+            </a:schemeClr>
+          </a:lnRef>
+          <a:fillRef idx="1">
+            <a:schemeClr val="accent1"/>
+          </a:fillRef>
+          <a:effectRef idx="0">
+            <a:schemeClr val="accent1"/>
+          </a:effectRef>
+          <a:fontRef idx="minor">
+            <a:schemeClr val="lt1"/>
+          </a:fontRef>
+        </p:style>
+        <p:txBody>
+          <a:bodyPr rtlCol="0" anchor="ctr"/>
+          <a:lstStyle/>
+          <a:p>
+            <a:pPr algn="ctr"/>
+            <a:r>
+              <a:rPr lang="en-US" sz="1400" dirty="0" smtClean="0"/>
+              <a:t>Fetch</a:t>
+            </a:r>
+          </a:p>
+        </p:txBody>
+      </p:sp>
+      <p:sp>
+        <p:nvSpPr>
+          <p:cNvPr id="11" name="Rectangle 10"/>
+          <p:cNvSpPr/>
+          <p:nvPr/>
+        </p:nvSpPr>
+        <p:spPr>
+          <a:xfrm>
+            <a:off x="2915816" y="1556792"/>
+            <a:ext cx="1224136" cy="864096"/>
+          </a:xfrm>
+          <a:prstGeom prst="rect">
+            <a:avLst/>
+          </a:prstGeom>
+          <a:solidFill>
+            <a:schemeClr val="tx1"/>
+          </a:solidFill>
+          <a:ln>
+            <a:solidFill>
+              <a:schemeClr val="accent2"/>
+            </a:solidFill>
+          </a:ln>
+        </p:spPr>
+        <p:style>
+          <a:lnRef idx="2">
+            <a:schemeClr val="accent1">
+              <a:shade val="50000"/>
+            </a:schemeClr>
+          </a:lnRef>
+          <a:fillRef idx="1">
+            <a:schemeClr val="accent1"/>
+          </a:fillRef>
+          <a:effectRef idx="0">
+            <a:schemeClr val="accent1"/>
+          </a:effectRef>
+          <a:fontRef idx="minor">
+            <a:schemeClr val="lt1"/>
+          </a:fontRef>
+        </p:style>
+        <p:txBody>
+          <a:bodyPr rtlCol="0" anchor="ctr"/>
+          <a:lstStyle/>
+          <a:p>
+            <a:pPr algn="ctr"/>
+            <a:r>
+              <a:rPr lang="en-US" dirty="0" smtClean="0"/>
+              <a:t> </a:t>
+            </a:r>
+            <a:r>
+              <a:rPr lang="en-US" sz="1400" dirty="0" smtClean="0"/>
+              <a:t>Checkout</a:t>
+            </a:r>
+          </a:p>
+        </p:txBody>
+      </p:sp>
+      <p:sp>
+        <p:nvSpPr>
+          <p:cNvPr id="12" name="Rectangle 11"/>
+          <p:cNvSpPr/>
+          <p:nvPr/>
+        </p:nvSpPr>
+        <p:spPr>
+          <a:xfrm>
+            <a:off x="5364088" y="1412776"/>
+            <a:ext cx="1224136" cy="864096"/>
+          </a:xfrm>
+          <a:prstGeom prst="rect">
+            <a:avLst/>
+          </a:prstGeom>
+          <a:solidFill>
+            <a:schemeClr val="tx1"/>
+          </a:solidFill>
+          <a:ln>
+            <a:solidFill>
+              <a:schemeClr val="accent2"/>
+            </a:solidFill>
+          </a:ln>
+        </p:spPr>
+        <p:style>
+          <a:lnRef idx="2">
+            <a:schemeClr val="accent1">
+              <a:shade val="50000"/>
+            </a:schemeClr>
+          </a:lnRef>
+          <a:fillRef idx="1">
+            <a:schemeClr val="accent1"/>
+          </a:fillRef>
+          <a:effectRef idx="0">
+            <a:schemeClr val="accent1"/>
+          </a:effectRef>
+          <a:fontRef idx="minor">
+            <a:schemeClr val="lt1"/>
+          </a:fontRef>
+        </p:style>
+        <p:txBody>
+          <a:bodyPr rtlCol="0" anchor="ctr"/>
+          <a:lstStyle/>
+          <a:p>
+            <a:pPr algn="ctr"/>
+            <a:endParaRPr lang="en-US" dirty="0" smtClean="0"/>
+          </a:p>
+          <a:p>
+            <a:pPr algn="ctr"/>
+            <a:r>
+              <a:rPr lang="en-US" sz="1400" dirty="0" smtClean="0"/>
+              <a:t>Stash</a:t>
+            </a:r>
+          </a:p>
+          <a:p>
+            <a:pPr algn="ctr"/>
+            <a:endParaRPr lang="en-US" dirty="0" smtClean="0"/>
+          </a:p>
+        </p:txBody>
+      </p:sp>
+      <p:sp>
+        <p:nvSpPr>
+          <p:cNvPr id="13" name="Rectangle 12"/>
+          <p:cNvSpPr/>
+          <p:nvPr/>
+        </p:nvSpPr>
+        <p:spPr>
+          <a:xfrm>
+            <a:off x="3131840" y="3621021"/>
+            <a:ext cx="1224136" cy="864096"/>
+          </a:xfrm>
+          <a:prstGeom prst="rect">
+            <a:avLst/>
+          </a:prstGeom>
+          <a:solidFill>
+            <a:schemeClr val="tx1"/>
+          </a:solidFill>
+          <a:ln>
+            <a:solidFill>
+              <a:schemeClr val="accent2"/>
+            </a:solidFill>
+          </a:ln>
+        </p:spPr>
+        <p:style>
+          <a:lnRef idx="2">
+            <a:schemeClr val="accent1">
+              <a:shade val="50000"/>
+            </a:schemeClr>
+          </a:lnRef>
+          <a:fillRef idx="1">
+            <a:schemeClr val="accent1"/>
+          </a:fillRef>
+          <a:effectRef idx="0">
+            <a:schemeClr val="accent1"/>
+          </a:effectRef>
+          <a:fontRef idx="minor">
+            <a:schemeClr val="lt1"/>
+          </a:fontRef>
+        </p:style>
+        <p:txBody>
+          <a:bodyPr rtlCol="0" anchor="ctr"/>
+          <a:lstStyle/>
+          <a:p>
+            <a:pPr algn="ctr"/>
+            <a:r>
+              <a:rPr lang="en-US" dirty="0" smtClean="0"/>
+              <a:t> </a:t>
+            </a:r>
+            <a:r>
+              <a:rPr lang="en-US" sz="1400" dirty="0" smtClean="0"/>
+              <a:t>Add</a:t>
+            </a:r>
+          </a:p>
+        </p:txBody>
+      </p:sp>
+      <p:sp>
+        <p:nvSpPr>
+          <p:cNvPr id="14" name="Rectangle 13"/>
+          <p:cNvSpPr/>
+          <p:nvPr/>
+        </p:nvSpPr>
+        <p:spPr>
+          <a:xfrm>
+            <a:off x="6732240" y="1988840"/>
+            <a:ext cx="1224136" cy="864096"/>
+          </a:xfrm>
+          <a:prstGeom prst="rect">
+            <a:avLst/>
+          </a:prstGeom>
+          <a:solidFill>
+            <a:schemeClr val="tx1"/>
+          </a:solidFill>
+          <a:ln>
+            <a:solidFill>
+              <a:schemeClr val="accent2"/>
+            </a:solidFill>
+          </a:ln>
+        </p:spPr>
+        <p:style>
+          <a:lnRef idx="2">
+            <a:schemeClr val="accent1">
+              <a:shade val="50000"/>
+            </a:schemeClr>
+          </a:lnRef>
+          <a:fillRef idx="1">
+            <a:schemeClr val="accent1"/>
+          </a:fillRef>
+          <a:effectRef idx="0">
+            <a:schemeClr val="accent1"/>
+          </a:effectRef>
+          <a:fontRef idx="minor">
+            <a:schemeClr val="lt1"/>
+          </a:fontRef>
+        </p:style>
+        <p:txBody>
+          <a:bodyPr rtlCol="0" anchor="ctr"/>
+          <a:lstStyle/>
+          <a:p>
+            <a:pPr algn="ctr"/>
+            <a:r>
+              <a:rPr lang="en-US" dirty="0" smtClean="0"/>
+              <a:t> </a:t>
+            </a:r>
+            <a:r>
+              <a:rPr lang="en-US" sz="1400" dirty="0" smtClean="0"/>
+              <a:t>Remove</a:t>
+            </a:r>
+          </a:p>
+        </p:txBody>
+      </p:sp>
+      <p:sp>
+        <p:nvSpPr>
+          <p:cNvPr id="15" name="Rectangle 14"/>
+          <p:cNvSpPr/>
+          <p:nvPr/>
+        </p:nvSpPr>
+        <p:spPr>
+          <a:xfrm>
+            <a:off x="6732240" y="3140968"/>
+            <a:ext cx="1224136" cy="864096"/>
+          </a:xfrm>
+          <a:prstGeom prst="rect">
+            <a:avLst/>
+          </a:prstGeom>
+          <a:solidFill>
+            <a:schemeClr val="tx1"/>
+          </a:solidFill>
+          <a:ln>
+            <a:solidFill>
+              <a:schemeClr val="accent2"/>
+            </a:solidFill>
+          </a:ln>
+        </p:spPr>
+        <p:style>
+          <a:lnRef idx="2">
+            <a:schemeClr val="accent1">
+              <a:shade val="50000"/>
+            </a:schemeClr>
+          </a:lnRef>
+          <a:fillRef idx="1">
+            <a:schemeClr val="accent1"/>
+          </a:fillRef>
+          <a:effectRef idx="0">
+            <a:schemeClr val="accent1"/>
+          </a:effectRef>
+          <a:fontRef idx="minor">
+            <a:schemeClr val="lt1"/>
+          </a:fontRef>
+        </p:style>
+        <p:txBody>
+          <a:bodyPr rtlCol="0" anchor="ctr"/>
+          <a:lstStyle/>
+          <a:p>
+            <a:pPr algn="ctr"/>
+            <a:r>
+              <a:rPr lang="en-US" dirty="0" smtClean="0"/>
+              <a:t> </a:t>
+            </a:r>
+            <a:r>
+              <a:rPr lang="en-US" sz="1400" dirty="0" smtClean="0"/>
+              <a:t>Merge</a:t>
+            </a:r>
+          </a:p>
+        </p:txBody>
+      </p:sp>
+      <p:sp>
+        <p:nvSpPr>
+          <p:cNvPr id="16" name="Rectangle 15"/>
+          <p:cNvSpPr/>
+          <p:nvPr/>
+        </p:nvSpPr>
+        <p:spPr>
+          <a:xfrm>
+            <a:off x="4572000" y="3717032"/>
+            <a:ext cx="1224136" cy="864096"/>
+          </a:xfrm>
+          <a:prstGeom prst="rect">
+            <a:avLst/>
+          </a:prstGeom>
+          <a:solidFill>
+            <a:schemeClr val="tx1"/>
+          </a:solidFill>
+          <a:ln>
+            <a:solidFill>
+              <a:schemeClr val="accent2"/>
+            </a:solidFill>
+          </a:ln>
+        </p:spPr>
+        <p:style>
+          <a:lnRef idx="2">
+            <a:schemeClr val="accent1">
+              <a:shade val="50000"/>
+            </a:schemeClr>
+          </a:lnRef>
+          <a:fillRef idx="1">
+            <a:schemeClr val="accent1"/>
+          </a:fillRef>
+          <a:effectRef idx="0">
+            <a:schemeClr val="accent1"/>
+          </a:effectRef>
+          <a:fontRef idx="minor">
+            <a:schemeClr val="lt1"/>
+          </a:fontRef>
+        </p:style>
+        <p:txBody>
+          <a:bodyPr rtlCol="0" anchor="ctr"/>
+          <a:lstStyle/>
+          <a:p>
+            <a:pPr algn="ctr"/>
+            <a:r>
+              <a:rPr lang="en-US" sz="1400" dirty="0" smtClean="0"/>
+              <a:t> Commit</a:t>
+            </a:r>
+          </a:p>
+        </p:txBody>
+      </p:sp>
+      <p:sp>
+        <p:nvSpPr>
+          <p:cNvPr id="17" name="Rectangle 16"/>
+          <p:cNvSpPr/>
+          <p:nvPr/>
+        </p:nvSpPr>
+        <p:spPr>
+          <a:xfrm>
+            <a:off x="1907704" y="4869160"/>
+            <a:ext cx="1224136" cy="864096"/>
+          </a:xfrm>
+          <a:prstGeom prst="rect">
+            <a:avLst/>
+          </a:prstGeom>
+          <a:solidFill>
+            <a:schemeClr val="tx1"/>
+          </a:solidFill>
+          <a:ln>
+            <a:solidFill>
+              <a:schemeClr val="accent2"/>
+            </a:solidFill>
+          </a:ln>
+        </p:spPr>
+        <p:style>
+          <a:lnRef idx="2">
+            <a:schemeClr val="accent1">
+              <a:shade val="50000"/>
+            </a:schemeClr>
+          </a:lnRef>
+          <a:fillRef idx="1">
+            <a:schemeClr val="accent1"/>
+          </a:fillRef>
+          <a:effectRef idx="0">
+            <a:schemeClr val="accent1"/>
+          </a:effectRef>
+          <a:fontRef idx="minor">
+            <a:schemeClr val="lt1"/>
+          </a:fontRef>
+        </p:style>
+        <p:txBody>
+          <a:bodyPr rtlCol="0" anchor="ctr"/>
+          <a:lstStyle/>
+          <a:p>
+            <a:pPr algn="ctr"/>
+            <a:r>
+              <a:rPr lang="en-US" dirty="0" smtClean="0"/>
+              <a:t> </a:t>
+            </a:r>
+            <a:r>
+              <a:rPr lang="en-US" sz="1400" dirty="0" smtClean="0"/>
+              <a:t>Stash</a:t>
+            </a:r>
+          </a:p>
+        </p:txBody>
+      </p:sp>
+      <p:sp>
+        <p:nvSpPr>
+          <p:cNvPr id="18" name="Rectangle 17"/>
+          <p:cNvSpPr/>
+          <p:nvPr/>
+        </p:nvSpPr>
+        <p:spPr>
+          <a:xfrm>
+            <a:off x="3491880" y="5061181"/>
+            <a:ext cx="1224136" cy="864096"/>
+          </a:xfrm>
+          <a:prstGeom prst="rect">
+            <a:avLst/>
+          </a:prstGeom>
+          <a:solidFill>
+            <a:schemeClr val="tx1"/>
+          </a:solidFill>
+          <a:ln>
+            <a:solidFill>
+              <a:schemeClr val="accent2"/>
+            </a:solidFill>
+          </a:ln>
+        </p:spPr>
+        <p:style>
+          <a:lnRef idx="2">
+            <a:schemeClr val="accent1">
+              <a:shade val="50000"/>
+            </a:schemeClr>
+          </a:lnRef>
+          <a:fillRef idx="1">
+            <a:schemeClr val="accent1"/>
+          </a:fillRef>
+          <a:effectRef idx="0">
+            <a:schemeClr val="accent1"/>
+          </a:effectRef>
+          <a:fontRef idx="minor">
+            <a:schemeClr val="lt1"/>
+          </a:fontRef>
+        </p:style>
+        <p:txBody>
+          <a:bodyPr rtlCol="0" anchor="ctr"/>
+          <a:lstStyle/>
+          <a:p>
+            <a:pPr algn="ctr"/>
+            <a:r>
+              <a:rPr lang="en-US" dirty="0" smtClean="0"/>
+              <a:t> </a:t>
+            </a:r>
+            <a:r>
+              <a:rPr lang="en-US" sz="1400" dirty="0" smtClean="0"/>
+              <a:t>Stage</a:t>
+            </a:r>
+          </a:p>
+        </p:txBody>
+      </p:sp>
+      <p:sp>
+        <p:nvSpPr>
+          <p:cNvPr id="19" name="Rectangle 18"/>
+          <p:cNvSpPr/>
+          <p:nvPr/>
+        </p:nvSpPr>
+        <p:spPr>
+          <a:xfrm>
+            <a:off x="5148064" y="4869160"/>
+            <a:ext cx="1224136" cy="864096"/>
+          </a:xfrm>
+          <a:prstGeom prst="rect">
+            <a:avLst/>
+          </a:prstGeom>
+          <a:solidFill>
+            <a:schemeClr val="tx1"/>
+          </a:solidFill>
+          <a:ln>
+            <a:solidFill>
+              <a:schemeClr val="accent2"/>
+            </a:solidFill>
+          </a:ln>
+        </p:spPr>
+        <p:style>
+          <a:lnRef idx="2">
+            <a:schemeClr val="accent1">
+              <a:shade val="50000"/>
+            </a:schemeClr>
+          </a:lnRef>
+          <a:fillRef idx="1">
+            <a:schemeClr val="accent1"/>
+          </a:fillRef>
+          <a:effectRef idx="0">
+            <a:schemeClr val="accent1"/>
+          </a:effectRef>
+          <a:fontRef idx="minor">
+            <a:schemeClr val="lt1"/>
+          </a:fontRef>
+        </p:style>
+        <p:txBody>
+          <a:bodyPr rtlCol="0" anchor="ctr"/>
+          <a:lstStyle/>
+          <a:p>
+            <a:pPr algn="ctr"/>
+            <a:r>
+              <a:rPr lang="en-US" dirty="0" smtClean="0"/>
+              <a:t> </a:t>
+            </a:r>
+            <a:r>
+              <a:rPr lang="en-US" sz="1400" dirty="0" err="1" smtClean="0"/>
+              <a:t>Unstage</a:t>
+            </a:r>
+            <a:endParaRPr lang="en-US" sz="1400" dirty="0" smtClean="0"/>
+          </a:p>
+        </p:txBody>
+      </p:sp>
+      <p:sp>
+        <p:nvSpPr>
+          <p:cNvPr id="20" name="Rectangle 19"/>
+          <p:cNvSpPr/>
+          <p:nvPr/>
+        </p:nvSpPr>
+        <p:spPr>
+          <a:xfrm>
+            <a:off x="6732240" y="4485117"/>
+            <a:ext cx="1224136" cy="864096"/>
+          </a:xfrm>
+          <a:prstGeom prst="rect">
+            <a:avLst/>
+          </a:prstGeom>
+          <a:solidFill>
+            <a:schemeClr val="tx1"/>
+          </a:solidFill>
+          <a:ln>
+            <a:solidFill>
+              <a:schemeClr val="accent2"/>
+            </a:solidFill>
+          </a:ln>
+        </p:spPr>
+        <p:style>
+          <a:lnRef idx="2">
+            <a:schemeClr val="accent1">
+              <a:shade val="50000"/>
+            </a:schemeClr>
+          </a:lnRef>
+          <a:fillRef idx="1">
+            <a:schemeClr val="accent1"/>
+          </a:fillRef>
+          <a:effectRef idx="0">
+            <a:schemeClr val="accent1"/>
+          </a:effectRef>
+          <a:fontRef idx="minor">
+            <a:schemeClr val="lt1"/>
+          </a:fontRef>
+        </p:style>
+        <p:txBody>
+          <a:bodyPr rtlCol="0" anchor="ctr"/>
+          <a:lstStyle/>
+          <a:p>
+            <a:pPr algn="ctr"/>
+            <a:r>
+              <a:rPr lang="en-US" dirty="0" smtClean="0"/>
+              <a:t> </a:t>
+            </a:r>
+            <a:r>
+              <a:rPr lang="en-US" sz="1400" dirty="0" smtClean="0"/>
+              <a:t>Discard</a:t>
+            </a:r>
+          </a:p>
+        </p:txBody>
+      </p:sp>
+      <p:sp>
+        <p:nvSpPr>
+          <p:cNvPr id="21" name="Rectangle 20"/>
+          <p:cNvSpPr/>
+          <p:nvPr/>
+        </p:nvSpPr>
+        <p:spPr>
+          <a:xfrm>
+            <a:off x="1259632" y="3621021"/>
+            <a:ext cx="1224136" cy="864096"/>
+          </a:xfrm>
+          <a:prstGeom prst="rect">
+            <a:avLst/>
+          </a:prstGeom>
+          <a:solidFill>
+            <a:schemeClr val="tx2">
+              <a:lumMod val="50000"/>
+            </a:schemeClr>
+          </a:solidFill>
+          <a:ln>
+            <a:solidFill>
+              <a:schemeClr val="accent2"/>
+            </a:solidFill>
+          </a:ln>
+        </p:spPr>
+        <p:style>
+          <a:lnRef idx="2">
+            <a:schemeClr val="accent1">
+              <a:shade val="50000"/>
+            </a:schemeClr>
+          </a:lnRef>
+          <a:fillRef idx="1">
+            <a:schemeClr val="accent1"/>
+          </a:fillRef>
+          <a:effectRef idx="0">
+            <a:schemeClr val="accent1"/>
+          </a:effectRef>
+          <a:fontRef idx="minor">
+            <a:schemeClr val="lt1"/>
+          </a:fontRef>
+        </p:style>
+        <p:txBody>
+          <a:bodyPr rtlCol="0" anchor="ctr"/>
+          <a:lstStyle/>
+          <a:p>
+            <a:pPr algn="ctr"/>
+            <a:r>
+              <a:rPr lang="en-US" sz="1400" dirty="0" smtClean="0"/>
+              <a:t>.ignore</a:t>
+            </a:r>
+          </a:p>
+        </p:txBody>
+      </p:sp>
+      <p:sp>
+        <p:nvSpPr>
+          <p:cNvPr id="22" name="Rectangle 21"/>
+          <p:cNvSpPr/>
+          <p:nvPr/>
+        </p:nvSpPr>
+        <p:spPr>
+          <a:xfrm>
+            <a:off x="1187624" y="2132856"/>
+            <a:ext cx="1224136" cy="864096"/>
+          </a:xfrm>
+          <a:prstGeom prst="rect">
+            <a:avLst/>
+          </a:prstGeom>
+          <a:solidFill>
+            <a:schemeClr val="tx2">
+              <a:lumMod val="50000"/>
+            </a:schemeClr>
+          </a:solidFill>
+          <a:ln>
+            <a:solidFill>
+              <a:schemeClr val="accent2"/>
+            </a:solidFill>
+          </a:ln>
+        </p:spPr>
+        <p:style>
+          <a:lnRef idx="2">
+            <a:schemeClr val="accent1">
+              <a:shade val="50000"/>
+            </a:schemeClr>
+          </a:lnRef>
+          <a:fillRef idx="1">
+            <a:schemeClr val="accent1"/>
+          </a:fillRef>
+          <a:effectRef idx="0">
+            <a:schemeClr val="accent1"/>
+          </a:effectRef>
+          <a:fontRef idx="minor">
+            <a:schemeClr val="lt1"/>
+          </a:fontRef>
+        </p:style>
+        <p:txBody>
+          <a:bodyPr rtlCol="0" anchor="ctr"/>
+          <a:lstStyle/>
+          <a:p>
+            <a:pPr algn="ctr"/>
+            <a:r>
+              <a:rPr lang="en-US" sz="1400" dirty="0" err="1" smtClean="0"/>
+              <a:t>chery</a:t>
+            </a:r>
+            <a:r>
+              <a:rPr lang="en-US" sz="1400" dirty="0" smtClean="0"/>
+              <a:t>-pick</a:t>
+            </a:r>
+          </a:p>
+        </p:txBody>
+      </p:sp>
+    </p:spTree>
+    <p:extLst>
+      <p:ext uri="{BB962C8B-B14F-4D97-AF65-F5344CB8AC3E}">
+        <p14:creationId xmlns:p14="http://schemas.microsoft.com/office/powerpoint/2010/main" val="3625426506"/>
+      </p:ext>
+    </p:extLst>
+  </p:cSld>
+  <p:clrMapOvr>
+    <a:masterClrMapping/>
+  </p:clrMapOvr>
+  <mc:AlternateContent xmlns:mc="http://schemas.openxmlformats.org/markup-compatibility/2006" xmlns:p14="http://schemas.microsoft.com/office/powerpoint/2010/main">
+    <mc:Choice Requires="p14">
+      <p:transition p14:dur="0"/>
+    </mc:Choice>
+    <mc:Fallback xmlns="">
+      <p:transition/>
+    </mc:Fallback>
+  </mc:AlternateContent>
+  <p:timing>
+    <p:tnLst>
+      <p:par>
+        <p:cTn xmlns:p14="http://schemas.microsoft.com/office/powerpoint/2010/main" id="1" dur="indefinite" restart="never" nodeType="tmRoot">
+          <p:childTnLst>
+            <p:seq concurrent="1" nextAc="seek">
+              <p:cTn id="2" dur="indefinite" nodeType="mainSeq">
+                <p:childTnLst>
+                  <p:par>
+                    <p:cTn id="3" fill="hold">
+                      <p:stCondLst>
+                        <p:cond delay="indefinite"/>
+                      </p:stCondLst>
+                      <p:childTnLst>
+                        <p:par>
+                          <p:cTn id="4" fill="hold">
+                            <p:stCondLst>
+                              <p:cond delay="0"/>
+                            </p:stCondLst>
+                            <p:childTnLst>
+                              <p:par>
+                                <p:cTn id="5" presetID="42" presetClass="entr" presetSubtype="0" fill="hold" grpId="0" nodeType="clickEffect">
+                                  <p:stCondLst>
+                                    <p:cond delay="0"/>
+                                  </p:stCondLst>
+                                  <p:childTnLst>
+                                    <p:set>
+                                      <p:cBhvr>
+                                        <p:cTn id="6" dur="1" fill="hold">
+                                          <p:stCondLst>
+                                            <p:cond delay="0"/>
+                                          </p:stCondLst>
+                                        </p:cTn>
+                                        <p:tgtEl>
+                                          <p:spTgt spid="17"/>
+                                        </p:tgtEl>
+                                        <p:attrNameLst>
+                                          <p:attrName>style.visibility</p:attrName>
+                                        </p:attrNameLst>
+                                      </p:cBhvr>
+                                      <p:to>
+                                        <p:strVal val="visible"/>
+                                      </p:to>
+                                    </p:set>
+                                    <p:animEffect transition="in" filter="fade">
+                                      <p:cBhvr>
+                                        <p:cTn id="7" dur="1000"/>
+                                        <p:tgtEl>
+                                          <p:spTgt spid="17"/>
+                                        </p:tgtEl>
+                                      </p:cBhvr>
+                                    </p:animEffect>
+                                    <p:anim calcmode="lin" valueType="num">
+                                      <p:cBhvr>
+                                        <p:cTn id="8" dur="1000" fill="hold"/>
+                                        <p:tgtEl>
+                                          <p:spTgt spid="17"/>
+                                        </p:tgtEl>
+                                        <p:attrNameLst>
+                                          <p:attrName>ppt_x</p:attrName>
+                                        </p:attrNameLst>
+                                      </p:cBhvr>
+                                      <p:tavLst>
+                                        <p:tav tm="0">
+                                          <p:val>
+                                            <p:strVal val="#ppt_x"/>
+                                          </p:val>
+                                        </p:tav>
+                                        <p:tav tm="100000">
+                                          <p:val>
+                                            <p:strVal val="#ppt_x"/>
+                                          </p:val>
+                                        </p:tav>
+                                      </p:tavLst>
+                                    </p:anim>
+                                    <p:anim calcmode="lin" valueType="num">
+                                      <p:cBhvr>
+                                        <p:cTn id="9" dur="1000" fill="hold"/>
+                                        <p:tgtEl>
+                                          <p:spTgt spid="17"/>
+                                        </p:tgtEl>
+                                        <p:attrNameLst>
+                                          <p:attrName>ppt_y</p:attrName>
+                                        </p:attrNameLst>
+                                      </p:cBhvr>
+                                      <p:tavLst>
+                                        <p:tav tm="0">
+                                          <p:val>
+                                            <p:strVal val="#ppt_y+.1"/>
+                                          </p:val>
+                                        </p:tav>
+                                        <p:tav tm="100000">
+                                          <p:val>
+                                            <p:strVal val="#ppt_y"/>
+                                          </p:val>
+                                        </p:tav>
+                                      </p:tavLst>
+                                    </p:anim>
+                                  </p:childTnLst>
+                                </p:cTn>
+                              </p:par>
+                            </p:childTnLst>
+                          </p:cTn>
+                        </p:par>
+                      </p:childTnLst>
+                    </p:cTn>
+                  </p:par>
+                  <p:par>
+                    <p:cTn id="10" fill="hold">
+                      <p:stCondLst>
+                        <p:cond delay="indefinite"/>
+                      </p:stCondLst>
+                      <p:childTnLst>
+                        <p:par>
+                          <p:cTn id="11" fill="hold">
+                            <p:stCondLst>
+                              <p:cond delay="0"/>
+                            </p:stCondLst>
+                            <p:childTnLst>
+                              <p:par>
+                                <p:cTn id="12" presetID="42" presetClass="entr" presetSubtype="0" fill="hold" grpId="0" nodeType="clickEffect">
+                                  <p:stCondLst>
+                                    <p:cond delay="0"/>
+                                  </p:stCondLst>
+                                  <p:childTnLst>
+                                    <p:set>
+                                      <p:cBhvr>
+                                        <p:cTn id="13" dur="1" fill="hold">
+                                          <p:stCondLst>
+                                            <p:cond delay="0"/>
+                                          </p:stCondLst>
+                                        </p:cTn>
+                                        <p:tgtEl>
+                                          <p:spTgt spid="18"/>
+                                        </p:tgtEl>
+                                        <p:attrNameLst>
+                                          <p:attrName>style.visibility</p:attrName>
+                                        </p:attrNameLst>
+                                      </p:cBhvr>
+                                      <p:to>
+                                        <p:strVal val="visible"/>
+                                      </p:to>
+                                    </p:set>
+                                    <p:animEffect transition="in" filter="fade">
+                                      <p:cBhvr>
+                                        <p:cTn id="14" dur="1000"/>
+                                        <p:tgtEl>
+                                          <p:spTgt spid="18"/>
+                                        </p:tgtEl>
+                                      </p:cBhvr>
+                                    </p:animEffect>
+                                    <p:anim calcmode="lin" valueType="num">
+                                      <p:cBhvr>
+                                        <p:cTn id="15" dur="1000" fill="hold"/>
+                                        <p:tgtEl>
+                                          <p:spTgt spid="18"/>
+                                        </p:tgtEl>
+                                        <p:attrNameLst>
+                                          <p:attrName>ppt_x</p:attrName>
+                                        </p:attrNameLst>
+                                      </p:cBhvr>
+                                      <p:tavLst>
+                                        <p:tav tm="0">
+                                          <p:val>
+                                            <p:strVal val="#ppt_x"/>
+                                          </p:val>
+                                        </p:tav>
+                                        <p:tav tm="100000">
+                                          <p:val>
+                                            <p:strVal val="#ppt_x"/>
+                                          </p:val>
+                                        </p:tav>
+                                      </p:tavLst>
+                                    </p:anim>
+                                    <p:anim calcmode="lin" valueType="num">
+                                      <p:cBhvr>
+                                        <p:cTn id="16" dur="1000" fill="hold"/>
+                                        <p:tgtEl>
+                                          <p:spTgt spid="18"/>
+                                        </p:tgtEl>
+                                        <p:attrNameLst>
+                                          <p:attrName>ppt_y</p:attrName>
+                                        </p:attrNameLst>
+                                      </p:cBhvr>
+                                      <p:tavLst>
+                                        <p:tav tm="0">
+                                          <p:val>
+                                            <p:strVal val="#ppt_y+.1"/>
+                                          </p:val>
+                                        </p:tav>
+                                        <p:tav tm="100000">
+                                          <p:val>
+                                            <p:strVal val="#ppt_y"/>
+                                          </p:val>
+                                        </p:tav>
+                                      </p:tavLst>
+                                    </p:anim>
+                                  </p:childTnLst>
+                                </p:cTn>
+                              </p:par>
+                            </p:childTnLst>
+                          </p:cTn>
+                        </p:par>
+                      </p:childTnLst>
+                    </p:cTn>
+                  </p:par>
+                  <p:par>
+                    <p:cTn id="17" fill="hold">
+                      <p:stCondLst>
+                        <p:cond delay="indefinite"/>
+                      </p:stCondLst>
+                      <p:childTnLst>
+                        <p:par>
+                          <p:cTn id="18" fill="hold">
+                            <p:stCondLst>
+                              <p:cond delay="0"/>
+                            </p:stCondLst>
+                            <p:childTnLst>
+                              <p:par>
+                                <p:cTn id="19" presetID="42" presetClass="entr" presetSubtype="0" fill="hold" grpId="0" nodeType="clickEffect">
+                                  <p:stCondLst>
+                                    <p:cond delay="0"/>
+                                  </p:stCondLst>
+                                  <p:childTnLst>
+                                    <p:set>
+                                      <p:cBhvr>
+                                        <p:cTn id="20" dur="1" fill="hold">
+                                          <p:stCondLst>
+                                            <p:cond delay="0"/>
+                                          </p:stCondLst>
+                                        </p:cTn>
+                                        <p:tgtEl>
+                                          <p:spTgt spid="19"/>
+                                        </p:tgtEl>
+                                        <p:attrNameLst>
+                                          <p:attrName>style.visibility</p:attrName>
+                                        </p:attrNameLst>
+                                      </p:cBhvr>
+                                      <p:to>
+                                        <p:strVal val="visible"/>
+                                      </p:to>
+                                    </p:set>
+                                    <p:animEffect transition="in" filter="fade">
+                                      <p:cBhvr>
+                                        <p:cTn id="21" dur="1000"/>
+                                        <p:tgtEl>
+                                          <p:spTgt spid="19"/>
+                                        </p:tgtEl>
+                                      </p:cBhvr>
+                                    </p:animEffect>
+                                    <p:anim calcmode="lin" valueType="num">
+                                      <p:cBhvr>
+                                        <p:cTn id="22" dur="1000" fill="hold"/>
+                                        <p:tgtEl>
+                                          <p:spTgt spid="19"/>
+                                        </p:tgtEl>
+                                        <p:attrNameLst>
+                                          <p:attrName>ppt_x</p:attrName>
+                                        </p:attrNameLst>
+                                      </p:cBhvr>
+                                      <p:tavLst>
+                                        <p:tav tm="0">
+                                          <p:val>
+                                            <p:strVal val="#ppt_x"/>
+                                          </p:val>
+                                        </p:tav>
+                                        <p:tav tm="100000">
+                                          <p:val>
+                                            <p:strVal val="#ppt_x"/>
+                                          </p:val>
+                                        </p:tav>
+                                      </p:tavLst>
+                                    </p:anim>
+                                    <p:anim calcmode="lin" valueType="num">
+                                      <p:cBhvr>
+                                        <p:cTn id="23" dur="1000" fill="hold"/>
+                                        <p:tgtEl>
+                                          <p:spTgt spid="19"/>
+                                        </p:tgtEl>
+                                        <p:attrNameLst>
+                                          <p:attrName>ppt_y</p:attrName>
+                                        </p:attrNameLst>
+                                      </p:cBhvr>
+                                      <p:tavLst>
+                                        <p:tav tm="0">
+                                          <p:val>
+                                            <p:strVal val="#ppt_y+.1"/>
+                                          </p:val>
+                                        </p:tav>
+                                        <p:tav tm="100000">
+                                          <p:val>
+                                            <p:strVal val="#ppt_y"/>
+                                          </p:val>
+                                        </p:tav>
+                                      </p:tavLst>
+                                    </p:anim>
+                                  </p:childTnLst>
+                                </p:cTn>
+                              </p:par>
+                            </p:childTnLst>
+                          </p:cTn>
+                        </p:par>
+                      </p:childTnLst>
+                    </p:cTn>
+                  </p:par>
+                  <p:par>
+                    <p:cTn id="24" fill="hold">
+                      <p:stCondLst>
+                        <p:cond delay="indefinite"/>
+                      </p:stCondLst>
+                      <p:childTnLst>
+                        <p:par>
+                          <p:cTn id="25" fill="hold">
+                            <p:stCondLst>
+                              <p:cond delay="0"/>
+                            </p:stCondLst>
+                            <p:childTnLst>
+                              <p:par>
+                                <p:cTn id="26" presetID="42" presetClass="entr" presetSubtype="0" fill="hold" grpId="0" nodeType="clickEffect">
+                                  <p:stCondLst>
+                                    <p:cond delay="0"/>
+                                  </p:stCondLst>
+                                  <p:childTnLst>
+                                    <p:set>
+                                      <p:cBhvr>
+                                        <p:cTn id="27" dur="1" fill="hold">
+                                          <p:stCondLst>
+                                            <p:cond delay="0"/>
+                                          </p:stCondLst>
+                                        </p:cTn>
+                                        <p:tgtEl>
+                                          <p:spTgt spid="20"/>
+                                        </p:tgtEl>
+                                        <p:attrNameLst>
+                                          <p:attrName>style.visibility</p:attrName>
+                                        </p:attrNameLst>
+                                      </p:cBhvr>
+                                      <p:to>
+                                        <p:strVal val="visible"/>
+                                      </p:to>
+                                    </p:set>
+                                    <p:animEffect transition="in" filter="fade">
+                                      <p:cBhvr>
+                                        <p:cTn id="28" dur="1000"/>
+                                        <p:tgtEl>
+                                          <p:spTgt spid="20"/>
+                                        </p:tgtEl>
+                                      </p:cBhvr>
+                                    </p:animEffect>
+                                    <p:anim calcmode="lin" valueType="num">
+                                      <p:cBhvr>
+                                        <p:cTn id="29" dur="1000" fill="hold"/>
+                                        <p:tgtEl>
+                                          <p:spTgt spid="20"/>
+                                        </p:tgtEl>
+                                        <p:attrNameLst>
+                                          <p:attrName>ppt_x</p:attrName>
+                                        </p:attrNameLst>
+                                      </p:cBhvr>
+                                      <p:tavLst>
+                                        <p:tav tm="0">
+                                          <p:val>
+                                            <p:strVal val="#ppt_x"/>
+                                          </p:val>
+                                        </p:tav>
+                                        <p:tav tm="100000">
+                                          <p:val>
+                                            <p:strVal val="#ppt_x"/>
+                                          </p:val>
+                                        </p:tav>
+                                      </p:tavLst>
+                                    </p:anim>
+                                    <p:anim calcmode="lin" valueType="num">
+                                      <p:cBhvr>
+                                        <p:cTn id="30" dur="1000" fill="hold"/>
+                                        <p:tgtEl>
+                                          <p:spTgt spid="20"/>
+                                        </p:tgtEl>
+                                        <p:attrNameLst>
+                                          <p:attrName>ppt_y</p:attrName>
+                                        </p:attrNameLst>
+                                      </p:cBhvr>
+                                      <p:tavLst>
+                                        <p:tav tm="0">
+                                          <p:val>
+                                            <p:strVal val="#ppt_y+.1"/>
+                                          </p:val>
+                                        </p:tav>
+                                        <p:tav tm="100000">
+                                          <p:val>
+                                            <p:strVal val="#ppt_y"/>
+                                          </p:val>
+                                        </p:tav>
+                                      </p:tavLst>
+                                    </p:anim>
+                                  </p:childTnLst>
+                                </p:cTn>
+                              </p:par>
+                            </p:childTnLst>
+                          </p:cTn>
+                        </p:par>
+                      </p:childTnLst>
+                    </p:cTn>
+                  </p:par>
+                  <p:par>
+                    <p:cTn id="31" fill="hold">
+                      <p:stCondLst>
+                        <p:cond delay="indefinite"/>
+                      </p:stCondLst>
+                      <p:childTnLst>
+                        <p:par>
+                          <p:cTn id="32" fill="hold">
+                            <p:stCondLst>
+                              <p:cond delay="0"/>
+                            </p:stCondLst>
+                            <p:childTnLst>
+                              <p:par>
+                                <p:cTn id="33" presetID="42" presetClass="entr" presetSubtype="0" fill="hold" grpId="0" nodeType="clickEffect">
+                                  <p:stCondLst>
+                                    <p:cond delay="0"/>
+                                  </p:stCondLst>
+                                  <p:childTnLst>
+                                    <p:set>
+                                      <p:cBhvr>
+                                        <p:cTn id="34" dur="1" fill="hold">
+                                          <p:stCondLst>
+                                            <p:cond delay="0"/>
+                                          </p:stCondLst>
+                                        </p:cTn>
+                                        <p:tgtEl>
+                                          <p:spTgt spid="21"/>
+                                        </p:tgtEl>
+                                        <p:attrNameLst>
+                                          <p:attrName>style.visibility</p:attrName>
+                                        </p:attrNameLst>
+                                      </p:cBhvr>
+                                      <p:to>
+                                        <p:strVal val="visible"/>
+                                      </p:to>
+                                    </p:set>
+                                    <p:animEffect transition="in" filter="fade">
+                                      <p:cBhvr>
+                                        <p:cTn id="35" dur="1000"/>
+                                        <p:tgtEl>
+                                          <p:spTgt spid="21"/>
+                                        </p:tgtEl>
+                                      </p:cBhvr>
+                                    </p:animEffect>
+                                    <p:anim calcmode="lin" valueType="num">
+                                      <p:cBhvr>
+                                        <p:cTn id="36" dur="1000" fill="hold"/>
+                                        <p:tgtEl>
+                                          <p:spTgt spid="21"/>
+                                        </p:tgtEl>
+                                        <p:attrNameLst>
+                                          <p:attrName>ppt_x</p:attrName>
+                                        </p:attrNameLst>
+                                      </p:cBhvr>
+                                      <p:tavLst>
+                                        <p:tav tm="0">
+                                          <p:val>
+                                            <p:strVal val="#ppt_x"/>
+                                          </p:val>
+                                        </p:tav>
+                                        <p:tav tm="100000">
+                                          <p:val>
+                                            <p:strVal val="#ppt_x"/>
+                                          </p:val>
+                                        </p:tav>
+                                      </p:tavLst>
+                                    </p:anim>
+                                    <p:anim calcmode="lin" valueType="num">
+                                      <p:cBhvr>
+                                        <p:cTn id="37" dur="1000" fill="hold"/>
+                                        <p:tgtEl>
+                                          <p:spTgt spid="21"/>
+                                        </p:tgtEl>
+                                        <p:attrNameLst>
+                                          <p:attrName>ppt_y</p:attrName>
+                                        </p:attrNameLst>
+                                      </p:cBhvr>
+                                      <p:tavLst>
+                                        <p:tav tm="0">
+                                          <p:val>
+                                            <p:strVal val="#ppt_y+.1"/>
+                                          </p:val>
+                                        </p:tav>
+                                        <p:tav tm="100000">
+                                          <p:val>
+                                            <p:strVal val="#ppt_y"/>
+                                          </p:val>
+                                        </p:tav>
+                                      </p:tavLst>
+                                    </p:anim>
+                                  </p:childTnLst>
+                                </p:cTn>
+                              </p:par>
+                            </p:childTnLst>
+                          </p:cTn>
+                        </p:par>
+                      </p:childTnLst>
+                    </p:cTn>
+                  </p:par>
+                  <p:par>
+                    <p:cTn id="38" fill="hold">
+                      <p:stCondLst>
+                        <p:cond delay="indefinite"/>
+                      </p:stCondLst>
+                      <p:childTnLst>
+                        <p:par>
+                          <p:cTn id="39" fill="hold">
+                            <p:stCondLst>
+                              <p:cond delay="0"/>
+                            </p:stCondLst>
+                            <p:childTnLst>
+                              <p:par>
+                                <p:cTn id="40" presetID="42" presetClass="entr" presetSubtype="0" fill="hold" grpId="0" nodeType="clickEffect">
+                                  <p:stCondLst>
+                                    <p:cond delay="0"/>
+                                  </p:stCondLst>
+                                  <p:childTnLst>
+                                    <p:set>
+                                      <p:cBhvr>
+                                        <p:cTn id="41" dur="1" fill="hold">
+                                          <p:stCondLst>
+                                            <p:cond delay="0"/>
+                                          </p:stCondLst>
+                                        </p:cTn>
+                                        <p:tgtEl>
+                                          <p:spTgt spid="13"/>
+                                        </p:tgtEl>
+                                        <p:attrNameLst>
+                                          <p:attrName>style.visibility</p:attrName>
+                                        </p:attrNameLst>
+                                      </p:cBhvr>
+                                      <p:to>
+                                        <p:strVal val="visible"/>
+                                      </p:to>
+                                    </p:set>
+                                    <p:animEffect transition="in" filter="fade">
+                                      <p:cBhvr>
+                                        <p:cTn id="42" dur="1000"/>
+                                        <p:tgtEl>
+                                          <p:spTgt spid="13"/>
+                                        </p:tgtEl>
+                                      </p:cBhvr>
+                                    </p:animEffect>
+                                    <p:anim calcmode="lin" valueType="num">
+                                      <p:cBhvr>
+                                        <p:cTn id="43" dur="1000" fill="hold"/>
+                                        <p:tgtEl>
+                                          <p:spTgt spid="13"/>
+                                        </p:tgtEl>
+                                        <p:attrNameLst>
+                                          <p:attrName>ppt_x</p:attrName>
+                                        </p:attrNameLst>
+                                      </p:cBhvr>
+                                      <p:tavLst>
+                                        <p:tav tm="0">
+                                          <p:val>
+                                            <p:strVal val="#ppt_x"/>
+                                          </p:val>
+                                        </p:tav>
+                                        <p:tav tm="100000">
+                                          <p:val>
+                                            <p:strVal val="#ppt_x"/>
+                                          </p:val>
+                                        </p:tav>
+                                      </p:tavLst>
+                                    </p:anim>
+                                    <p:anim calcmode="lin" valueType="num">
+                                      <p:cBhvr>
+                                        <p:cTn id="44" dur="1000" fill="hold"/>
+                                        <p:tgtEl>
+                                          <p:spTgt spid="13"/>
+                                        </p:tgtEl>
+                                        <p:attrNameLst>
+                                          <p:attrName>ppt_y</p:attrName>
+                                        </p:attrNameLst>
+                                      </p:cBhvr>
+                                      <p:tavLst>
+                                        <p:tav tm="0">
+                                          <p:val>
+                                            <p:strVal val="#ppt_y+.1"/>
+                                          </p:val>
+                                        </p:tav>
+                                        <p:tav tm="100000">
+                                          <p:val>
+                                            <p:strVal val="#ppt_y"/>
+                                          </p:val>
+                                        </p:tav>
+                                      </p:tavLst>
+                                    </p:anim>
+                                  </p:childTnLst>
+                                </p:cTn>
+                              </p:par>
+                            </p:childTnLst>
+                          </p:cTn>
+                        </p:par>
+                      </p:childTnLst>
+                    </p:cTn>
+                  </p:par>
+                  <p:par>
+                    <p:cTn id="45" fill="hold">
+                      <p:stCondLst>
+                        <p:cond delay="indefinite"/>
+                      </p:stCondLst>
+                      <p:childTnLst>
+                        <p:par>
+                          <p:cTn id="46" fill="hold">
+                            <p:stCondLst>
+                              <p:cond delay="0"/>
+                            </p:stCondLst>
+                            <p:childTnLst>
+                              <p:par>
+                                <p:cTn id="47" presetID="42" presetClass="entr" presetSubtype="0" fill="hold" grpId="0" nodeType="clickEffect">
+                                  <p:stCondLst>
+                                    <p:cond delay="0"/>
+                                  </p:stCondLst>
+                                  <p:childTnLst>
+                                    <p:set>
+                                      <p:cBhvr>
+                                        <p:cTn id="48" dur="1" fill="hold">
+                                          <p:stCondLst>
+                                            <p:cond delay="0"/>
+                                          </p:stCondLst>
+                                        </p:cTn>
+                                        <p:tgtEl>
+                                          <p:spTgt spid="16"/>
+                                        </p:tgtEl>
+                                        <p:attrNameLst>
+                                          <p:attrName>style.visibility</p:attrName>
+                                        </p:attrNameLst>
+                                      </p:cBhvr>
+                                      <p:to>
+                                        <p:strVal val="visible"/>
+                                      </p:to>
+                                    </p:set>
+                                    <p:animEffect transition="in" filter="fade">
+                                      <p:cBhvr>
+                                        <p:cTn id="49" dur="1000"/>
+                                        <p:tgtEl>
+                                          <p:spTgt spid="16"/>
+                                        </p:tgtEl>
+                                      </p:cBhvr>
+                                    </p:animEffect>
+                                    <p:anim calcmode="lin" valueType="num">
+                                      <p:cBhvr>
+                                        <p:cTn id="50" dur="1000" fill="hold"/>
+                                        <p:tgtEl>
+                                          <p:spTgt spid="16"/>
+                                        </p:tgtEl>
+                                        <p:attrNameLst>
+                                          <p:attrName>ppt_x</p:attrName>
+                                        </p:attrNameLst>
+                                      </p:cBhvr>
+                                      <p:tavLst>
+                                        <p:tav tm="0">
+                                          <p:val>
+                                            <p:strVal val="#ppt_x"/>
+                                          </p:val>
+                                        </p:tav>
+                                        <p:tav tm="100000">
+                                          <p:val>
+                                            <p:strVal val="#ppt_x"/>
+                                          </p:val>
+                                        </p:tav>
+                                      </p:tavLst>
+                                    </p:anim>
+                                    <p:anim calcmode="lin" valueType="num">
+                                      <p:cBhvr>
+                                        <p:cTn id="51" dur="1000" fill="hold"/>
+                                        <p:tgtEl>
+                                          <p:spTgt spid="16"/>
+                                        </p:tgtEl>
+                                        <p:attrNameLst>
+                                          <p:attrName>ppt_y</p:attrName>
+                                        </p:attrNameLst>
+                                      </p:cBhvr>
+                                      <p:tavLst>
+                                        <p:tav tm="0">
+                                          <p:val>
+                                            <p:strVal val="#ppt_y+.1"/>
+                                          </p:val>
+                                        </p:tav>
+                                        <p:tav tm="100000">
+                                          <p:val>
+                                            <p:strVal val="#ppt_y"/>
+                                          </p:val>
+                                        </p:tav>
+                                      </p:tavLst>
+                                    </p:anim>
+                                  </p:childTnLst>
+                                </p:cTn>
+                              </p:par>
+                            </p:childTnLst>
+                          </p:cTn>
+                        </p:par>
+                      </p:childTnLst>
+                    </p:cTn>
+                  </p:par>
+                  <p:par>
+                    <p:cTn id="52" fill="hold">
+                      <p:stCondLst>
+                        <p:cond delay="indefinite"/>
+                      </p:stCondLst>
+                      <p:childTnLst>
+                        <p:par>
+                          <p:cTn id="53" fill="hold">
+                            <p:stCondLst>
+                              <p:cond delay="0"/>
+                            </p:stCondLst>
+                            <p:childTnLst>
+                              <p:par>
+                                <p:cTn id="54" presetID="42" presetClass="entr" presetSubtype="0" fill="hold" grpId="0" nodeType="clickEffect">
+                                  <p:stCondLst>
+                                    <p:cond delay="0"/>
+                                  </p:stCondLst>
+                                  <p:childTnLst>
+                                    <p:set>
+                                      <p:cBhvr>
+                                        <p:cTn id="55" dur="1" fill="hold">
+                                          <p:stCondLst>
+                                            <p:cond delay="0"/>
+                                          </p:stCondLst>
+                                        </p:cTn>
+                                        <p:tgtEl>
+                                          <p:spTgt spid="15"/>
+                                        </p:tgtEl>
+                                        <p:attrNameLst>
+                                          <p:attrName>style.visibility</p:attrName>
+                                        </p:attrNameLst>
+                                      </p:cBhvr>
+                                      <p:to>
+                                        <p:strVal val="visible"/>
+                                      </p:to>
+                                    </p:set>
+                                    <p:animEffect transition="in" filter="fade">
+                                      <p:cBhvr>
+                                        <p:cTn id="56" dur="1000"/>
+                                        <p:tgtEl>
+                                          <p:spTgt spid="15"/>
+                                        </p:tgtEl>
+                                      </p:cBhvr>
+                                    </p:animEffect>
+                                    <p:anim calcmode="lin" valueType="num">
+                                      <p:cBhvr>
+                                        <p:cTn id="57" dur="1000" fill="hold"/>
+                                        <p:tgtEl>
+                                          <p:spTgt spid="15"/>
+                                        </p:tgtEl>
+                                        <p:attrNameLst>
+                                          <p:attrName>ppt_x</p:attrName>
+                                        </p:attrNameLst>
+                                      </p:cBhvr>
+                                      <p:tavLst>
+                                        <p:tav tm="0">
+                                          <p:val>
+                                            <p:strVal val="#ppt_x"/>
+                                          </p:val>
+                                        </p:tav>
+                                        <p:tav tm="100000">
+                                          <p:val>
+                                            <p:strVal val="#ppt_x"/>
+                                          </p:val>
+                                        </p:tav>
+                                      </p:tavLst>
+                                    </p:anim>
+                                    <p:anim calcmode="lin" valueType="num">
+                                      <p:cBhvr>
+                                        <p:cTn id="58" dur="1000" fill="hold"/>
+                                        <p:tgtEl>
+                                          <p:spTgt spid="15"/>
+                                        </p:tgtEl>
+                                        <p:attrNameLst>
+                                          <p:attrName>ppt_y</p:attrName>
+                                        </p:attrNameLst>
+                                      </p:cBhvr>
+                                      <p:tavLst>
+                                        <p:tav tm="0">
+                                          <p:val>
+                                            <p:strVal val="#ppt_y+.1"/>
+                                          </p:val>
+                                        </p:tav>
+                                        <p:tav tm="100000">
+                                          <p:val>
+                                            <p:strVal val="#ppt_y"/>
+                                          </p:val>
+                                        </p:tav>
+                                      </p:tavLst>
+                                    </p:anim>
+                                  </p:childTnLst>
+                                </p:cTn>
+                              </p:par>
+                            </p:childTnLst>
+                          </p:cTn>
+                        </p:par>
+                      </p:childTnLst>
+                    </p:cTn>
+                  </p:par>
+                  <p:par>
+                    <p:cTn id="59" fill="hold">
+                      <p:stCondLst>
+                        <p:cond delay="indefinite"/>
+                      </p:stCondLst>
+                      <p:childTnLst>
+                        <p:par>
+                          <p:cTn id="60" fill="hold">
+                            <p:stCondLst>
+                              <p:cond delay="0"/>
+                            </p:stCondLst>
+                            <p:childTnLst>
+                              <p:par>
+                                <p:cTn id="61" presetID="42" presetClass="entr" presetSubtype="0" fill="hold" grpId="0" nodeType="clickEffect">
+                                  <p:stCondLst>
+                                    <p:cond delay="0"/>
+                                  </p:stCondLst>
+                                  <p:childTnLst>
+                                    <p:set>
+                                      <p:cBhvr>
+                                        <p:cTn id="62" dur="1" fill="hold">
+                                          <p:stCondLst>
+                                            <p:cond delay="0"/>
+                                          </p:stCondLst>
+                                        </p:cTn>
+                                        <p:tgtEl>
+                                          <p:spTgt spid="10"/>
+                                        </p:tgtEl>
+                                        <p:attrNameLst>
+                                          <p:attrName>style.visibility</p:attrName>
+                                        </p:attrNameLst>
+                                      </p:cBhvr>
+                                      <p:to>
+                                        <p:strVal val="visible"/>
+                                      </p:to>
+                                    </p:set>
+                                    <p:animEffect transition="in" filter="fade">
+                                      <p:cBhvr>
+                                        <p:cTn id="63" dur="1000"/>
+                                        <p:tgtEl>
+                                          <p:spTgt spid="10"/>
+                                        </p:tgtEl>
+                                      </p:cBhvr>
+                                    </p:animEffect>
+                                    <p:anim calcmode="lin" valueType="num">
+                                      <p:cBhvr>
+                                        <p:cTn id="64" dur="1000" fill="hold"/>
+                                        <p:tgtEl>
+                                          <p:spTgt spid="10"/>
+                                        </p:tgtEl>
+                                        <p:attrNameLst>
+                                          <p:attrName>ppt_x</p:attrName>
+                                        </p:attrNameLst>
+                                      </p:cBhvr>
+                                      <p:tavLst>
+                                        <p:tav tm="0">
+                                          <p:val>
+                                            <p:strVal val="#ppt_x"/>
+                                          </p:val>
+                                        </p:tav>
+                                        <p:tav tm="100000">
+                                          <p:val>
+                                            <p:strVal val="#ppt_x"/>
+                                          </p:val>
+                                        </p:tav>
+                                      </p:tavLst>
+                                    </p:anim>
+                                    <p:anim calcmode="lin" valueType="num">
+                                      <p:cBhvr>
+                                        <p:cTn id="65" dur="1000" fill="hold"/>
+                                        <p:tgtEl>
+                                          <p:spTgt spid="10"/>
+                                        </p:tgtEl>
+                                        <p:attrNameLst>
+                                          <p:attrName>ppt_y</p:attrName>
+                                        </p:attrNameLst>
+                                      </p:cBhvr>
+                                      <p:tavLst>
+                                        <p:tav tm="0">
+                                          <p:val>
+                                            <p:strVal val="#ppt_y+.1"/>
+                                          </p:val>
+                                        </p:tav>
+                                        <p:tav tm="100000">
+                                          <p:val>
+                                            <p:strVal val="#ppt_y"/>
+                                          </p:val>
+                                        </p:tav>
+                                      </p:tavLst>
+                                    </p:anim>
+                                  </p:childTnLst>
+                                </p:cTn>
+                              </p:par>
+                            </p:childTnLst>
+                          </p:cTn>
+                        </p:par>
+                      </p:childTnLst>
+                    </p:cTn>
+                  </p:par>
+                  <p:par>
+                    <p:cTn id="66" fill="hold">
+                      <p:stCondLst>
+                        <p:cond delay="indefinite"/>
+                      </p:stCondLst>
+                      <p:childTnLst>
+                        <p:par>
+                          <p:cTn id="67" fill="hold">
+                            <p:stCondLst>
+                              <p:cond delay="0"/>
+                            </p:stCondLst>
+                            <p:childTnLst>
+                              <p:par>
+                                <p:cTn id="68" presetID="42" presetClass="entr" presetSubtype="0" fill="hold" grpId="0" nodeType="clickEffect">
+                                  <p:stCondLst>
+                                    <p:cond delay="0"/>
+                                  </p:stCondLst>
+                                  <p:childTnLst>
+                                    <p:set>
+                                      <p:cBhvr>
+                                        <p:cTn id="69" dur="1" fill="hold">
+                                          <p:stCondLst>
+                                            <p:cond delay="0"/>
+                                          </p:stCondLst>
+                                        </p:cTn>
+                                        <p:tgtEl>
+                                          <p:spTgt spid="8"/>
+                                        </p:tgtEl>
+                                        <p:attrNameLst>
+                                          <p:attrName>style.visibility</p:attrName>
+                                        </p:attrNameLst>
+                                      </p:cBhvr>
+                                      <p:to>
+                                        <p:strVal val="visible"/>
+                                      </p:to>
+                                    </p:set>
+                                    <p:animEffect transition="in" filter="fade">
+                                      <p:cBhvr>
+                                        <p:cTn id="70" dur="1000"/>
+                                        <p:tgtEl>
+                                          <p:spTgt spid="8"/>
+                                        </p:tgtEl>
+                                      </p:cBhvr>
+                                    </p:animEffect>
+                                    <p:anim calcmode="lin" valueType="num">
+                                      <p:cBhvr>
+                                        <p:cTn id="71" dur="1000" fill="hold"/>
+                                        <p:tgtEl>
+                                          <p:spTgt spid="8"/>
+                                        </p:tgtEl>
+                                        <p:attrNameLst>
+                                          <p:attrName>ppt_x</p:attrName>
+                                        </p:attrNameLst>
+                                      </p:cBhvr>
+                                      <p:tavLst>
+                                        <p:tav tm="0">
+                                          <p:val>
+                                            <p:strVal val="#ppt_x"/>
+                                          </p:val>
+                                        </p:tav>
+                                        <p:tav tm="100000">
+                                          <p:val>
+                                            <p:strVal val="#ppt_x"/>
+                                          </p:val>
+                                        </p:tav>
+                                      </p:tavLst>
+                                    </p:anim>
+                                    <p:anim calcmode="lin" valueType="num">
+                                      <p:cBhvr>
+                                        <p:cTn id="72" dur="1000" fill="hold"/>
+                                        <p:tgtEl>
+                                          <p:spTgt spid="8"/>
+                                        </p:tgtEl>
+                                        <p:attrNameLst>
+                                          <p:attrName>ppt_y</p:attrName>
+                                        </p:attrNameLst>
+                                      </p:cBhvr>
+                                      <p:tavLst>
+                                        <p:tav tm="0">
+                                          <p:val>
+                                            <p:strVal val="#ppt_y+.1"/>
+                                          </p:val>
+                                        </p:tav>
+                                        <p:tav tm="100000">
+                                          <p:val>
+                                            <p:strVal val="#ppt_y"/>
+                                          </p:val>
+                                        </p:tav>
+                                      </p:tavLst>
+                                    </p:anim>
+                                  </p:childTnLst>
+                                </p:cTn>
+                              </p:par>
+                            </p:childTnLst>
+                          </p:cTn>
+                        </p:par>
+                      </p:childTnLst>
+                    </p:cTn>
+                  </p:par>
+                  <p:par>
+                    <p:cTn id="73" fill="hold">
+                      <p:stCondLst>
+                        <p:cond delay="indefinite"/>
+                      </p:stCondLst>
+                      <p:childTnLst>
+                        <p:par>
+                          <p:cTn id="74" fill="hold">
+                            <p:stCondLst>
+                              <p:cond delay="0"/>
+                            </p:stCondLst>
+                            <p:childTnLst>
+                              <p:par>
+                                <p:cTn id="75" presetID="42" presetClass="entr" presetSubtype="0" fill="hold" grpId="0" nodeType="clickEffect">
+                                  <p:stCondLst>
+                                    <p:cond delay="0"/>
+                                  </p:stCondLst>
+                                  <p:childTnLst>
+                                    <p:set>
+                                      <p:cBhvr>
+                                        <p:cTn id="76" dur="1" fill="hold">
+                                          <p:stCondLst>
+                                            <p:cond delay="0"/>
+                                          </p:stCondLst>
+                                        </p:cTn>
+                                        <p:tgtEl>
+                                          <p:spTgt spid="11"/>
+                                        </p:tgtEl>
+                                        <p:attrNameLst>
+                                          <p:attrName>style.visibility</p:attrName>
+                                        </p:attrNameLst>
+                                      </p:cBhvr>
+                                      <p:to>
+                                        <p:strVal val="visible"/>
+                                      </p:to>
+                                    </p:set>
+                                    <p:animEffect transition="in" filter="fade">
+                                      <p:cBhvr>
+                                        <p:cTn id="77" dur="1000"/>
+                                        <p:tgtEl>
+                                          <p:spTgt spid="11"/>
+                                        </p:tgtEl>
+                                      </p:cBhvr>
+                                    </p:animEffect>
+                                    <p:anim calcmode="lin" valueType="num">
+                                      <p:cBhvr>
+                                        <p:cTn id="78" dur="1000" fill="hold"/>
+                                        <p:tgtEl>
+                                          <p:spTgt spid="11"/>
+                                        </p:tgtEl>
+                                        <p:attrNameLst>
+                                          <p:attrName>ppt_x</p:attrName>
+                                        </p:attrNameLst>
+                                      </p:cBhvr>
+                                      <p:tavLst>
+                                        <p:tav tm="0">
+                                          <p:val>
+                                            <p:strVal val="#ppt_x"/>
+                                          </p:val>
+                                        </p:tav>
+                                        <p:tav tm="100000">
+                                          <p:val>
+                                            <p:strVal val="#ppt_x"/>
+                                          </p:val>
+                                        </p:tav>
+                                      </p:tavLst>
+                                    </p:anim>
+                                    <p:anim calcmode="lin" valueType="num">
+                                      <p:cBhvr>
+                                        <p:cTn id="79" dur="1000" fill="hold"/>
+                                        <p:tgtEl>
+                                          <p:spTgt spid="11"/>
+                                        </p:tgtEl>
+                                        <p:attrNameLst>
+                                          <p:attrName>ppt_y</p:attrName>
+                                        </p:attrNameLst>
+                                      </p:cBhvr>
+                                      <p:tavLst>
+                                        <p:tav tm="0">
+                                          <p:val>
+                                            <p:strVal val="#ppt_y+.1"/>
+                                          </p:val>
+                                        </p:tav>
+                                        <p:tav tm="100000">
+                                          <p:val>
+                                            <p:strVal val="#ppt_y"/>
+                                          </p:val>
+                                        </p:tav>
+                                      </p:tavLst>
+                                    </p:anim>
+                                  </p:childTnLst>
+                                </p:cTn>
+                              </p:par>
+                            </p:childTnLst>
+                          </p:cTn>
+                        </p:par>
+                      </p:childTnLst>
+                    </p:cTn>
+                  </p:par>
+                  <p:par>
+                    <p:cTn id="80" fill="hold">
+                      <p:stCondLst>
+                        <p:cond delay="indefinite"/>
+                      </p:stCondLst>
+                      <p:childTnLst>
+                        <p:par>
+                          <p:cTn id="81" fill="hold">
+                            <p:stCondLst>
+                              <p:cond delay="0"/>
+                            </p:stCondLst>
+                            <p:childTnLst>
+                              <p:par>
+                                <p:cTn id="82" presetID="42" presetClass="entr" presetSubtype="0" fill="hold" grpId="0" nodeType="clickEffect">
+                                  <p:stCondLst>
+                                    <p:cond delay="0"/>
+                                  </p:stCondLst>
+                                  <p:childTnLst>
+                                    <p:set>
+                                      <p:cBhvr>
+                                        <p:cTn id="83" dur="1" fill="hold">
+                                          <p:stCondLst>
+                                            <p:cond delay="0"/>
+                                          </p:stCondLst>
+                                        </p:cTn>
+                                        <p:tgtEl>
+                                          <p:spTgt spid="12"/>
+                                        </p:tgtEl>
+                                        <p:attrNameLst>
+                                          <p:attrName>style.visibility</p:attrName>
+                                        </p:attrNameLst>
+                                      </p:cBhvr>
+                                      <p:to>
+                                        <p:strVal val="visible"/>
+                                      </p:to>
+                                    </p:set>
+                                    <p:animEffect transition="in" filter="fade">
+                                      <p:cBhvr>
+                                        <p:cTn id="84" dur="1000"/>
+                                        <p:tgtEl>
+                                          <p:spTgt spid="12"/>
+                                        </p:tgtEl>
+                                      </p:cBhvr>
+                                    </p:animEffect>
+                                    <p:anim calcmode="lin" valueType="num">
+                                      <p:cBhvr>
+                                        <p:cTn id="85" dur="1000" fill="hold"/>
+                                        <p:tgtEl>
+                                          <p:spTgt spid="12"/>
+                                        </p:tgtEl>
+                                        <p:attrNameLst>
+                                          <p:attrName>ppt_x</p:attrName>
+                                        </p:attrNameLst>
+                                      </p:cBhvr>
+                                      <p:tavLst>
+                                        <p:tav tm="0">
+                                          <p:val>
+                                            <p:strVal val="#ppt_x"/>
+                                          </p:val>
+                                        </p:tav>
+                                        <p:tav tm="100000">
+                                          <p:val>
+                                            <p:strVal val="#ppt_x"/>
+                                          </p:val>
+                                        </p:tav>
+                                      </p:tavLst>
+                                    </p:anim>
+                                    <p:anim calcmode="lin" valueType="num">
+                                      <p:cBhvr>
+                                        <p:cTn id="86" dur="1000" fill="hold"/>
+                                        <p:tgtEl>
+                                          <p:spTgt spid="12"/>
+                                        </p:tgtEl>
+                                        <p:attrNameLst>
+                                          <p:attrName>ppt_y</p:attrName>
+                                        </p:attrNameLst>
+                                      </p:cBhvr>
+                                      <p:tavLst>
+                                        <p:tav tm="0">
+                                          <p:val>
+                                            <p:strVal val="#ppt_y+.1"/>
+                                          </p:val>
+                                        </p:tav>
+                                        <p:tav tm="100000">
+                                          <p:val>
+                                            <p:strVal val="#ppt_y"/>
+                                          </p:val>
+                                        </p:tav>
+                                      </p:tavLst>
+                                    </p:anim>
+                                  </p:childTnLst>
+                                </p:cTn>
+                              </p:par>
+                            </p:childTnLst>
+                          </p:cTn>
+                        </p:par>
+                      </p:childTnLst>
+                    </p:cTn>
+                  </p:par>
+                  <p:par>
+                    <p:cTn id="87" fill="hold">
+                      <p:stCondLst>
+                        <p:cond delay="indefinite"/>
+                      </p:stCondLst>
+                      <p:childTnLst>
+                        <p:par>
+                          <p:cTn id="88" fill="hold">
+                            <p:stCondLst>
+                              <p:cond delay="0"/>
+                            </p:stCondLst>
+                            <p:childTnLst>
+                              <p:par>
+                                <p:cTn id="89" presetID="42" presetClass="entr" presetSubtype="0" fill="hold" grpId="0" nodeType="clickEffect">
+                                  <p:stCondLst>
+                                    <p:cond delay="0"/>
+                                  </p:stCondLst>
+                                  <p:childTnLst>
+                                    <p:set>
+                                      <p:cBhvr>
+                                        <p:cTn id="90" dur="1" fill="hold">
+                                          <p:stCondLst>
+                                            <p:cond delay="0"/>
+                                          </p:stCondLst>
+                                        </p:cTn>
+                                        <p:tgtEl>
+                                          <p:spTgt spid="14"/>
+                                        </p:tgtEl>
+                                        <p:attrNameLst>
+                                          <p:attrName>style.visibility</p:attrName>
+                                        </p:attrNameLst>
+                                      </p:cBhvr>
+                                      <p:to>
+                                        <p:strVal val="visible"/>
+                                      </p:to>
+                                    </p:set>
+                                    <p:animEffect transition="in" filter="fade">
+                                      <p:cBhvr>
+                                        <p:cTn id="91" dur="1000"/>
+                                        <p:tgtEl>
+                                          <p:spTgt spid="14"/>
+                                        </p:tgtEl>
+                                      </p:cBhvr>
+                                    </p:animEffect>
+                                    <p:anim calcmode="lin" valueType="num">
+                                      <p:cBhvr>
+                                        <p:cTn id="92" dur="1000" fill="hold"/>
+                                        <p:tgtEl>
+                                          <p:spTgt spid="14"/>
+                                        </p:tgtEl>
+                                        <p:attrNameLst>
+                                          <p:attrName>ppt_x</p:attrName>
+                                        </p:attrNameLst>
+                                      </p:cBhvr>
+                                      <p:tavLst>
+                                        <p:tav tm="0">
+                                          <p:val>
+                                            <p:strVal val="#ppt_x"/>
+                                          </p:val>
+                                        </p:tav>
+                                        <p:tav tm="100000">
+                                          <p:val>
+                                            <p:strVal val="#ppt_x"/>
+                                          </p:val>
+                                        </p:tav>
+                                      </p:tavLst>
+                                    </p:anim>
+                                    <p:anim calcmode="lin" valueType="num">
+                                      <p:cBhvr>
+                                        <p:cTn id="93" dur="1000" fill="hold"/>
+                                        <p:tgtEl>
+                                          <p:spTgt spid="14"/>
+                                        </p:tgtEl>
+                                        <p:attrNameLst>
+                                          <p:attrName>ppt_y</p:attrName>
+                                        </p:attrNameLst>
+                                      </p:cBhvr>
+                                      <p:tavLst>
+                                        <p:tav tm="0">
+                                          <p:val>
+                                            <p:strVal val="#ppt_y+.1"/>
+                                          </p:val>
+                                        </p:tav>
+                                        <p:tav tm="100000">
+                                          <p:val>
+                                            <p:strVal val="#ppt_y"/>
+                                          </p:val>
+                                        </p:tav>
+                                      </p:tavLst>
+                                    </p:anim>
+                                  </p:childTnLst>
+                                </p:cTn>
+                              </p:par>
+                            </p:childTnLst>
+                          </p:cTn>
+                        </p:par>
+                      </p:childTnLst>
+                    </p:cTn>
+                  </p:par>
+                  <p:par>
+                    <p:cTn id="94" fill="hold">
+                      <p:stCondLst>
+                        <p:cond delay="indefinite"/>
+                      </p:stCondLst>
+                      <p:childTnLst>
+                        <p:par>
+                          <p:cTn id="95" fill="hold">
+                            <p:stCondLst>
+                              <p:cond delay="0"/>
+                            </p:stCondLst>
+                            <p:childTnLst>
+                              <p:par>
+                                <p:cTn id="96" presetID="42" presetClass="entr" presetSubtype="0" fill="hold" grpId="0" nodeType="clickEffect">
+                                  <p:stCondLst>
+                                    <p:cond delay="0"/>
+                                  </p:stCondLst>
+                                  <p:childTnLst>
+                                    <p:set>
+                                      <p:cBhvr>
+                                        <p:cTn id="97" dur="1" fill="hold">
+                                          <p:stCondLst>
+                                            <p:cond delay="0"/>
+                                          </p:stCondLst>
+                                        </p:cTn>
+                                        <p:tgtEl>
+                                          <p:spTgt spid="9"/>
+                                        </p:tgtEl>
+                                        <p:attrNameLst>
+                                          <p:attrName>style.visibility</p:attrName>
+                                        </p:attrNameLst>
+                                      </p:cBhvr>
+                                      <p:to>
+                                        <p:strVal val="visible"/>
+                                      </p:to>
+                                    </p:set>
+                                    <p:animEffect transition="in" filter="fade">
+                                      <p:cBhvr>
+                                        <p:cTn id="98" dur="1000"/>
+                                        <p:tgtEl>
+                                          <p:spTgt spid="9"/>
+                                        </p:tgtEl>
+                                      </p:cBhvr>
+                                    </p:animEffect>
+                                    <p:anim calcmode="lin" valueType="num">
+                                      <p:cBhvr>
+                                        <p:cTn id="99" dur="1000" fill="hold"/>
+                                        <p:tgtEl>
+                                          <p:spTgt spid="9"/>
+                                        </p:tgtEl>
+                                        <p:attrNameLst>
+                                          <p:attrName>ppt_x</p:attrName>
+                                        </p:attrNameLst>
+                                      </p:cBhvr>
+                                      <p:tavLst>
+                                        <p:tav tm="0">
+                                          <p:val>
+                                            <p:strVal val="#ppt_x"/>
+                                          </p:val>
+                                        </p:tav>
+                                        <p:tav tm="100000">
+                                          <p:val>
+                                            <p:strVal val="#ppt_x"/>
+                                          </p:val>
+                                        </p:tav>
+                                      </p:tavLst>
+                                    </p:anim>
+                                    <p:anim calcmode="lin" valueType="num">
+                                      <p:cBhvr>
+                                        <p:cTn id="100" dur="1000" fill="hold"/>
+                                        <p:tgtEl>
+                                          <p:spTgt spid="9"/>
+                                        </p:tgtEl>
+                                        <p:attrNameLst>
+                                          <p:attrName>ppt_y</p:attrName>
+                                        </p:attrNameLst>
+                                      </p:cBhvr>
+                                      <p:tavLst>
+                                        <p:tav tm="0">
+                                          <p:val>
+                                            <p:strVal val="#ppt_y+.1"/>
+                                          </p:val>
+                                        </p:tav>
+                                        <p:tav tm="100000">
+                                          <p:val>
+                                            <p:strVal val="#ppt_y"/>
+                                          </p:val>
+                                        </p:tav>
+                                      </p:tavLst>
+                                    </p:anim>
+                                  </p:childTnLst>
+                                </p:cTn>
+                              </p:par>
+                            </p:childTnLst>
+                          </p:cTn>
+                        </p:par>
+                      </p:childTnLst>
+                    </p:cTn>
+                  </p:par>
+                  <p:par>
+                    <p:cTn id="101" fill="hold">
+                      <p:stCondLst>
+                        <p:cond delay="indefinite"/>
+                      </p:stCondLst>
+                      <p:childTnLst>
+                        <p:par>
+                          <p:cTn id="102" fill="hold">
+                            <p:stCondLst>
+                              <p:cond delay="0"/>
+                            </p:stCondLst>
+                            <p:childTnLst>
+                              <p:par>
+                                <p:cTn id="103" presetID="42" presetClass="entr" presetSubtype="0" fill="hold" grpId="0" nodeType="clickEffect">
+                                  <p:stCondLst>
+                                    <p:cond delay="0"/>
+                                  </p:stCondLst>
+                                  <p:childTnLst>
+                                    <p:set>
+                                      <p:cBhvr>
+                                        <p:cTn id="104" dur="1" fill="hold">
+                                          <p:stCondLst>
+                                            <p:cond delay="0"/>
+                                          </p:stCondLst>
+                                        </p:cTn>
+                                        <p:tgtEl>
+                                          <p:spTgt spid="22"/>
+                                        </p:tgtEl>
+                                        <p:attrNameLst>
+                                          <p:attrName>style.visibility</p:attrName>
+                                        </p:attrNameLst>
+                                      </p:cBhvr>
+                                      <p:to>
+                                        <p:strVal val="visible"/>
+                                      </p:to>
+                                    </p:set>
+                                    <p:animEffect transition="in" filter="fade">
+                                      <p:cBhvr>
+                                        <p:cTn id="105" dur="1000"/>
+                                        <p:tgtEl>
+                                          <p:spTgt spid="22"/>
+                                        </p:tgtEl>
+                                      </p:cBhvr>
+                                    </p:animEffect>
+                                    <p:anim calcmode="lin" valueType="num">
+                                      <p:cBhvr>
+                                        <p:cTn id="106" dur="1000" fill="hold"/>
+                                        <p:tgtEl>
+                                          <p:spTgt spid="22"/>
+                                        </p:tgtEl>
+                                        <p:attrNameLst>
+                                          <p:attrName>ppt_x</p:attrName>
+                                        </p:attrNameLst>
+                                      </p:cBhvr>
+                                      <p:tavLst>
+                                        <p:tav tm="0">
+                                          <p:val>
+                                            <p:strVal val="#ppt_x"/>
+                                          </p:val>
+                                        </p:tav>
+                                        <p:tav tm="100000">
+                                          <p:val>
+                                            <p:strVal val="#ppt_x"/>
+                                          </p:val>
+                                        </p:tav>
+                                      </p:tavLst>
+                                    </p:anim>
+                                    <p:anim calcmode="lin" valueType="num">
+                                      <p:cBhvr>
+                                        <p:cTn id="107" dur="1000" fill="hold"/>
+                                        <p:tgtEl>
+                                          <p:spTgt spid="22"/>
+                                        </p:tgtEl>
+                                        <p:attrNameLst>
+                                          <p:attrName>ppt_y</p:attrName>
+                                        </p:attrNameLst>
+                                      </p:cBhvr>
+                                      <p:tavLst>
+                                        <p:tav tm="0">
+                                          <p:val>
+                                            <p:strVal val="#ppt_y+.1"/>
+                                          </p:val>
+                                        </p:tav>
+                                        <p:tav tm="100000">
+                                          <p:val>
+                                            <p:strVal val="#ppt_y"/>
+                                          </p:val>
+                                        </p:tav>
+                                      </p:tavLst>
+                                    </p:anim>
+                                  </p:childTnLst>
+                                </p:cTn>
+                              </p:par>
+                            </p:childTnLst>
+                          </p:cTn>
+                        </p:par>
+                      </p:childTnLst>
+                    </p:cTn>
+                  </p:par>
+                </p:childTnLst>
+              </p:cTn>
+              <p:prevCondLst>
+                <p:cond evt="onPrev" delay="0">
+                  <p:tgtEl>
+                    <p:sldTgt/>
+                  </p:tgtEl>
+                </p:cond>
+              </p:prevCondLst>
+              <p:nextCondLst>
+                <p:cond evt="onNext" delay="0">
+                  <p:tgtEl>
+                    <p:sldTgt/>
+                  </p:tgtEl>
+                </p:cond>
+              </p:nextCondLst>
+            </p:seq>
+          </p:childTnLst>
+        </p:cTn>
+      </p:par>
+    </p:tnLst>
+    <p:bldLst>
+      <p:bldP spid="8" grpId="0" animBg="1"/>
+      <p:bldP spid="9" grpId="0" animBg="1"/>
+      <p:bldP spid="10" grpId="0" animBg="1"/>
+      <p:bldP spid="11" grpId="0" animBg="1"/>
+      <p:bldP spid="12" grpId="0" animBg="1"/>
+      <p:bldP spid="13" grpId="0" animBg="1"/>
+      <p:bldP spid="14" grpId="0" animBg="1"/>
+      <p:bldP spid="15" grpId="0" animBg="1"/>
+      <p:bldP spid="16" grpId="0" animBg="1"/>
+      <p:bldP spid="17" grpId="0" animBg="1"/>
+      <p:bldP spid="18" grpId="0" animBg="1"/>
+      <p:bldP spid="19" grpId="0" animBg="1"/>
+      <p:bldP spid="20" grpId="0" animBg="1"/>
+      <p:bldP spid="21" grpId="0" animBg="1"/>
+      <p:bldP spid="22" grpId="0" animBg="1"/>
+    </p:bldLst>
+  </p:timing>
+</p:sld>
+</file>
+
+<file path=ppt/slides/slide9.xml><?xml version="1.0" encoding="utf-8"?>
+<p:sld xmlns:a="http://schemas.openxmlformats.org/drawingml/2006/main" xmlns:r="http://schemas.openxmlformats.org/officeDocument/2006/relationships" xmlns:p="http://schemas.openxmlformats.org/presentationml/2006/main">
+  <p:cSld>
+    <p:spTree>
+      <p:nvGrpSpPr>
+        <p:cNvPr id="1" name=""/>
+        <p:cNvGrpSpPr/>
+        <p:nvPr/>
+      </p:nvGrpSpPr>
+      <p:grpSpPr>
+        <a:xfrm>
+          <a:off x="0" y="0"/>
+          <a:ext cx="0" cy="0"/>
+          <a:chOff x="0" y="0"/>
+          <a:chExt cx="0" cy="0"/>
+        </a:xfrm>
+      </p:grpSpPr>
+      <p:sp>
+        <p:nvSpPr>
+          <p:cNvPr id="2" name="Slide Number Placeholder 1"/>
+          <p:cNvSpPr>
+            <a:spLocks noGrp="1"/>
+          </p:cNvSpPr>
+          <p:nvPr>
+            <p:ph type="sldNum" sz="quarter" idx="12"/>
+          </p:nvPr>
+        </p:nvSpPr>
+        <p:spPr/>
+        <p:txBody>
+          <a:bodyPr/>
+          <a:lstStyle/>
+          <a:p>
+            <a:fld id="{FBD926E4-2B13-4465-A5B0-7D9EB9E6EE0C}" type="slidenum">
+              <a:rPr lang="sv-SE" smtClean="0"/>
+              <a:t>9</a:t>
+            </a:fld>
+            <a:endParaRPr lang="sv-SE" dirty="0"/>
+          </a:p>
+        </p:txBody>
+      </p:sp>
+      <p:sp>
+        <p:nvSpPr>
+          <p:cNvPr id="3" name="Title 2"/>
+          <p:cNvSpPr>
+            <a:spLocks noGrp="1"/>
+          </p:cNvSpPr>
+          <p:nvPr>
+            <p:ph type="title"/>
+          </p:nvPr>
+        </p:nvSpPr>
+        <p:spPr/>
+        <p:txBody>
+          <a:bodyPr/>
+          <a:lstStyle/>
+          <a:p>
+            <a:r>
+              <a:rPr lang="en-US" dirty="0" smtClean="0"/>
+              <a:t>Merging tool - Kdiff3</a:t>
+            </a:r>
+            <a:endParaRPr lang="en-US" dirty="0"/>
+          </a:p>
+        </p:txBody>
+      </p:sp>
+      <p:sp>
+        <p:nvSpPr>
+          <p:cNvPr id="4" name="Content Placeholder 3"/>
+          <p:cNvSpPr>
+            <a:spLocks noGrp="1"/>
+          </p:cNvSpPr>
+          <p:nvPr>
+            <p:ph sz="quarter" idx="13"/>
+          </p:nvPr>
+        </p:nvSpPr>
+        <p:spPr>
+          <a:xfrm>
+            <a:off x="539750" y="1340769"/>
+            <a:ext cx="8136706" cy="4584510"/>
+          </a:xfrm>
+        </p:spPr>
+        <p:txBody>
+          <a:bodyPr/>
+          <a:lstStyle/>
+          <a:p>
+            <a:pPr marL="285750" indent="-285750">
+              <a:buFont typeface="Arial"/>
+              <a:buChar char="•"/>
+            </a:pPr>
+            <a:r>
+              <a:rPr lang="en-US" sz="1800" dirty="0"/>
+              <a:t>Merging is necessary when several people work on the same files in a project. </a:t>
+            </a:r>
+          </a:p>
+          <a:p>
+            <a:pPr marL="285750" indent="-285750">
+              <a:buFont typeface="Arial"/>
+              <a:buChar char="•"/>
+            </a:pPr>
+            <a:endParaRPr lang="en-US" sz="1800" dirty="0"/>
+          </a:p>
+          <a:p>
+            <a:pPr marL="285750" indent="-285750">
+              <a:buFont typeface="Arial"/>
+              <a:buChar char="•"/>
+            </a:pPr>
+            <a:r>
+              <a:rPr lang="en-US" sz="1800" dirty="0"/>
+              <a:t>Kdiff3 can be used to merge two or three input files  by selecting the buttons A/B/C from the button bar and choose the source that should be used.</a:t>
+            </a:r>
+          </a:p>
+          <a:p>
+            <a:pPr marL="285750" indent="-285750">
+              <a:buFont typeface="Arial"/>
+              <a:buChar char="•"/>
+            </a:pPr>
+            <a:endParaRPr lang="en-US" sz="1800" dirty="0"/>
+          </a:p>
+          <a:p>
+            <a:pPr marL="285750" indent="-285750">
+              <a:buFont typeface="Arial"/>
+              <a:buChar char="•"/>
+            </a:pPr>
+            <a:r>
+              <a:rPr lang="en-US" sz="1800" dirty="0"/>
+              <a:t>Saving is disabled until all conflicts are resolved. </a:t>
+            </a:r>
+          </a:p>
+          <a:p>
+            <a:pPr marL="285750" indent="-285750">
+              <a:buFont typeface="Arial"/>
+              <a:buChar char="•"/>
+            </a:pPr>
+            <a:endParaRPr lang="en-US" sz="1800" dirty="0"/>
+          </a:p>
+          <a:p>
+            <a:pPr marL="285750" indent="-285750">
+              <a:buFont typeface="Arial"/>
+              <a:buChar char="•"/>
+            </a:pPr>
+            <a:r>
+              <a:rPr lang="en-US" sz="1800" dirty="0"/>
+              <a:t> Merge case– either B or input C changed but not both then change source automatically will be selected; if both has changed in the same line the conflict occurs and need to be resolved; B,C the same but not A then C is selected.</a:t>
+            </a:r>
+          </a:p>
+          <a:p>
+            <a:pPr marL="285750" indent="-285750">
+              <a:buFont typeface="Arial"/>
+              <a:buChar char="•"/>
+            </a:pPr>
+            <a:endParaRPr lang="en-US" sz="1800" dirty="0"/>
+          </a:p>
+          <a:p>
+            <a:endParaRPr lang="en-US" dirty="0"/>
+          </a:p>
+        </p:txBody>
+      </p:sp>
+    </p:spTree>
+    <p:extLst>
+      <p:ext uri="{BB962C8B-B14F-4D97-AF65-F5344CB8AC3E}">
+        <p14:creationId xmlns:p14="http://schemas.microsoft.com/office/powerpoint/2010/main" val="4066810392"/>
+      </p:ext>
+    </p:extLst>
+  </p:cSld>
+  <p:clrMapOvr>
+    <a:masterClrMapping/>
+  </p:clrMapOvr>
+  <mc:AlternateContent xmlns:mc="http://schemas.openxmlformats.org/markup-compatibility/2006" xmlns:p14="http://schemas.microsoft.com/office/powerpoint/2010/main">
+    <mc:Choice Requires="p14">
+      <p:transition p14:dur="0"/>
+    </mc:Choice>
+    <mc:Fallback xmlns="">
+      <p:transition/>
+    </mc:Fallback>
+  </mc:AlternateContent>
+  <p:timing>
+    <p:tnLst>
+      <p:par>
+        <p:cTn xmlns:p14="http://schemas.microsoft.com/office/powerpoint/2010/main" id="1" dur="indefinite" restart="never" nodeType="tmRoot"/>
+      </p:par>
+    </p:tnLst>
   </p:timing>
 </p:sld>
 </file>

</xml_diff>